<commit_message>
more on state representation.
</commit_message>
<xml_diff>
--- a/slides/06_CSP.pptx
+++ b/slides/06_CSP.pptx
@@ -2294,7 +2294,7 @@
           <a:p>
             <a:fld id="{FDB68C03-DCF9-4B87-BBF6-8F2088376604}" type="datetimeFigureOut">
               <a:rPr lang="en-US" smtClean="0"/>
-              <a:t>3/24/2022</a:t>
+              <a:t>11/6/2023</a:t>
             </a:fld>
             <a:endParaRPr lang="en-US"/>
           </a:p>
@@ -2904,7 +2904,7 @@
           <a:p>
             <a:fld id="{FDB68C03-DCF9-4B87-BBF6-8F2088376604}" type="datetimeFigureOut">
               <a:rPr lang="en-US" smtClean="0"/>
-              <a:t>3/24/2022</a:t>
+              <a:t>11/6/2023</a:t>
             </a:fld>
             <a:endParaRPr lang="en-US"/>
           </a:p>
@@ -3179,7 +3179,7 @@
           <a:p>
             <a:fld id="{FDB68C03-DCF9-4B87-BBF6-8F2088376604}" type="datetimeFigureOut">
               <a:rPr lang="en-US" smtClean="0"/>
-              <a:t>3/24/2022</a:t>
+              <a:t>11/6/2023</a:t>
             </a:fld>
             <a:endParaRPr lang="en-US"/>
           </a:p>
@@ -4968,7 +4968,7 @@
           <a:p>
             <a:fld id="{FDB68C03-DCF9-4B87-BBF6-8F2088376604}" type="datetimeFigureOut">
               <a:rPr lang="en-US" smtClean="0"/>
-              <a:t>3/24/2022</a:t>
+              <a:t>11/6/2023</a:t>
             </a:fld>
             <a:endParaRPr lang="en-US"/>
           </a:p>
@@ -6450,6 +6450,146 @@
           </a:p>
         </p:txBody>
       </p:sp>
+      <p:sp>
+        <p:nvSpPr>
+          <p:cNvPr id="2" name="Star: 5 Points 1">
+            <a:extLst>
+              <a:ext uri="{FF2B5EF4-FFF2-40B4-BE49-F238E27FC236}">
+                <a16:creationId xmlns:a16="http://schemas.microsoft.com/office/drawing/2014/main" id="{935DF966-C2A1-7C21-4E4C-5D04E963651F}"/>
+              </a:ext>
+            </a:extLst>
+          </p:cNvPr>
+          <p:cNvSpPr/>
+          <p:nvPr/>
+        </p:nvSpPr>
+        <p:spPr>
+          <a:xfrm>
+            <a:off x="8763000" y="129075"/>
+            <a:ext cx="247650" cy="244474"/>
+          </a:xfrm>
+          <a:prstGeom prst="star5">
+            <a:avLst/>
+          </a:prstGeom>
+        </p:spPr>
+        <p:style>
+          <a:lnRef idx="2">
+            <a:schemeClr val="accent2">
+              <a:shade val="50000"/>
+            </a:schemeClr>
+          </a:lnRef>
+          <a:fillRef idx="1">
+            <a:schemeClr val="accent2"/>
+          </a:fillRef>
+          <a:effectRef idx="0">
+            <a:schemeClr val="accent2"/>
+          </a:effectRef>
+          <a:fontRef idx="minor">
+            <a:schemeClr val="lt1"/>
+          </a:fontRef>
+        </p:style>
+        <p:txBody>
+          <a:bodyPr rtlCol="0" anchor="ctr"/>
+          <a:lstStyle>
+            <a:defPPr>
+              <a:defRPr lang="en-US"/>
+            </a:defPPr>
+            <a:lvl1pPr marL="0" algn="l" defTabSz="914400" rtl="0" eaLnBrk="1" latinLnBrk="0" hangingPunct="1">
+              <a:defRPr sz="1800" kern="1200">
+                <a:solidFill>
+                  <a:schemeClr val="lt1"/>
+                </a:solidFill>
+                <a:latin typeface="+mn-lt"/>
+                <a:ea typeface="+mn-ea"/>
+                <a:cs typeface="+mn-cs"/>
+              </a:defRPr>
+            </a:lvl1pPr>
+            <a:lvl2pPr marL="457200" algn="l" defTabSz="914400" rtl="0" eaLnBrk="1" latinLnBrk="0" hangingPunct="1">
+              <a:defRPr sz="1800" kern="1200">
+                <a:solidFill>
+                  <a:schemeClr val="lt1"/>
+                </a:solidFill>
+                <a:latin typeface="+mn-lt"/>
+                <a:ea typeface="+mn-ea"/>
+                <a:cs typeface="+mn-cs"/>
+              </a:defRPr>
+            </a:lvl2pPr>
+            <a:lvl3pPr marL="914400" algn="l" defTabSz="914400" rtl="0" eaLnBrk="1" latinLnBrk="0" hangingPunct="1">
+              <a:defRPr sz="1800" kern="1200">
+                <a:solidFill>
+                  <a:schemeClr val="lt1"/>
+                </a:solidFill>
+                <a:latin typeface="+mn-lt"/>
+                <a:ea typeface="+mn-ea"/>
+                <a:cs typeface="+mn-cs"/>
+              </a:defRPr>
+            </a:lvl3pPr>
+            <a:lvl4pPr marL="1371600" algn="l" defTabSz="914400" rtl="0" eaLnBrk="1" latinLnBrk="0" hangingPunct="1">
+              <a:defRPr sz="1800" kern="1200">
+                <a:solidFill>
+                  <a:schemeClr val="lt1"/>
+                </a:solidFill>
+                <a:latin typeface="+mn-lt"/>
+                <a:ea typeface="+mn-ea"/>
+                <a:cs typeface="+mn-cs"/>
+              </a:defRPr>
+            </a:lvl4pPr>
+            <a:lvl5pPr marL="1828800" algn="l" defTabSz="914400" rtl="0" eaLnBrk="1" latinLnBrk="0" hangingPunct="1">
+              <a:defRPr sz="1800" kern="1200">
+                <a:solidFill>
+                  <a:schemeClr val="lt1"/>
+                </a:solidFill>
+                <a:latin typeface="+mn-lt"/>
+                <a:ea typeface="+mn-ea"/>
+                <a:cs typeface="+mn-cs"/>
+              </a:defRPr>
+            </a:lvl5pPr>
+            <a:lvl6pPr marL="2286000" algn="l" defTabSz="914400" rtl="0" eaLnBrk="1" latinLnBrk="0" hangingPunct="1">
+              <a:defRPr sz="1800" kern="1200">
+                <a:solidFill>
+                  <a:schemeClr val="lt1"/>
+                </a:solidFill>
+                <a:latin typeface="+mn-lt"/>
+                <a:ea typeface="+mn-ea"/>
+                <a:cs typeface="+mn-cs"/>
+              </a:defRPr>
+            </a:lvl6pPr>
+            <a:lvl7pPr marL="2743200" algn="l" defTabSz="914400" rtl="0" eaLnBrk="1" latinLnBrk="0" hangingPunct="1">
+              <a:defRPr sz="1800" kern="1200">
+                <a:solidFill>
+                  <a:schemeClr val="lt1"/>
+                </a:solidFill>
+                <a:latin typeface="+mn-lt"/>
+                <a:ea typeface="+mn-ea"/>
+                <a:cs typeface="+mn-cs"/>
+              </a:defRPr>
+            </a:lvl7pPr>
+            <a:lvl8pPr marL="3200400" algn="l" defTabSz="914400" rtl="0" eaLnBrk="1" latinLnBrk="0" hangingPunct="1">
+              <a:defRPr sz="1800" kern="1200">
+                <a:solidFill>
+                  <a:schemeClr val="lt1"/>
+                </a:solidFill>
+                <a:latin typeface="+mn-lt"/>
+                <a:ea typeface="+mn-ea"/>
+                <a:cs typeface="+mn-cs"/>
+              </a:defRPr>
+            </a:lvl8pPr>
+            <a:lvl9pPr marL="3657600" algn="l" defTabSz="914400" rtl="0" eaLnBrk="1" latinLnBrk="0" hangingPunct="1">
+              <a:defRPr sz="1800" kern="1200">
+                <a:solidFill>
+                  <a:schemeClr val="lt1"/>
+                </a:solidFill>
+                <a:latin typeface="+mn-lt"/>
+                <a:ea typeface="+mn-ea"/>
+                <a:cs typeface="+mn-cs"/>
+              </a:defRPr>
+            </a:lvl9pPr>
+          </a:lstStyle>
+          <a:p>
+            <a:pPr algn="ctr"/>
+            <a:endParaRPr lang="en-US"/>
+          </a:p>
+        </p:txBody>
+      </p:sp>
     </p:spTree>
   </p:cSld>
   <p:clrMapOvr>
@@ -6605,6 +6745,146 @@
               <a:rPr lang="en-US" sz="2400" dirty="0"/>
               <a:t>Any complete and consistent assignment.</a:t>
             </a:r>
+          </a:p>
+        </p:txBody>
+      </p:sp>
+      <p:sp>
+        <p:nvSpPr>
+          <p:cNvPr id="2" name="Star: 5 Points 1">
+            <a:extLst>
+              <a:ext uri="{FF2B5EF4-FFF2-40B4-BE49-F238E27FC236}">
+                <a16:creationId xmlns:a16="http://schemas.microsoft.com/office/drawing/2014/main" id="{6B71A7AB-D489-B60F-A6EA-D0B687D3175B}"/>
+              </a:ext>
+            </a:extLst>
+          </p:cNvPr>
+          <p:cNvSpPr/>
+          <p:nvPr/>
+        </p:nvSpPr>
+        <p:spPr>
+          <a:xfrm>
+            <a:off x="8763000" y="129075"/>
+            <a:ext cx="247650" cy="244474"/>
+          </a:xfrm>
+          <a:prstGeom prst="star5">
+            <a:avLst/>
+          </a:prstGeom>
+        </p:spPr>
+        <p:style>
+          <a:lnRef idx="2">
+            <a:schemeClr val="accent2">
+              <a:shade val="50000"/>
+            </a:schemeClr>
+          </a:lnRef>
+          <a:fillRef idx="1">
+            <a:schemeClr val="accent2"/>
+          </a:fillRef>
+          <a:effectRef idx="0">
+            <a:schemeClr val="accent2"/>
+          </a:effectRef>
+          <a:fontRef idx="minor">
+            <a:schemeClr val="lt1"/>
+          </a:fontRef>
+        </p:style>
+        <p:txBody>
+          <a:bodyPr rtlCol="0" anchor="ctr"/>
+          <a:lstStyle>
+            <a:defPPr>
+              <a:defRPr lang="en-US"/>
+            </a:defPPr>
+            <a:lvl1pPr marL="0" algn="l" defTabSz="914400" rtl="0" eaLnBrk="1" latinLnBrk="0" hangingPunct="1">
+              <a:defRPr sz="1800" kern="1200">
+                <a:solidFill>
+                  <a:schemeClr val="lt1"/>
+                </a:solidFill>
+                <a:latin typeface="+mn-lt"/>
+                <a:ea typeface="+mn-ea"/>
+                <a:cs typeface="+mn-cs"/>
+              </a:defRPr>
+            </a:lvl1pPr>
+            <a:lvl2pPr marL="457200" algn="l" defTabSz="914400" rtl="0" eaLnBrk="1" latinLnBrk="0" hangingPunct="1">
+              <a:defRPr sz="1800" kern="1200">
+                <a:solidFill>
+                  <a:schemeClr val="lt1"/>
+                </a:solidFill>
+                <a:latin typeface="+mn-lt"/>
+                <a:ea typeface="+mn-ea"/>
+                <a:cs typeface="+mn-cs"/>
+              </a:defRPr>
+            </a:lvl2pPr>
+            <a:lvl3pPr marL="914400" algn="l" defTabSz="914400" rtl="0" eaLnBrk="1" latinLnBrk="0" hangingPunct="1">
+              <a:defRPr sz="1800" kern="1200">
+                <a:solidFill>
+                  <a:schemeClr val="lt1"/>
+                </a:solidFill>
+                <a:latin typeface="+mn-lt"/>
+                <a:ea typeface="+mn-ea"/>
+                <a:cs typeface="+mn-cs"/>
+              </a:defRPr>
+            </a:lvl3pPr>
+            <a:lvl4pPr marL="1371600" algn="l" defTabSz="914400" rtl="0" eaLnBrk="1" latinLnBrk="0" hangingPunct="1">
+              <a:defRPr sz="1800" kern="1200">
+                <a:solidFill>
+                  <a:schemeClr val="lt1"/>
+                </a:solidFill>
+                <a:latin typeface="+mn-lt"/>
+                <a:ea typeface="+mn-ea"/>
+                <a:cs typeface="+mn-cs"/>
+              </a:defRPr>
+            </a:lvl4pPr>
+            <a:lvl5pPr marL="1828800" algn="l" defTabSz="914400" rtl="0" eaLnBrk="1" latinLnBrk="0" hangingPunct="1">
+              <a:defRPr sz="1800" kern="1200">
+                <a:solidFill>
+                  <a:schemeClr val="lt1"/>
+                </a:solidFill>
+                <a:latin typeface="+mn-lt"/>
+                <a:ea typeface="+mn-ea"/>
+                <a:cs typeface="+mn-cs"/>
+              </a:defRPr>
+            </a:lvl5pPr>
+            <a:lvl6pPr marL="2286000" algn="l" defTabSz="914400" rtl="0" eaLnBrk="1" latinLnBrk="0" hangingPunct="1">
+              <a:defRPr sz="1800" kern="1200">
+                <a:solidFill>
+                  <a:schemeClr val="lt1"/>
+                </a:solidFill>
+                <a:latin typeface="+mn-lt"/>
+                <a:ea typeface="+mn-ea"/>
+                <a:cs typeface="+mn-cs"/>
+              </a:defRPr>
+            </a:lvl6pPr>
+            <a:lvl7pPr marL="2743200" algn="l" defTabSz="914400" rtl="0" eaLnBrk="1" latinLnBrk="0" hangingPunct="1">
+              <a:defRPr sz="1800" kern="1200">
+                <a:solidFill>
+                  <a:schemeClr val="lt1"/>
+                </a:solidFill>
+                <a:latin typeface="+mn-lt"/>
+                <a:ea typeface="+mn-ea"/>
+                <a:cs typeface="+mn-cs"/>
+              </a:defRPr>
+            </a:lvl7pPr>
+            <a:lvl8pPr marL="3200400" algn="l" defTabSz="914400" rtl="0" eaLnBrk="1" latinLnBrk="0" hangingPunct="1">
+              <a:defRPr sz="1800" kern="1200">
+                <a:solidFill>
+                  <a:schemeClr val="lt1"/>
+                </a:solidFill>
+                <a:latin typeface="+mn-lt"/>
+                <a:ea typeface="+mn-ea"/>
+                <a:cs typeface="+mn-cs"/>
+              </a:defRPr>
+            </a:lvl8pPr>
+            <a:lvl9pPr marL="3657600" algn="l" defTabSz="914400" rtl="0" eaLnBrk="1" latinLnBrk="0" hangingPunct="1">
+              <a:defRPr sz="1800" kern="1200">
+                <a:solidFill>
+                  <a:schemeClr val="lt1"/>
+                </a:solidFill>
+                <a:latin typeface="+mn-lt"/>
+                <a:ea typeface="+mn-ea"/>
+                <a:cs typeface="+mn-cs"/>
+              </a:defRPr>
+            </a:lvl9pPr>
+          </a:lstStyle>
+          <a:p>
+            <a:pPr algn="ctr"/>
+            <a:endParaRPr lang="en-US"/>
           </a:p>
         </p:txBody>
       </p:sp>
@@ -7305,9 +7585,149 @@
             </a:r>
             <a:r>
               <a:rPr lang="en-US" sz="2400" b="1" dirty="0"/>
-              <a:t>backtracking search</a:t>
+              <a:t>backtracking search.</a:t>
             </a:r>
             <a:endParaRPr lang="en-US" sz="2400" dirty="0"/>
+          </a:p>
+        </p:txBody>
+      </p:sp>
+      <p:sp>
+        <p:nvSpPr>
+          <p:cNvPr id="2" name="Star: 5 Points 1">
+            <a:extLst>
+              <a:ext uri="{FF2B5EF4-FFF2-40B4-BE49-F238E27FC236}">
+                <a16:creationId xmlns:a16="http://schemas.microsoft.com/office/drawing/2014/main" id="{95D84DF1-5896-6569-D9E0-C1381A5C4546}"/>
+              </a:ext>
+            </a:extLst>
+          </p:cNvPr>
+          <p:cNvSpPr/>
+          <p:nvPr/>
+        </p:nvSpPr>
+        <p:spPr>
+          <a:xfrm>
+            <a:off x="8763000" y="129075"/>
+            <a:ext cx="247650" cy="244474"/>
+          </a:xfrm>
+          <a:prstGeom prst="star5">
+            <a:avLst/>
+          </a:prstGeom>
+        </p:spPr>
+        <p:style>
+          <a:lnRef idx="2">
+            <a:schemeClr val="accent2">
+              <a:shade val="50000"/>
+            </a:schemeClr>
+          </a:lnRef>
+          <a:fillRef idx="1">
+            <a:schemeClr val="accent2"/>
+          </a:fillRef>
+          <a:effectRef idx="0">
+            <a:schemeClr val="accent2"/>
+          </a:effectRef>
+          <a:fontRef idx="minor">
+            <a:schemeClr val="lt1"/>
+          </a:fontRef>
+        </p:style>
+        <p:txBody>
+          <a:bodyPr rtlCol="0" anchor="ctr"/>
+          <a:lstStyle>
+            <a:defPPr>
+              <a:defRPr lang="en-US"/>
+            </a:defPPr>
+            <a:lvl1pPr marL="0" algn="l" defTabSz="914400" rtl="0" eaLnBrk="1" latinLnBrk="0" hangingPunct="1">
+              <a:defRPr sz="1800" kern="1200">
+                <a:solidFill>
+                  <a:schemeClr val="lt1"/>
+                </a:solidFill>
+                <a:latin typeface="+mn-lt"/>
+                <a:ea typeface="+mn-ea"/>
+                <a:cs typeface="+mn-cs"/>
+              </a:defRPr>
+            </a:lvl1pPr>
+            <a:lvl2pPr marL="457200" algn="l" defTabSz="914400" rtl="0" eaLnBrk="1" latinLnBrk="0" hangingPunct="1">
+              <a:defRPr sz="1800" kern="1200">
+                <a:solidFill>
+                  <a:schemeClr val="lt1"/>
+                </a:solidFill>
+                <a:latin typeface="+mn-lt"/>
+                <a:ea typeface="+mn-ea"/>
+                <a:cs typeface="+mn-cs"/>
+              </a:defRPr>
+            </a:lvl2pPr>
+            <a:lvl3pPr marL="914400" algn="l" defTabSz="914400" rtl="0" eaLnBrk="1" latinLnBrk="0" hangingPunct="1">
+              <a:defRPr sz="1800" kern="1200">
+                <a:solidFill>
+                  <a:schemeClr val="lt1"/>
+                </a:solidFill>
+                <a:latin typeface="+mn-lt"/>
+                <a:ea typeface="+mn-ea"/>
+                <a:cs typeface="+mn-cs"/>
+              </a:defRPr>
+            </a:lvl3pPr>
+            <a:lvl4pPr marL="1371600" algn="l" defTabSz="914400" rtl="0" eaLnBrk="1" latinLnBrk="0" hangingPunct="1">
+              <a:defRPr sz="1800" kern="1200">
+                <a:solidFill>
+                  <a:schemeClr val="lt1"/>
+                </a:solidFill>
+                <a:latin typeface="+mn-lt"/>
+                <a:ea typeface="+mn-ea"/>
+                <a:cs typeface="+mn-cs"/>
+              </a:defRPr>
+            </a:lvl4pPr>
+            <a:lvl5pPr marL="1828800" algn="l" defTabSz="914400" rtl="0" eaLnBrk="1" latinLnBrk="0" hangingPunct="1">
+              <a:defRPr sz="1800" kern="1200">
+                <a:solidFill>
+                  <a:schemeClr val="lt1"/>
+                </a:solidFill>
+                <a:latin typeface="+mn-lt"/>
+                <a:ea typeface="+mn-ea"/>
+                <a:cs typeface="+mn-cs"/>
+              </a:defRPr>
+            </a:lvl5pPr>
+            <a:lvl6pPr marL="2286000" algn="l" defTabSz="914400" rtl="0" eaLnBrk="1" latinLnBrk="0" hangingPunct="1">
+              <a:defRPr sz="1800" kern="1200">
+                <a:solidFill>
+                  <a:schemeClr val="lt1"/>
+                </a:solidFill>
+                <a:latin typeface="+mn-lt"/>
+                <a:ea typeface="+mn-ea"/>
+                <a:cs typeface="+mn-cs"/>
+              </a:defRPr>
+            </a:lvl6pPr>
+            <a:lvl7pPr marL="2743200" algn="l" defTabSz="914400" rtl="0" eaLnBrk="1" latinLnBrk="0" hangingPunct="1">
+              <a:defRPr sz="1800" kern="1200">
+                <a:solidFill>
+                  <a:schemeClr val="lt1"/>
+                </a:solidFill>
+                <a:latin typeface="+mn-lt"/>
+                <a:ea typeface="+mn-ea"/>
+                <a:cs typeface="+mn-cs"/>
+              </a:defRPr>
+            </a:lvl7pPr>
+            <a:lvl8pPr marL="3200400" algn="l" defTabSz="914400" rtl="0" eaLnBrk="1" latinLnBrk="0" hangingPunct="1">
+              <a:defRPr sz="1800" kern="1200">
+                <a:solidFill>
+                  <a:schemeClr val="lt1"/>
+                </a:solidFill>
+                <a:latin typeface="+mn-lt"/>
+                <a:ea typeface="+mn-ea"/>
+                <a:cs typeface="+mn-cs"/>
+              </a:defRPr>
+            </a:lvl8pPr>
+            <a:lvl9pPr marL="3657600" algn="l" defTabSz="914400" rtl="0" eaLnBrk="1" latinLnBrk="0" hangingPunct="1">
+              <a:defRPr sz="1800" kern="1200">
+                <a:solidFill>
+                  <a:schemeClr val="lt1"/>
+                </a:solidFill>
+                <a:latin typeface="+mn-lt"/>
+                <a:ea typeface="+mn-ea"/>
+                <a:cs typeface="+mn-cs"/>
+              </a:defRPr>
+            </a:lvl9pPr>
+          </a:lstStyle>
+          <a:p>
+            <a:pPr algn="ctr"/>
+            <a:endParaRPr lang="en-US"/>
           </a:p>
         </p:txBody>
       </p:sp>
@@ -8070,6 +8490,146 @@
           </a:fontRef>
         </p:style>
       </p:cxnSp>
+      <p:sp>
+        <p:nvSpPr>
+          <p:cNvPr id="2" name="Star: 5 Points 1">
+            <a:extLst>
+              <a:ext uri="{FF2B5EF4-FFF2-40B4-BE49-F238E27FC236}">
+                <a16:creationId xmlns:a16="http://schemas.microsoft.com/office/drawing/2014/main" id="{CA497226-A8BC-6C7E-D599-C0BB97D40F82}"/>
+              </a:ext>
+            </a:extLst>
+          </p:cNvPr>
+          <p:cNvSpPr/>
+          <p:nvPr/>
+        </p:nvSpPr>
+        <p:spPr>
+          <a:xfrm>
+            <a:off x="8763000" y="129075"/>
+            <a:ext cx="247650" cy="244474"/>
+          </a:xfrm>
+          <a:prstGeom prst="star5">
+            <a:avLst/>
+          </a:prstGeom>
+        </p:spPr>
+        <p:style>
+          <a:lnRef idx="2">
+            <a:schemeClr val="accent2">
+              <a:shade val="50000"/>
+            </a:schemeClr>
+          </a:lnRef>
+          <a:fillRef idx="1">
+            <a:schemeClr val="accent2"/>
+          </a:fillRef>
+          <a:effectRef idx="0">
+            <a:schemeClr val="accent2"/>
+          </a:effectRef>
+          <a:fontRef idx="minor">
+            <a:schemeClr val="lt1"/>
+          </a:fontRef>
+        </p:style>
+        <p:txBody>
+          <a:bodyPr rtlCol="0" anchor="ctr"/>
+          <a:lstStyle>
+            <a:defPPr>
+              <a:defRPr lang="en-US"/>
+            </a:defPPr>
+            <a:lvl1pPr marL="0" algn="l" defTabSz="914400" rtl="0" eaLnBrk="1" latinLnBrk="0" hangingPunct="1">
+              <a:defRPr sz="1800" kern="1200">
+                <a:solidFill>
+                  <a:schemeClr val="lt1"/>
+                </a:solidFill>
+                <a:latin typeface="+mn-lt"/>
+                <a:ea typeface="+mn-ea"/>
+                <a:cs typeface="+mn-cs"/>
+              </a:defRPr>
+            </a:lvl1pPr>
+            <a:lvl2pPr marL="457200" algn="l" defTabSz="914400" rtl="0" eaLnBrk="1" latinLnBrk="0" hangingPunct="1">
+              <a:defRPr sz="1800" kern="1200">
+                <a:solidFill>
+                  <a:schemeClr val="lt1"/>
+                </a:solidFill>
+                <a:latin typeface="+mn-lt"/>
+                <a:ea typeface="+mn-ea"/>
+                <a:cs typeface="+mn-cs"/>
+              </a:defRPr>
+            </a:lvl2pPr>
+            <a:lvl3pPr marL="914400" algn="l" defTabSz="914400" rtl="0" eaLnBrk="1" latinLnBrk="0" hangingPunct="1">
+              <a:defRPr sz="1800" kern="1200">
+                <a:solidFill>
+                  <a:schemeClr val="lt1"/>
+                </a:solidFill>
+                <a:latin typeface="+mn-lt"/>
+                <a:ea typeface="+mn-ea"/>
+                <a:cs typeface="+mn-cs"/>
+              </a:defRPr>
+            </a:lvl3pPr>
+            <a:lvl4pPr marL="1371600" algn="l" defTabSz="914400" rtl="0" eaLnBrk="1" latinLnBrk="0" hangingPunct="1">
+              <a:defRPr sz="1800" kern="1200">
+                <a:solidFill>
+                  <a:schemeClr val="lt1"/>
+                </a:solidFill>
+                <a:latin typeface="+mn-lt"/>
+                <a:ea typeface="+mn-ea"/>
+                <a:cs typeface="+mn-cs"/>
+              </a:defRPr>
+            </a:lvl4pPr>
+            <a:lvl5pPr marL="1828800" algn="l" defTabSz="914400" rtl="0" eaLnBrk="1" latinLnBrk="0" hangingPunct="1">
+              <a:defRPr sz="1800" kern="1200">
+                <a:solidFill>
+                  <a:schemeClr val="lt1"/>
+                </a:solidFill>
+                <a:latin typeface="+mn-lt"/>
+                <a:ea typeface="+mn-ea"/>
+                <a:cs typeface="+mn-cs"/>
+              </a:defRPr>
+            </a:lvl5pPr>
+            <a:lvl6pPr marL="2286000" algn="l" defTabSz="914400" rtl="0" eaLnBrk="1" latinLnBrk="0" hangingPunct="1">
+              <a:defRPr sz="1800" kern="1200">
+                <a:solidFill>
+                  <a:schemeClr val="lt1"/>
+                </a:solidFill>
+                <a:latin typeface="+mn-lt"/>
+                <a:ea typeface="+mn-ea"/>
+                <a:cs typeface="+mn-cs"/>
+              </a:defRPr>
+            </a:lvl6pPr>
+            <a:lvl7pPr marL="2743200" algn="l" defTabSz="914400" rtl="0" eaLnBrk="1" latinLnBrk="0" hangingPunct="1">
+              <a:defRPr sz="1800" kern="1200">
+                <a:solidFill>
+                  <a:schemeClr val="lt1"/>
+                </a:solidFill>
+                <a:latin typeface="+mn-lt"/>
+                <a:ea typeface="+mn-ea"/>
+                <a:cs typeface="+mn-cs"/>
+              </a:defRPr>
+            </a:lvl7pPr>
+            <a:lvl8pPr marL="3200400" algn="l" defTabSz="914400" rtl="0" eaLnBrk="1" latinLnBrk="0" hangingPunct="1">
+              <a:defRPr sz="1800" kern="1200">
+                <a:solidFill>
+                  <a:schemeClr val="lt1"/>
+                </a:solidFill>
+                <a:latin typeface="+mn-lt"/>
+                <a:ea typeface="+mn-ea"/>
+                <a:cs typeface="+mn-cs"/>
+              </a:defRPr>
+            </a:lvl8pPr>
+            <a:lvl9pPr marL="3657600" algn="l" defTabSz="914400" rtl="0" eaLnBrk="1" latinLnBrk="0" hangingPunct="1">
+              <a:defRPr sz="1800" kern="1200">
+                <a:solidFill>
+                  <a:schemeClr val="lt1"/>
+                </a:solidFill>
+                <a:latin typeface="+mn-lt"/>
+                <a:ea typeface="+mn-ea"/>
+                <a:cs typeface="+mn-cs"/>
+              </a:defRPr>
+            </a:lvl9pPr>
+          </a:lstStyle>
+          <a:p>
+            <a:pPr algn="ctr"/>
+            <a:endParaRPr lang="en-US"/>
+          </a:p>
+        </p:txBody>
+      </p:sp>
     </p:spTree>
   </p:cSld>
   <p:clrMapOvr>
@@ -10367,6 +10927,146 @@
           </a:fontRef>
         </p:style>
       </p:cxnSp>
+      <p:sp>
+        <p:nvSpPr>
+          <p:cNvPr id="2" name="Star: 5 Points 1">
+            <a:extLst>
+              <a:ext uri="{FF2B5EF4-FFF2-40B4-BE49-F238E27FC236}">
+                <a16:creationId xmlns:a16="http://schemas.microsoft.com/office/drawing/2014/main" id="{70EC62FA-B858-4E16-D6F2-28ECC7788FB1}"/>
+              </a:ext>
+            </a:extLst>
+          </p:cNvPr>
+          <p:cNvSpPr/>
+          <p:nvPr/>
+        </p:nvSpPr>
+        <p:spPr>
+          <a:xfrm>
+            <a:off x="8763000" y="129075"/>
+            <a:ext cx="247650" cy="244474"/>
+          </a:xfrm>
+          <a:prstGeom prst="star5">
+            <a:avLst/>
+          </a:prstGeom>
+        </p:spPr>
+        <p:style>
+          <a:lnRef idx="2">
+            <a:schemeClr val="accent2">
+              <a:shade val="50000"/>
+            </a:schemeClr>
+          </a:lnRef>
+          <a:fillRef idx="1">
+            <a:schemeClr val="accent2"/>
+          </a:fillRef>
+          <a:effectRef idx="0">
+            <a:schemeClr val="accent2"/>
+          </a:effectRef>
+          <a:fontRef idx="minor">
+            <a:schemeClr val="lt1"/>
+          </a:fontRef>
+        </p:style>
+        <p:txBody>
+          <a:bodyPr rtlCol="0" anchor="ctr"/>
+          <a:lstStyle>
+            <a:defPPr>
+              <a:defRPr lang="en-US"/>
+            </a:defPPr>
+            <a:lvl1pPr marL="0" algn="l" defTabSz="914400" rtl="0" eaLnBrk="1" latinLnBrk="0" hangingPunct="1">
+              <a:defRPr sz="1800" kern="1200">
+                <a:solidFill>
+                  <a:schemeClr val="lt1"/>
+                </a:solidFill>
+                <a:latin typeface="+mn-lt"/>
+                <a:ea typeface="+mn-ea"/>
+                <a:cs typeface="+mn-cs"/>
+              </a:defRPr>
+            </a:lvl1pPr>
+            <a:lvl2pPr marL="457200" algn="l" defTabSz="914400" rtl="0" eaLnBrk="1" latinLnBrk="0" hangingPunct="1">
+              <a:defRPr sz="1800" kern="1200">
+                <a:solidFill>
+                  <a:schemeClr val="lt1"/>
+                </a:solidFill>
+                <a:latin typeface="+mn-lt"/>
+                <a:ea typeface="+mn-ea"/>
+                <a:cs typeface="+mn-cs"/>
+              </a:defRPr>
+            </a:lvl2pPr>
+            <a:lvl3pPr marL="914400" algn="l" defTabSz="914400" rtl="0" eaLnBrk="1" latinLnBrk="0" hangingPunct="1">
+              <a:defRPr sz="1800" kern="1200">
+                <a:solidFill>
+                  <a:schemeClr val="lt1"/>
+                </a:solidFill>
+                <a:latin typeface="+mn-lt"/>
+                <a:ea typeface="+mn-ea"/>
+                <a:cs typeface="+mn-cs"/>
+              </a:defRPr>
+            </a:lvl3pPr>
+            <a:lvl4pPr marL="1371600" algn="l" defTabSz="914400" rtl="0" eaLnBrk="1" latinLnBrk="0" hangingPunct="1">
+              <a:defRPr sz="1800" kern="1200">
+                <a:solidFill>
+                  <a:schemeClr val="lt1"/>
+                </a:solidFill>
+                <a:latin typeface="+mn-lt"/>
+                <a:ea typeface="+mn-ea"/>
+                <a:cs typeface="+mn-cs"/>
+              </a:defRPr>
+            </a:lvl4pPr>
+            <a:lvl5pPr marL="1828800" algn="l" defTabSz="914400" rtl="0" eaLnBrk="1" latinLnBrk="0" hangingPunct="1">
+              <a:defRPr sz="1800" kern="1200">
+                <a:solidFill>
+                  <a:schemeClr val="lt1"/>
+                </a:solidFill>
+                <a:latin typeface="+mn-lt"/>
+                <a:ea typeface="+mn-ea"/>
+                <a:cs typeface="+mn-cs"/>
+              </a:defRPr>
+            </a:lvl5pPr>
+            <a:lvl6pPr marL="2286000" algn="l" defTabSz="914400" rtl="0" eaLnBrk="1" latinLnBrk="0" hangingPunct="1">
+              <a:defRPr sz="1800" kern="1200">
+                <a:solidFill>
+                  <a:schemeClr val="lt1"/>
+                </a:solidFill>
+                <a:latin typeface="+mn-lt"/>
+                <a:ea typeface="+mn-ea"/>
+                <a:cs typeface="+mn-cs"/>
+              </a:defRPr>
+            </a:lvl6pPr>
+            <a:lvl7pPr marL="2743200" algn="l" defTabSz="914400" rtl="0" eaLnBrk="1" latinLnBrk="0" hangingPunct="1">
+              <a:defRPr sz="1800" kern="1200">
+                <a:solidFill>
+                  <a:schemeClr val="lt1"/>
+                </a:solidFill>
+                <a:latin typeface="+mn-lt"/>
+                <a:ea typeface="+mn-ea"/>
+                <a:cs typeface="+mn-cs"/>
+              </a:defRPr>
+            </a:lvl7pPr>
+            <a:lvl8pPr marL="3200400" algn="l" defTabSz="914400" rtl="0" eaLnBrk="1" latinLnBrk="0" hangingPunct="1">
+              <a:defRPr sz="1800" kern="1200">
+                <a:solidFill>
+                  <a:schemeClr val="lt1"/>
+                </a:solidFill>
+                <a:latin typeface="+mn-lt"/>
+                <a:ea typeface="+mn-ea"/>
+                <a:cs typeface="+mn-cs"/>
+              </a:defRPr>
+            </a:lvl8pPr>
+            <a:lvl9pPr marL="3657600" algn="l" defTabSz="914400" rtl="0" eaLnBrk="1" latinLnBrk="0" hangingPunct="1">
+              <a:defRPr sz="1800" kern="1200">
+                <a:solidFill>
+                  <a:schemeClr val="lt1"/>
+                </a:solidFill>
+                <a:latin typeface="+mn-lt"/>
+                <a:ea typeface="+mn-ea"/>
+                <a:cs typeface="+mn-cs"/>
+              </a:defRPr>
+            </a:lvl9pPr>
+          </a:lstStyle>
+          <a:p>
+            <a:pPr algn="ctr"/>
+            <a:endParaRPr lang="en-US"/>
+          </a:p>
+        </p:txBody>
+      </p:sp>
     </p:spTree>
   </p:cSld>
   <p:clrMapOvr>
@@ -10519,7 +11219,7 @@
             </p:spPr>
             <p:txBody>
               <a:bodyPr>
-                <a:normAutofit fontScale="77500" lnSpcReduction="20000"/>
+                <a:normAutofit fontScale="62500" lnSpcReduction="20000"/>
               </a:bodyPr>
               <a:lstStyle/>
               <a:p>
@@ -10812,29 +11512,59 @@
                   <a:buNone/>
                 </a:pPr>
                 <a:r>
+                  <a:rPr lang="en-US" dirty="0"/>
+                  <a:t>Differences: ”generic” tree search:</a:t>
+                </a:r>
+              </a:p>
+              <a:p>
+                <a:pPr lvl="1"/>
+                <a:r>
+                  <a:rPr lang="en-US" dirty="0"/>
+                  <a:t>Atomic states (variables are only used to create human readable labels or calculate heuristics)</a:t>
+                </a:r>
+              </a:p>
+              <a:p>
+                <a:pPr lvl="1"/>
+                <a:r>
+                  <a:rPr lang="en-US" dirty="0"/>
+                  <a:t>States are always complete assignments.</a:t>
+                </a:r>
+              </a:p>
+              <a:p>
+                <a:pPr lvl="1"/>
+                <a:r>
+                  <a:rPr lang="en-US" dirty="0"/>
+                  <a:t>Constrains are implicit in the transition function.</a:t>
+                </a:r>
+              </a:p>
+              <a:p>
+                <a:pPr marL="0" indent="0">
+                  <a:buNone/>
+                </a:pPr>
+                <a:r>
                   <a:rPr lang="en-US" sz="2000" dirty="0"/>
-                  <a:t>This makes the problem different from the “generic” tree search formulation where we have:</a:t>
+                  <a:t>Differences: Local search</a:t>
                 </a:r>
               </a:p>
               <a:p>
                 <a:pPr lvl="1"/>
                 <a:r>
                   <a:rPr lang="en-US" sz="1700" dirty="0"/>
-                  <a:t>Atomic states</a:t>
+                  <a:t>Factored representation to find local moves.</a:t>
                 </a:r>
               </a:p>
               <a:p>
                 <a:pPr lvl="1"/>
                 <a:r>
                   <a:rPr lang="en-US" sz="1700" dirty="0"/>
-                  <a:t>States are always compete assignments.</a:t>
+                  <a:t>Always complete assignments.</a:t>
                 </a:r>
               </a:p>
               <a:p>
                 <a:pPr lvl="1"/>
                 <a:r>
                   <a:rPr lang="en-US" sz="1700" dirty="0"/>
-                  <a:t>Constrains are implicit in the transition function.</a:t>
+                  <a:t>Constraints may not be met.</a:t>
                 </a:r>
               </a:p>
               <a:p>
@@ -10874,7 +11604,7 @@
               <a:blipFill>
                 <a:blip r:embed="rId3"/>
                 <a:stretch>
-                  <a:fillRect l="-378" t="-1884"/>
+                  <a:fillRect l="-76" t="-1304"/>
                 </a:stretch>
               </a:blipFill>
             </p:spPr>
@@ -11024,6 +11754,146 @@
               <a:rPr lang="en-US" sz="1400" b="1" dirty="0"/>
               <a:t>+ variables can have no value!</a:t>
             </a:r>
+          </a:p>
+        </p:txBody>
+      </p:sp>
+      <p:sp>
+        <p:nvSpPr>
+          <p:cNvPr id="5" name="Star: 5 Points 4">
+            <a:extLst>
+              <a:ext uri="{FF2B5EF4-FFF2-40B4-BE49-F238E27FC236}">
+                <a16:creationId xmlns:a16="http://schemas.microsoft.com/office/drawing/2014/main" id="{C991C4F9-0A76-FF1E-E481-8912EE1EE828}"/>
+              </a:ext>
+            </a:extLst>
+          </p:cNvPr>
+          <p:cNvSpPr/>
+          <p:nvPr/>
+        </p:nvSpPr>
+        <p:spPr>
+          <a:xfrm>
+            <a:off x="8763000" y="129075"/>
+            <a:ext cx="247650" cy="244474"/>
+          </a:xfrm>
+          <a:prstGeom prst="star5">
+            <a:avLst/>
+          </a:prstGeom>
+        </p:spPr>
+        <p:style>
+          <a:lnRef idx="2">
+            <a:schemeClr val="accent2">
+              <a:shade val="50000"/>
+            </a:schemeClr>
+          </a:lnRef>
+          <a:fillRef idx="1">
+            <a:schemeClr val="accent2"/>
+          </a:fillRef>
+          <a:effectRef idx="0">
+            <a:schemeClr val="accent2"/>
+          </a:effectRef>
+          <a:fontRef idx="minor">
+            <a:schemeClr val="lt1"/>
+          </a:fontRef>
+        </p:style>
+        <p:txBody>
+          <a:bodyPr rtlCol="0" anchor="ctr"/>
+          <a:lstStyle>
+            <a:defPPr>
+              <a:defRPr lang="en-US"/>
+            </a:defPPr>
+            <a:lvl1pPr marL="0" algn="l" defTabSz="914400" rtl="0" eaLnBrk="1" latinLnBrk="0" hangingPunct="1">
+              <a:defRPr sz="1800" kern="1200">
+                <a:solidFill>
+                  <a:schemeClr val="lt1"/>
+                </a:solidFill>
+                <a:latin typeface="+mn-lt"/>
+                <a:ea typeface="+mn-ea"/>
+                <a:cs typeface="+mn-cs"/>
+              </a:defRPr>
+            </a:lvl1pPr>
+            <a:lvl2pPr marL="457200" algn="l" defTabSz="914400" rtl="0" eaLnBrk="1" latinLnBrk="0" hangingPunct="1">
+              <a:defRPr sz="1800" kern="1200">
+                <a:solidFill>
+                  <a:schemeClr val="lt1"/>
+                </a:solidFill>
+                <a:latin typeface="+mn-lt"/>
+                <a:ea typeface="+mn-ea"/>
+                <a:cs typeface="+mn-cs"/>
+              </a:defRPr>
+            </a:lvl2pPr>
+            <a:lvl3pPr marL="914400" algn="l" defTabSz="914400" rtl="0" eaLnBrk="1" latinLnBrk="0" hangingPunct="1">
+              <a:defRPr sz="1800" kern="1200">
+                <a:solidFill>
+                  <a:schemeClr val="lt1"/>
+                </a:solidFill>
+                <a:latin typeface="+mn-lt"/>
+                <a:ea typeface="+mn-ea"/>
+                <a:cs typeface="+mn-cs"/>
+              </a:defRPr>
+            </a:lvl3pPr>
+            <a:lvl4pPr marL="1371600" algn="l" defTabSz="914400" rtl="0" eaLnBrk="1" latinLnBrk="0" hangingPunct="1">
+              <a:defRPr sz="1800" kern="1200">
+                <a:solidFill>
+                  <a:schemeClr val="lt1"/>
+                </a:solidFill>
+                <a:latin typeface="+mn-lt"/>
+                <a:ea typeface="+mn-ea"/>
+                <a:cs typeface="+mn-cs"/>
+              </a:defRPr>
+            </a:lvl4pPr>
+            <a:lvl5pPr marL="1828800" algn="l" defTabSz="914400" rtl="0" eaLnBrk="1" latinLnBrk="0" hangingPunct="1">
+              <a:defRPr sz="1800" kern="1200">
+                <a:solidFill>
+                  <a:schemeClr val="lt1"/>
+                </a:solidFill>
+                <a:latin typeface="+mn-lt"/>
+                <a:ea typeface="+mn-ea"/>
+                <a:cs typeface="+mn-cs"/>
+              </a:defRPr>
+            </a:lvl5pPr>
+            <a:lvl6pPr marL="2286000" algn="l" defTabSz="914400" rtl="0" eaLnBrk="1" latinLnBrk="0" hangingPunct="1">
+              <a:defRPr sz="1800" kern="1200">
+                <a:solidFill>
+                  <a:schemeClr val="lt1"/>
+                </a:solidFill>
+                <a:latin typeface="+mn-lt"/>
+                <a:ea typeface="+mn-ea"/>
+                <a:cs typeface="+mn-cs"/>
+              </a:defRPr>
+            </a:lvl6pPr>
+            <a:lvl7pPr marL="2743200" algn="l" defTabSz="914400" rtl="0" eaLnBrk="1" latinLnBrk="0" hangingPunct="1">
+              <a:defRPr sz="1800" kern="1200">
+                <a:solidFill>
+                  <a:schemeClr val="lt1"/>
+                </a:solidFill>
+                <a:latin typeface="+mn-lt"/>
+                <a:ea typeface="+mn-ea"/>
+                <a:cs typeface="+mn-cs"/>
+              </a:defRPr>
+            </a:lvl7pPr>
+            <a:lvl8pPr marL="3200400" algn="l" defTabSz="914400" rtl="0" eaLnBrk="1" latinLnBrk="0" hangingPunct="1">
+              <a:defRPr sz="1800" kern="1200">
+                <a:solidFill>
+                  <a:schemeClr val="lt1"/>
+                </a:solidFill>
+                <a:latin typeface="+mn-lt"/>
+                <a:ea typeface="+mn-ea"/>
+                <a:cs typeface="+mn-cs"/>
+              </a:defRPr>
+            </a:lvl8pPr>
+            <a:lvl9pPr marL="3657600" algn="l" defTabSz="914400" rtl="0" eaLnBrk="1" latinLnBrk="0" hangingPunct="1">
+              <a:defRPr sz="1800" kern="1200">
+                <a:solidFill>
+                  <a:schemeClr val="lt1"/>
+                </a:solidFill>
+                <a:latin typeface="+mn-lt"/>
+                <a:ea typeface="+mn-ea"/>
+                <a:cs typeface="+mn-cs"/>
+              </a:defRPr>
+            </a:lvl9pPr>
+          </a:lstStyle>
+          <a:p>
+            <a:pPr algn="ctr"/>
+            <a:endParaRPr lang="en-US"/>
           </a:p>
         </p:txBody>
       </p:sp>
@@ -11445,7 +12315,149 @@
                                         <p:tgtEl>
                                           <p:spTgt spid="5123">
                                             <p:txEl>
+                                              <p:pRg st="14" end="14"/>
+                                            </p:txEl>
+                                          </p:spTgt>
+                                        </p:tgtEl>
+                                        <p:attrNameLst>
+                                          <p:attrName>style.visibility</p:attrName>
+                                        </p:attrNameLst>
+                                      </p:cBhvr>
+                                      <p:to>
+                                        <p:strVal val="visible"/>
+                                      </p:to>
+                                    </p:set>
+                                  </p:childTnLst>
+                                </p:cTn>
+                              </p:par>
+                              <p:par>
+                                <p:cTn id="33" presetID="1" presetClass="entr" presetSubtype="0" fill="hold" grpId="0" nodeType="withEffect">
+                                  <p:stCondLst>
+                                    <p:cond delay="0"/>
+                                  </p:stCondLst>
+                                  <p:childTnLst>
+                                    <p:set>
+                                      <p:cBhvr>
+                                        <p:cTn id="34" dur="1" fill="hold">
+                                          <p:stCondLst>
+                                            <p:cond delay="0"/>
+                                          </p:stCondLst>
+                                        </p:cTn>
+                                        <p:tgtEl>
+                                          <p:spTgt spid="5123">
+                                            <p:txEl>
                                               <p:pRg st="15" end="15"/>
+                                            </p:txEl>
+                                          </p:spTgt>
+                                        </p:tgtEl>
+                                        <p:attrNameLst>
+                                          <p:attrName>style.visibility</p:attrName>
+                                        </p:attrNameLst>
+                                      </p:cBhvr>
+                                      <p:to>
+                                        <p:strVal val="visible"/>
+                                      </p:to>
+                                    </p:set>
+                                  </p:childTnLst>
+                                </p:cTn>
+                              </p:par>
+                              <p:par>
+                                <p:cTn id="35" presetID="1" presetClass="entr" presetSubtype="0" fill="hold" grpId="0" nodeType="withEffect">
+                                  <p:stCondLst>
+                                    <p:cond delay="0"/>
+                                  </p:stCondLst>
+                                  <p:childTnLst>
+                                    <p:set>
+                                      <p:cBhvr>
+                                        <p:cTn id="36" dur="1" fill="hold">
+                                          <p:stCondLst>
+                                            <p:cond delay="0"/>
+                                          </p:stCondLst>
+                                        </p:cTn>
+                                        <p:tgtEl>
+                                          <p:spTgt spid="5123">
+                                            <p:txEl>
+                                              <p:pRg st="16" end="16"/>
+                                            </p:txEl>
+                                          </p:spTgt>
+                                        </p:tgtEl>
+                                        <p:attrNameLst>
+                                          <p:attrName>style.visibility</p:attrName>
+                                        </p:attrNameLst>
+                                      </p:cBhvr>
+                                      <p:to>
+                                        <p:strVal val="visible"/>
+                                      </p:to>
+                                    </p:set>
+                                  </p:childTnLst>
+                                </p:cTn>
+                              </p:par>
+                              <p:par>
+                                <p:cTn id="37" presetID="1" presetClass="entr" presetSubtype="0" fill="hold" grpId="0" nodeType="withEffect">
+                                  <p:stCondLst>
+                                    <p:cond delay="0"/>
+                                  </p:stCondLst>
+                                  <p:childTnLst>
+                                    <p:set>
+                                      <p:cBhvr>
+                                        <p:cTn id="38" dur="1" fill="hold">
+                                          <p:stCondLst>
+                                            <p:cond delay="0"/>
+                                          </p:stCondLst>
+                                        </p:cTn>
+                                        <p:tgtEl>
+                                          <p:spTgt spid="5123">
+                                            <p:txEl>
+                                              <p:pRg st="17" end="17"/>
+                                            </p:txEl>
+                                          </p:spTgt>
+                                        </p:tgtEl>
+                                        <p:attrNameLst>
+                                          <p:attrName>style.visibility</p:attrName>
+                                        </p:attrNameLst>
+                                      </p:cBhvr>
+                                      <p:to>
+                                        <p:strVal val="visible"/>
+                                      </p:to>
+                                    </p:set>
+                                  </p:childTnLst>
+                                </p:cTn>
+                              </p:par>
+                            </p:childTnLst>
+                          </p:cTn>
+                        </p:par>
+                      </p:childTnLst>
+                    </p:cTn>
+                  </p:par>
+                  <p:par>
+                    <p:cTn id="39" fill="hold">
+                      <p:stCondLst>
+                        <p:cond delay="indefinite"/>
+                      </p:stCondLst>
+                      <p:childTnLst>
+                        <p:par>
+                          <p:cTn id="40" fill="hold">
+                            <p:stCondLst>
+                              <p:cond delay="0"/>
+                            </p:stCondLst>
+                            <p:childTnLst>
+                              <p:par>
+                                <p:cTn id="41" presetID="1" presetClass="entr" presetSubtype="0" fill="hold" grpId="0" nodeType="clickEffect">
+                                  <p:stCondLst>
+                                    <p:cond delay="0"/>
+                                  </p:stCondLst>
+                                  <p:childTnLst>
+                                    <p:set>
+                                      <p:cBhvr>
+                                        <p:cTn id="42" dur="1" fill="hold">
+                                          <p:stCondLst>
+                                            <p:cond delay="0"/>
+                                          </p:stCondLst>
+                                        </p:cTn>
+                                        <p:tgtEl>
+                                          <p:spTgt spid="5123">
+                                            <p:txEl>
+                                              <p:pRg st="19" end="19"/>
                                             </p:txEl>
                                           </p:spTgt>
                                         </p:tgtEl>
@@ -11673,6 +12685,146 @@
               <a:rPr lang="en-US" sz="2400" b="1" dirty="0"/>
               <a:t>min-conflicts heuristic.</a:t>
             </a:r>
+          </a:p>
+        </p:txBody>
+      </p:sp>
+      <p:sp>
+        <p:nvSpPr>
+          <p:cNvPr id="2" name="Star: 5 Points 1">
+            <a:extLst>
+              <a:ext uri="{FF2B5EF4-FFF2-40B4-BE49-F238E27FC236}">
+                <a16:creationId xmlns:a16="http://schemas.microsoft.com/office/drawing/2014/main" id="{4253AC54-64CB-030B-E1AA-4122F4E510B1}"/>
+              </a:ext>
+            </a:extLst>
+          </p:cNvPr>
+          <p:cNvSpPr/>
+          <p:nvPr/>
+        </p:nvSpPr>
+        <p:spPr>
+          <a:xfrm>
+            <a:off x="8763000" y="129075"/>
+            <a:ext cx="247650" cy="244474"/>
+          </a:xfrm>
+          <a:prstGeom prst="star5">
+            <a:avLst/>
+          </a:prstGeom>
+        </p:spPr>
+        <p:style>
+          <a:lnRef idx="2">
+            <a:schemeClr val="accent2">
+              <a:shade val="50000"/>
+            </a:schemeClr>
+          </a:lnRef>
+          <a:fillRef idx="1">
+            <a:schemeClr val="accent2"/>
+          </a:fillRef>
+          <a:effectRef idx="0">
+            <a:schemeClr val="accent2"/>
+          </a:effectRef>
+          <a:fontRef idx="minor">
+            <a:schemeClr val="lt1"/>
+          </a:fontRef>
+        </p:style>
+        <p:txBody>
+          <a:bodyPr rtlCol="0" anchor="ctr"/>
+          <a:lstStyle>
+            <a:defPPr>
+              <a:defRPr lang="en-US"/>
+            </a:defPPr>
+            <a:lvl1pPr marL="0" algn="l" defTabSz="914400" rtl="0" eaLnBrk="1" latinLnBrk="0" hangingPunct="1">
+              <a:defRPr sz="1800" kern="1200">
+                <a:solidFill>
+                  <a:schemeClr val="lt1"/>
+                </a:solidFill>
+                <a:latin typeface="+mn-lt"/>
+                <a:ea typeface="+mn-ea"/>
+                <a:cs typeface="+mn-cs"/>
+              </a:defRPr>
+            </a:lvl1pPr>
+            <a:lvl2pPr marL="457200" algn="l" defTabSz="914400" rtl="0" eaLnBrk="1" latinLnBrk="0" hangingPunct="1">
+              <a:defRPr sz="1800" kern="1200">
+                <a:solidFill>
+                  <a:schemeClr val="lt1"/>
+                </a:solidFill>
+                <a:latin typeface="+mn-lt"/>
+                <a:ea typeface="+mn-ea"/>
+                <a:cs typeface="+mn-cs"/>
+              </a:defRPr>
+            </a:lvl2pPr>
+            <a:lvl3pPr marL="914400" algn="l" defTabSz="914400" rtl="0" eaLnBrk="1" latinLnBrk="0" hangingPunct="1">
+              <a:defRPr sz="1800" kern="1200">
+                <a:solidFill>
+                  <a:schemeClr val="lt1"/>
+                </a:solidFill>
+                <a:latin typeface="+mn-lt"/>
+                <a:ea typeface="+mn-ea"/>
+                <a:cs typeface="+mn-cs"/>
+              </a:defRPr>
+            </a:lvl3pPr>
+            <a:lvl4pPr marL="1371600" algn="l" defTabSz="914400" rtl="0" eaLnBrk="1" latinLnBrk="0" hangingPunct="1">
+              <a:defRPr sz="1800" kern="1200">
+                <a:solidFill>
+                  <a:schemeClr val="lt1"/>
+                </a:solidFill>
+                <a:latin typeface="+mn-lt"/>
+                <a:ea typeface="+mn-ea"/>
+                <a:cs typeface="+mn-cs"/>
+              </a:defRPr>
+            </a:lvl4pPr>
+            <a:lvl5pPr marL="1828800" algn="l" defTabSz="914400" rtl="0" eaLnBrk="1" latinLnBrk="0" hangingPunct="1">
+              <a:defRPr sz="1800" kern="1200">
+                <a:solidFill>
+                  <a:schemeClr val="lt1"/>
+                </a:solidFill>
+                <a:latin typeface="+mn-lt"/>
+                <a:ea typeface="+mn-ea"/>
+                <a:cs typeface="+mn-cs"/>
+              </a:defRPr>
+            </a:lvl5pPr>
+            <a:lvl6pPr marL="2286000" algn="l" defTabSz="914400" rtl="0" eaLnBrk="1" latinLnBrk="0" hangingPunct="1">
+              <a:defRPr sz="1800" kern="1200">
+                <a:solidFill>
+                  <a:schemeClr val="lt1"/>
+                </a:solidFill>
+                <a:latin typeface="+mn-lt"/>
+                <a:ea typeface="+mn-ea"/>
+                <a:cs typeface="+mn-cs"/>
+              </a:defRPr>
+            </a:lvl6pPr>
+            <a:lvl7pPr marL="2743200" algn="l" defTabSz="914400" rtl="0" eaLnBrk="1" latinLnBrk="0" hangingPunct="1">
+              <a:defRPr sz="1800" kern="1200">
+                <a:solidFill>
+                  <a:schemeClr val="lt1"/>
+                </a:solidFill>
+                <a:latin typeface="+mn-lt"/>
+                <a:ea typeface="+mn-ea"/>
+                <a:cs typeface="+mn-cs"/>
+              </a:defRPr>
+            </a:lvl7pPr>
+            <a:lvl8pPr marL="3200400" algn="l" defTabSz="914400" rtl="0" eaLnBrk="1" latinLnBrk="0" hangingPunct="1">
+              <a:defRPr sz="1800" kern="1200">
+                <a:solidFill>
+                  <a:schemeClr val="lt1"/>
+                </a:solidFill>
+                <a:latin typeface="+mn-lt"/>
+                <a:ea typeface="+mn-ea"/>
+                <a:cs typeface="+mn-cs"/>
+              </a:defRPr>
+            </a:lvl8pPr>
+            <a:lvl9pPr marL="3657600" algn="l" defTabSz="914400" rtl="0" eaLnBrk="1" latinLnBrk="0" hangingPunct="1">
+              <a:defRPr sz="1800" kern="1200">
+                <a:solidFill>
+                  <a:schemeClr val="lt1"/>
+                </a:solidFill>
+                <a:latin typeface="+mn-lt"/>
+                <a:ea typeface="+mn-ea"/>
+                <a:cs typeface="+mn-cs"/>
+              </a:defRPr>
+            </a:lvl9pPr>
+          </a:lstStyle>
+          <a:p>
+            <a:pPr algn="ctr"/>
+            <a:endParaRPr lang="en-US"/>
           </a:p>
         </p:txBody>
       </p:sp>
@@ -12190,6 +13342,146 @@
           </a:p>
         </p:txBody>
       </p:sp>
+      <p:sp>
+        <p:nvSpPr>
+          <p:cNvPr id="6" name="Star: 5 Points 5">
+            <a:extLst>
+              <a:ext uri="{FF2B5EF4-FFF2-40B4-BE49-F238E27FC236}">
+                <a16:creationId xmlns:a16="http://schemas.microsoft.com/office/drawing/2014/main" id="{2E676863-1099-D3A2-F35F-7B3CB0A7944F}"/>
+              </a:ext>
+            </a:extLst>
+          </p:cNvPr>
+          <p:cNvSpPr/>
+          <p:nvPr/>
+        </p:nvSpPr>
+        <p:spPr>
+          <a:xfrm>
+            <a:off x="8763000" y="129075"/>
+            <a:ext cx="247650" cy="244474"/>
+          </a:xfrm>
+          <a:prstGeom prst="star5">
+            <a:avLst/>
+          </a:prstGeom>
+        </p:spPr>
+        <p:style>
+          <a:lnRef idx="2">
+            <a:schemeClr val="accent2">
+              <a:shade val="50000"/>
+            </a:schemeClr>
+          </a:lnRef>
+          <a:fillRef idx="1">
+            <a:schemeClr val="accent2"/>
+          </a:fillRef>
+          <a:effectRef idx="0">
+            <a:schemeClr val="accent2"/>
+          </a:effectRef>
+          <a:fontRef idx="minor">
+            <a:schemeClr val="lt1"/>
+          </a:fontRef>
+        </p:style>
+        <p:txBody>
+          <a:bodyPr rtlCol="0" anchor="ctr"/>
+          <a:lstStyle>
+            <a:defPPr>
+              <a:defRPr lang="en-US"/>
+            </a:defPPr>
+            <a:lvl1pPr marL="0" algn="l" defTabSz="914400" rtl="0" eaLnBrk="1" latinLnBrk="0" hangingPunct="1">
+              <a:defRPr sz="1800" kern="1200">
+                <a:solidFill>
+                  <a:schemeClr val="lt1"/>
+                </a:solidFill>
+                <a:latin typeface="+mn-lt"/>
+                <a:ea typeface="+mn-ea"/>
+                <a:cs typeface="+mn-cs"/>
+              </a:defRPr>
+            </a:lvl1pPr>
+            <a:lvl2pPr marL="457200" algn="l" defTabSz="914400" rtl="0" eaLnBrk="1" latinLnBrk="0" hangingPunct="1">
+              <a:defRPr sz="1800" kern="1200">
+                <a:solidFill>
+                  <a:schemeClr val="lt1"/>
+                </a:solidFill>
+                <a:latin typeface="+mn-lt"/>
+                <a:ea typeface="+mn-ea"/>
+                <a:cs typeface="+mn-cs"/>
+              </a:defRPr>
+            </a:lvl2pPr>
+            <a:lvl3pPr marL="914400" algn="l" defTabSz="914400" rtl="0" eaLnBrk="1" latinLnBrk="0" hangingPunct="1">
+              <a:defRPr sz="1800" kern="1200">
+                <a:solidFill>
+                  <a:schemeClr val="lt1"/>
+                </a:solidFill>
+                <a:latin typeface="+mn-lt"/>
+                <a:ea typeface="+mn-ea"/>
+                <a:cs typeface="+mn-cs"/>
+              </a:defRPr>
+            </a:lvl3pPr>
+            <a:lvl4pPr marL="1371600" algn="l" defTabSz="914400" rtl="0" eaLnBrk="1" latinLnBrk="0" hangingPunct="1">
+              <a:defRPr sz="1800" kern="1200">
+                <a:solidFill>
+                  <a:schemeClr val="lt1"/>
+                </a:solidFill>
+                <a:latin typeface="+mn-lt"/>
+                <a:ea typeface="+mn-ea"/>
+                <a:cs typeface="+mn-cs"/>
+              </a:defRPr>
+            </a:lvl4pPr>
+            <a:lvl5pPr marL="1828800" algn="l" defTabSz="914400" rtl="0" eaLnBrk="1" latinLnBrk="0" hangingPunct="1">
+              <a:defRPr sz="1800" kern="1200">
+                <a:solidFill>
+                  <a:schemeClr val="lt1"/>
+                </a:solidFill>
+                <a:latin typeface="+mn-lt"/>
+                <a:ea typeface="+mn-ea"/>
+                <a:cs typeface="+mn-cs"/>
+              </a:defRPr>
+            </a:lvl5pPr>
+            <a:lvl6pPr marL="2286000" algn="l" defTabSz="914400" rtl="0" eaLnBrk="1" latinLnBrk="0" hangingPunct="1">
+              <a:defRPr sz="1800" kern="1200">
+                <a:solidFill>
+                  <a:schemeClr val="lt1"/>
+                </a:solidFill>
+                <a:latin typeface="+mn-lt"/>
+                <a:ea typeface="+mn-ea"/>
+                <a:cs typeface="+mn-cs"/>
+              </a:defRPr>
+            </a:lvl6pPr>
+            <a:lvl7pPr marL="2743200" algn="l" defTabSz="914400" rtl="0" eaLnBrk="1" latinLnBrk="0" hangingPunct="1">
+              <a:defRPr sz="1800" kern="1200">
+                <a:solidFill>
+                  <a:schemeClr val="lt1"/>
+                </a:solidFill>
+                <a:latin typeface="+mn-lt"/>
+                <a:ea typeface="+mn-ea"/>
+                <a:cs typeface="+mn-cs"/>
+              </a:defRPr>
+            </a:lvl7pPr>
+            <a:lvl8pPr marL="3200400" algn="l" defTabSz="914400" rtl="0" eaLnBrk="1" latinLnBrk="0" hangingPunct="1">
+              <a:defRPr sz="1800" kern="1200">
+                <a:solidFill>
+                  <a:schemeClr val="lt1"/>
+                </a:solidFill>
+                <a:latin typeface="+mn-lt"/>
+                <a:ea typeface="+mn-ea"/>
+                <a:cs typeface="+mn-cs"/>
+              </a:defRPr>
+            </a:lvl8pPr>
+            <a:lvl9pPr marL="3657600" algn="l" defTabSz="914400" rtl="0" eaLnBrk="1" latinLnBrk="0" hangingPunct="1">
+              <a:defRPr sz="1800" kern="1200">
+                <a:solidFill>
+                  <a:schemeClr val="lt1"/>
+                </a:solidFill>
+                <a:latin typeface="+mn-lt"/>
+                <a:ea typeface="+mn-ea"/>
+                <a:cs typeface="+mn-cs"/>
+              </a:defRPr>
+            </a:lvl9pPr>
+          </a:lstStyle>
+          <a:p>
+            <a:pPr algn="ctr"/>
+            <a:endParaRPr lang="en-US"/>
+          </a:p>
+        </p:txBody>
+      </p:sp>
     </p:spTree>
   </p:cSld>
   <p:clrMapOvr>
@@ -12607,6 +13899,146 @@
           <a:noFill/>
         </p:spPr>
       </p:pic>
+      <p:sp>
+        <p:nvSpPr>
+          <p:cNvPr id="2" name="Star: 5 Points 1">
+            <a:extLst>
+              <a:ext uri="{FF2B5EF4-FFF2-40B4-BE49-F238E27FC236}">
+                <a16:creationId xmlns:a16="http://schemas.microsoft.com/office/drawing/2014/main" id="{68E8705D-1DAA-D270-F375-6A59E241780D}"/>
+              </a:ext>
+            </a:extLst>
+          </p:cNvPr>
+          <p:cNvSpPr/>
+          <p:nvPr/>
+        </p:nvSpPr>
+        <p:spPr>
+          <a:xfrm>
+            <a:off x="8763000" y="129075"/>
+            <a:ext cx="247650" cy="244474"/>
+          </a:xfrm>
+          <a:prstGeom prst="star5">
+            <a:avLst/>
+          </a:prstGeom>
+        </p:spPr>
+        <p:style>
+          <a:lnRef idx="2">
+            <a:schemeClr val="accent2">
+              <a:shade val="50000"/>
+            </a:schemeClr>
+          </a:lnRef>
+          <a:fillRef idx="1">
+            <a:schemeClr val="accent2"/>
+          </a:fillRef>
+          <a:effectRef idx="0">
+            <a:schemeClr val="accent2"/>
+          </a:effectRef>
+          <a:fontRef idx="minor">
+            <a:schemeClr val="lt1"/>
+          </a:fontRef>
+        </p:style>
+        <p:txBody>
+          <a:bodyPr rtlCol="0" anchor="ctr"/>
+          <a:lstStyle>
+            <a:defPPr>
+              <a:defRPr lang="en-US"/>
+            </a:defPPr>
+            <a:lvl1pPr marL="0" algn="l" defTabSz="914400" rtl="0" eaLnBrk="1" latinLnBrk="0" hangingPunct="1">
+              <a:defRPr sz="1800" kern="1200">
+                <a:solidFill>
+                  <a:schemeClr val="lt1"/>
+                </a:solidFill>
+                <a:latin typeface="+mn-lt"/>
+                <a:ea typeface="+mn-ea"/>
+                <a:cs typeface="+mn-cs"/>
+              </a:defRPr>
+            </a:lvl1pPr>
+            <a:lvl2pPr marL="457200" algn="l" defTabSz="914400" rtl="0" eaLnBrk="1" latinLnBrk="0" hangingPunct="1">
+              <a:defRPr sz="1800" kern="1200">
+                <a:solidFill>
+                  <a:schemeClr val="lt1"/>
+                </a:solidFill>
+                <a:latin typeface="+mn-lt"/>
+                <a:ea typeface="+mn-ea"/>
+                <a:cs typeface="+mn-cs"/>
+              </a:defRPr>
+            </a:lvl2pPr>
+            <a:lvl3pPr marL="914400" algn="l" defTabSz="914400" rtl="0" eaLnBrk="1" latinLnBrk="0" hangingPunct="1">
+              <a:defRPr sz="1800" kern="1200">
+                <a:solidFill>
+                  <a:schemeClr val="lt1"/>
+                </a:solidFill>
+                <a:latin typeface="+mn-lt"/>
+                <a:ea typeface="+mn-ea"/>
+                <a:cs typeface="+mn-cs"/>
+              </a:defRPr>
+            </a:lvl3pPr>
+            <a:lvl4pPr marL="1371600" algn="l" defTabSz="914400" rtl="0" eaLnBrk="1" latinLnBrk="0" hangingPunct="1">
+              <a:defRPr sz="1800" kern="1200">
+                <a:solidFill>
+                  <a:schemeClr val="lt1"/>
+                </a:solidFill>
+                <a:latin typeface="+mn-lt"/>
+                <a:ea typeface="+mn-ea"/>
+                <a:cs typeface="+mn-cs"/>
+              </a:defRPr>
+            </a:lvl4pPr>
+            <a:lvl5pPr marL="1828800" algn="l" defTabSz="914400" rtl="0" eaLnBrk="1" latinLnBrk="0" hangingPunct="1">
+              <a:defRPr sz="1800" kern="1200">
+                <a:solidFill>
+                  <a:schemeClr val="lt1"/>
+                </a:solidFill>
+                <a:latin typeface="+mn-lt"/>
+                <a:ea typeface="+mn-ea"/>
+                <a:cs typeface="+mn-cs"/>
+              </a:defRPr>
+            </a:lvl5pPr>
+            <a:lvl6pPr marL="2286000" algn="l" defTabSz="914400" rtl="0" eaLnBrk="1" latinLnBrk="0" hangingPunct="1">
+              <a:defRPr sz="1800" kern="1200">
+                <a:solidFill>
+                  <a:schemeClr val="lt1"/>
+                </a:solidFill>
+                <a:latin typeface="+mn-lt"/>
+                <a:ea typeface="+mn-ea"/>
+                <a:cs typeface="+mn-cs"/>
+              </a:defRPr>
+            </a:lvl6pPr>
+            <a:lvl7pPr marL="2743200" algn="l" defTabSz="914400" rtl="0" eaLnBrk="1" latinLnBrk="0" hangingPunct="1">
+              <a:defRPr sz="1800" kern="1200">
+                <a:solidFill>
+                  <a:schemeClr val="lt1"/>
+                </a:solidFill>
+                <a:latin typeface="+mn-lt"/>
+                <a:ea typeface="+mn-ea"/>
+                <a:cs typeface="+mn-cs"/>
+              </a:defRPr>
+            </a:lvl7pPr>
+            <a:lvl8pPr marL="3200400" algn="l" defTabSz="914400" rtl="0" eaLnBrk="1" latinLnBrk="0" hangingPunct="1">
+              <a:defRPr sz="1800" kern="1200">
+                <a:solidFill>
+                  <a:schemeClr val="lt1"/>
+                </a:solidFill>
+                <a:latin typeface="+mn-lt"/>
+                <a:ea typeface="+mn-ea"/>
+                <a:cs typeface="+mn-cs"/>
+              </a:defRPr>
+            </a:lvl8pPr>
+            <a:lvl9pPr marL="3657600" algn="l" defTabSz="914400" rtl="0" eaLnBrk="1" latinLnBrk="0" hangingPunct="1">
+              <a:defRPr sz="1800" kern="1200">
+                <a:solidFill>
+                  <a:schemeClr val="lt1"/>
+                </a:solidFill>
+                <a:latin typeface="+mn-lt"/>
+                <a:ea typeface="+mn-ea"/>
+                <a:cs typeface="+mn-cs"/>
+              </a:defRPr>
+            </a:lvl9pPr>
+          </a:lstStyle>
+          <a:p>
+            <a:pPr algn="ctr"/>
+            <a:endParaRPr lang="en-US"/>
+          </a:p>
+        </p:txBody>
+      </p:sp>
     </p:spTree>
   </p:cSld>
   <p:clrMapOvr>
@@ -13550,6 +14982,146 @@
           </p:sp>
         </mc:Fallback>
       </mc:AlternateContent>
+      <p:sp>
+        <p:nvSpPr>
+          <p:cNvPr id="9" name="Star: 5 Points 8">
+            <a:extLst>
+              <a:ext uri="{FF2B5EF4-FFF2-40B4-BE49-F238E27FC236}">
+                <a16:creationId xmlns:a16="http://schemas.microsoft.com/office/drawing/2014/main" id="{241E6494-3CB8-711B-835B-5CE26D06FB32}"/>
+              </a:ext>
+            </a:extLst>
+          </p:cNvPr>
+          <p:cNvSpPr/>
+          <p:nvPr/>
+        </p:nvSpPr>
+        <p:spPr>
+          <a:xfrm>
+            <a:off x="8763000" y="129075"/>
+            <a:ext cx="247650" cy="244474"/>
+          </a:xfrm>
+          <a:prstGeom prst="star5">
+            <a:avLst/>
+          </a:prstGeom>
+        </p:spPr>
+        <p:style>
+          <a:lnRef idx="2">
+            <a:schemeClr val="accent2">
+              <a:shade val="50000"/>
+            </a:schemeClr>
+          </a:lnRef>
+          <a:fillRef idx="1">
+            <a:schemeClr val="accent2"/>
+          </a:fillRef>
+          <a:effectRef idx="0">
+            <a:schemeClr val="accent2"/>
+          </a:effectRef>
+          <a:fontRef idx="minor">
+            <a:schemeClr val="lt1"/>
+          </a:fontRef>
+        </p:style>
+        <p:txBody>
+          <a:bodyPr rtlCol="0" anchor="ctr"/>
+          <a:lstStyle>
+            <a:defPPr>
+              <a:defRPr lang="en-US"/>
+            </a:defPPr>
+            <a:lvl1pPr marL="0" algn="l" defTabSz="914400" rtl="0" eaLnBrk="1" latinLnBrk="0" hangingPunct="1">
+              <a:defRPr sz="1800" kern="1200">
+                <a:solidFill>
+                  <a:schemeClr val="lt1"/>
+                </a:solidFill>
+                <a:latin typeface="+mn-lt"/>
+                <a:ea typeface="+mn-ea"/>
+                <a:cs typeface="+mn-cs"/>
+              </a:defRPr>
+            </a:lvl1pPr>
+            <a:lvl2pPr marL="457200" algn="l" defTabSz="914400" rtl="0" eaLnBrk="1" latinLnBrk="0" hangingPunct="1">
+              <a:defRPr sz="1800" kern="1200">
+                <a:solidFill>
+                  <a:schemeClr val="lt1"/>
+                </a:solidFill>
+                <a:latin typeface="+mn-lt"/>
+                <a:ea typeface="+mn-ea"/>
+                <a:cs typeface="+mn-cs"/>
+              </a:defRPr>
+            </a:lvl2pPr>
+            <a:lvl3pPr marL="914400" algn="l" defTabSz="914400" rtl="0" eaLnBrk="1" latinLnBrk="0" hangingPunct="1">
+              <a:defRPr sz="1800" kern="1200">
+                <a:solidFill>
+                  <a:schemeClr val="lt1"/>
+                </a:solidFill>
+                <a:latin typeface="+mn-lt"/>
+                <a:ea typeface="+mn-ea"/>
+                <a:cs typeface="+mn-cs"/>
+              </a:defRPr>
+            </a:lvl3pPr>
+            <a:lvl4pPr marL="1371600" algn="l" defTabSz="914400" rtl="0" eaLnBrk="1" latinLnBrk="0" hangingPunct="1">
+              <a:defRPr sz="1800" kern="1200">
+                <a:solidFill>
+                  <a:schemeClr val="lt1"/>
+                </a:solidFill>
+                <a:latin typeface="+mn-lt"/>
+                <a:ea typeface="+mn-ea"/>
+                <a:cs typeface="+mn-cs"/>
+              </a:defRPr>
+            </a:lvl4pPr>
+            <a:lvl5pPr marL="1828800" algn="l" defTabSz="914400" rtl="0" eaLnBrk="1" latinLnBrk="0" hangingPunct="1">
+              <a:defRPr sz="1800" kern="1200">
+                <a:solidFill>
+                  <a:schemeClr val="lt1"/>
+                </a:solidFill>
+                <a:latin typeface="+mn-lt"/>
+                <a:ea typeface="+mn-ea"/>
+                <a:cs typeface="+mn-cs"/>
+              </a:defRPr>
+            </a:lvl5pPr>
+            <a:lvl6pPr marL="2286000" algn="l" defTabSz="914400" rtl="0" eaLnBrk="1" latinLnBrk="0" hangingPunct="1">
+              <a:defRPr sz="1800" kern="1200">
+                <a:solidFill>
+                  <a:schemeClr val="lt1"/>
+                </a:solidFill>
+                <a:latin typeface="+mn-lt"/>
+                <a:ea typeface="+mn-ea"/>
+                <a:cs typeface="+mn-cs"/>
+              </a:defRPr>
+            </a:lvl6pPr>
+            <a:lvl7pPr marL="2743200" algn="l" defTabSz="914400" rtl="0" eaLnBrk="1" latinLnBrk="0" hangingPunct="1">
+              <a:defRPr sz="1800" kern="1200">
+                <a:solidFill>
+                  <a:schemeClr val="lt1"/>
+                </a:solidFill>
+                <a:latin typeface="+mn-lt"/>
+                <a:ea typeface="+mn-ea"/>
+                <a:cs typeface="+mn-cs"/>
+              </a:defRPr>
+            </a:lvl7pPr>
+            <a:lvl8pPr marL="3200400" algn="l" defTabSz="914400" rtl="0" eaLnBrk="1" latinLnBrk="0" hangingPunct="1">
+              <a:defRPr sz="1800" kern="1200">
+                <a:solidFill>
+                  <a:schemeClr val="lt1"/>
+                </a:solidFill>
+                <a:latin typeface="+mn-lt"/>
+                <a:ea typeface="+mn-ea"/>
+                <a:cs typeface="+mn-cs"/>
+              </a:defRPr>
+            </a:lvl8pPr>
+            <a:lvl9pPr marL="3657600" algn="l" defTabSz="914400" rtl="0" eaLnBrk="1" latinLnBrk="0" hangingPunct="1">
+              <a:defRPr sz="1800" kern="1200">
+                <a:solidFill>
+                  <a:schemeClr val="lt1"/>
+                </a:solidFill>
+                <a:latin typeface="+mn-lt"/>
+                <a:ea typeface="+mn-ea"/>
+                <a:cs typeface="+mn-cs"/>
+              </a:defRPr>
+            </a:lvl9pPr>
+          </a:lstStyle>
+          <a:p>
+            <a:pPr algn="ctr"/>
+            <a:endParaRPr lang="en-US"/>
+          </a:p>
+        </p:txBody>
+      </p:sp>
     </p:spTree>
   </p:cSld>
   <p:clrMapOvr>
@@ -14599,6 +16171,146 @@
               </a:rPr>
               <a:t>1</a:t>
             </a:r>
+          </a:p>
+        </p:txBody>
+      </p:sp>
+      <p:sp>
+        <p:nvSpPr>
+          <p:cNvPr id="9" name="Star: 5 Points 8">
+            <a:extLst>
+              <a:ext uri="{FF2B5EF4-FFF2-40B4-BE49-F238E27FC236}">
+                <a16:creationId xmlns:a16="http://schemas.microsoft.com/office/drawing/2014/main" id="{7DFC03D8-788A-CB85-C262-95AE0C52408A}"/>
+              </a:ext>
+            </a:extLst>
+          </p:cNvPr>
+          <p:cNvSpPr/>
+          <p:nvPr/>
+        </p:nvSpPr>
+        <p:spPr>
+          <a:xfrm>
+            <a:off x="8763000" y="129075"/>
+            <a:ext cx="247650" cy="244474"/>
+          </a:xfrm>
+          <a:prstGeom prst="star5">
+            <a:avLst/>
+          </a:prstGeom>
+        </p:spPr>
+        <p:style>
+          <a:lnRef idx="2">
+            <a:schemeClr val="accent2">
+              <a:shade val="50000"/>
+            </a:schemeClr>
+          </a:lnRef>
+          <a:fillRef idx="1">
+            <a:schemeClr val="accent2"/>
+          </a:fillRef>
+          <a:effectRef idx="0">
+            <a:schemeClr val="accent2"/>
+          </a:effectRef>
+          <a:fontRef idx="minor">
+            <a:schemeClr val="lt1"/>
+          </a:fontRef>
+        </p:style>
+        <p:txBody>
+          <a:bodyPr rtlCol="0" anchor="ctr"/>
+          <a:lstStyle>
+            <a:defPPr>
+              <a:defRPr lang="en-US"/>
+            </a:defPPr>
+            <a:lvl1pPr marL="0" algn="l" defTabSz="914400" rtl="0" eaLnBrk="1" latinLnBrk="0" hangingPunct="1">
+              <a:defRPr sz="1800" kern="1200">
+                <a:solidFill>
+                  <a:schemeClr val="lt1"/>
+                </a:solidFill>
+                <a:latin typeface="+mn-lt"/>
+                <a:ea typeface="+mn-ea"/>
+                <a:cs typeface="+mn-cs"/>
+              </a:defRPr>
+            </a:lvl1pPr>
+            <a:lvl2pPr marL="457200" algn="l" defTabSz="914400" rtl="0" eaLnBrk="1" latinLnBrk="0" hangingPunct="1">
+              <a:defRPr sz="1800" kern="1200">
+                <a:solidFill>
+                  <a:schemeClr val="lt1"/>
+                </a:solidFill>
+                <a:latin typeface="+mn-lt"/>
+                <a:ea typeface="+mn-ea"/>
+                <a:cs typeface="+mn-cs"/>
+              </a:defRPr>
+            </a:lvl2pPr>
+            <a:lvl3pPr marL="914400" algn="l" defTabSz="914400" rtl="0" eaLnBrk="1" latinLnBrk="0" hangingPunct="1">
+              <a:defRPr sz="1800" kern="1200">
+                <a:solidFill>
+                  <a:schemeClr val="lt1"/>
+                </a:solidFill>
+                <a:latin typeface="+mn-lt"/>
+                <a:ea typeface="+mn-ea"/>
+                <a:cs typeface="+mn-cs"/>
+              </a:defRPr>
+            </a:lvl3pPr>
+            <a:lvl4pPr marL="1371600" algn="l" defTabSz="914400" rtl="0" eaLnBrk="1" latinLnBrk="0" hangingPunct="1">
+              <a:defRPr sz="1800" kern="1200">
+                <a:solidFill>
+                  <a:schemeClr val="lt1"/>
+                </a:solidFill>
+                <a:latin typeface="+mn-lt"/>
+                <a:ea typeface="+mn-ea"/>
+                <a:cs typeface="+mn-cs"/>
+              </a:defRPr>
+            </a:lvl4pPr>
+            <a:lvl5pPr marL="1828800" algn="l" defTabSz="914400" rtl="0" eaLnBrk="1" latinLnBrk="0" hangingPunct="1">
+              <a:defRPr sz="1800" kern="1200">
+                <a:solidFill>
+                  <a:schemeClr val="lt1"/>
+                </a:solidFill>
+                <a:latin typeface="+mn-lt"/>
+                <a:ea typeface="+mn-ea"/>
+                <a:cs typeface="+mn-cs"/>
+              </a:defRPr>
+            </a:lvl5pPr>
+            <a:lvl6pPr marL="2286000" algn="l" defTabSz="914400" rtl="0" eaLnBrk="1" latinLnBrk="0" hangingPunct="1">
+              <a:defRPr sz="1800" kern="1200">
+                <a:solidFill>
+                  <a:schemeClr val="lt1"/>
+                </a:solidFill>
+                <a:latin typeface="+mn-lt"/>
+                <a:ea typeface="+mn-ea"/>
+                <a:cs typeface="+mn-cs"/>
+              </a:defRPr>
+            </a:lvl6pPr>
+            <a:lvl7pPr marL="2743200" algn="l" defTabSz="914400" rtl="0" eaLnBrk="1" latinLnBrk="0" hangingPunct="1">
+              <a:defRPr sz="1800" kern="1200">
+                <a:solidFill>
+                  <a:schemeClr val="lt1"/>
+                </a:solidFill>
+                <a:latin typeface="+mn-lt"/>
+                <a:ea typeface="+mn-ea"/>
+                <a:cs typeface="+mn-cs"/>
+              </a:defRPr>
+            </a:lvl7pPr>
+            <a:lvl8pPr marL="3200400" algn="l" defTabSz="914400" rtl="0" eaLnBrk="1" latinLnBrk="0" hangingPunct="1">
+              <a:defRPr sz="1800" kern="1200">
+                <a:solidFill>
+                  <a:schemeClr val="lt1"/>
+                </a:solidFill>
+                <a:latin typeface="+mn-lt"/>
+                <a:ea typeface="+mn-ea"/>
+                <a:cs typeface="+mn-cs"/>
+              </a:defRPr>
+            </a:lvl8pPr>
+            <a:lvl9pPr marL="3657600" algn="l" defTabSz="914400" rtl="0" eaLnBrk="1" latinLnBrk="0" hangingPunct="1">
+              <a:defRPr sz="1800" kern="1200">
+                <a:solidFill>
+                  <a:schemeClr val="lt1"/>
+                </a:solidFill>
+                <a:latin typeface="+mn-lt"/>
+                <a:ea typeface="+mn-ea"/>
+                <a:cs typeface="+mn-cs"/>
+              </a:defRPr>
+            </a:lvl9pPr>
+          </a:lstStyle>
+          <a:p>
+            <a:pPr algn="ctr"/>
+            <a:endParaRPr lang="en-US"/>
           </a:p>
         </p:txBody>
       </p:sp>
@@ -17162,6 +18874,146 @@
               <a:rPr lang="en-US" dirty="0"/>
               <a:t>NP-complete </a:t>
             </a:r>
+          </a:p>
+        </p:txBody>
+      </p:sp>
+      <p:sp>
+        <p:nvSpPr>
+          <p:cNvPr id="6" name="Star: 5 Points 5">
+            <a:extLst>
+              <a:ext uri="{FF2B5EF4-FFF2-40B4-BE49-F238E27FC236}">
+                <a16:creationId xmlns:a16="http://schemas.microsoft.com/office/drawing/2014/main" id="{A5267430-1038-3CAC-693B-FC5202383851}"/>
+              </a:ext>
+            </a:extLst>
+          </p:cNvPr>
+          <p:cNvSpPr/>
+          <p:nvPr/>
+        </p:nvSpPr>
+        <p:spPr>
+          <a:xfrm>
+            <a:off x="8763000" y="129075"/>
+            <a:ext cx="247650" cy="244474"/>
+          </a:xfrm>
+          <a:prstGeom prst="star5">
+            <a:avLst/>
+          </a:prstGeom>
+        </p:spPr>
+        <p:style>
+          <a:lnRef idx="2">
+            <a:schemeClr val="accent2">
+              <a:shade val="50000"/>
+            </a:schemeClr>
+          </a:lnRef>
+          <a:fillRef idx="1">
+            <a:schemeClr val="accent2"/>
+          </a:fillRef>
+          <a:effectRef idx="0">
+            <a:schemeClr val="accent2"/>
+          </a:effectRef>
+          <a:fontRef idx="minor">
+            <a:schemeClr val="lt1"/>
+          </a:fontRef>
+        </p:style>
+        <p:txBody>
+          <a:bodyPr rtlCol="0" anchor="ctr"/>
+          <a:lstStyle>
+            <a:defPPr>
+              <a:defRPr lang="en-US"/>
+            </a:defPPr>
+            <a:lvl1pPr marL="0" algn="l" defTabSz="914400" rtl="0" eaLnBrk="1" latinLnBrk="0" hangingPunct="1">
+              <a:defRPr sz="1800" kern="1200">
+                <a:solidFill>
+                  <a:schemeClr val="lt1"/>
+                </a:solidFill>
+                <a:latin typeface="+mn-lt"/>
+                <a:ea typeface="+mn-ea"/>
+                <a:cs typeface="+mn-cs"/>
+              </a:defRPr>
+            </a:lvl1pPr>
+            <a:lvl2pPr marL="457200" algn="l" defTabSz="914400" rtl="0" eaLnBrk="1" latinLnBrk="0" hangingPunct="1">
+              <a:defRPr sz="1800" kern="1200">
+                <a:solidFill>
+                  <a:schemeClr val="lt1"/>
+                </a:solidFill>
+                <a:latin typeface="+mn-lt"/>
+                <a:ea typeface="+mn-ea"/>
+                <a:cs typeface="+mn-cs"/>
+              </a:defRPr>
+            </a:lvl2pPr>
+            <a:lvl3pPr marL="914400" algn="l" defTabSz="914400" rtl="0" eaLnBrk="1" latinLnBrk="0" hangingPunct="1">
+              <a:defRPr sz="1800" kern="1200">
+                <a:solidFill>
+                  <a:schemeClr val="lt1"/>
+                </a:solidFill>
+                <a:latin typeface="+mn-lt"/>
+                <a:ea typeface="+mn-ea"/>
+                <a:cs typeface="+mn-cs"/>
+              </a:defRPr>
+            </a:lvl3pPr>
+            <a:lvl4pPr marL="1371600" algn="l" defTabSz="914400" rtl="0" eaLnBrk="1" latinLnBrk="0" hangingPunct="1">
+              <a:defRPr sz="1800" kern="1200">
+                <a:solidFill>
+                  <a:schemeClr val="lt1"/>
+                </a:solidFill>
+                <a:latin typeface="+mn-lt"/>
+                <a:ea typeface="+mn-ea"/>
+                <a:cs typeface="+mn-cs"/>
+              </a:defRPr>
+            </a:lvl4pPr>
+            <a:lvl5pPr marL="1828800" algn="l" defTabSz="914400" rtl="0" eaLnBrk="1" latinLnBrk="0" hangingPunct="1">
+              <a:defRPr sz="1800" kern="1200">
+                <a:solidFill>
+                  <a:schemeClr val="lt1"/>
+                </a:solidFill>
+                <a:latin typeface="+mn-lt"/>
+                <a:ea typeface="+mn-ea"/>
+                <a:cs typeface="+mn-cs"/>
+              </a:defRPr>
+            </a:lvl5pPr>
+            <a:lvl6pPr marL="2286000" algn="l" defTabSz="914400" rtl="0" eaLnBrk="1" latinLnBrk="0" hangingPunct="1">
+              <a:defRPr sz="1800" kern="1200">
+                <a:solidFill>
+                  <a:schemeClr val="lt1"/>
+                </a:solidFill>
+                <a:latin typeface="+mn-lt"/>
+                <a:ea typeface="+mn-ea"/>
+                <a:cs typeface="+mn-cs"/>
+              </a:defRPr>
+            </a:lvl6pPr>
+            <a:lvl7pPr marL="2743200" algn="l" defTabSz="914400" rtl="0" eaLnBrk="1" latinLnBrk="0" hangingPunct="1">
+              <a:defRPr sz="1800" kern="1200">
+                <a:solidFill>
+                  <a:schemeClr val="lt1"/>
+                </a:solidFill>
+                <a:latin typeface="+mn-lt"/>
+                <a:ea typeface="+mn-ea"/>
+                <a:cs typeface="+mn-cs"/>
+              </a:defRPr>
+            </a:lvl7pPr>
+            <a:lvl8pPr marL="3200400" algn="l" defTabSz="914400" rtl="0" eaLnBrk="1" latinLnBrk="0" hangingPunct="1">
+              <a:defRPr sz="1800" kern="1200">
+                <a:solidFill>
+                  <a:schemeClr val="lt1"/>
+                </a:solidFill>
+                <a:latin typeface="+mn-lt"/>
+                <a:ea typeface="+mn-ea"/>
+                <a:cs typeface="+mn-cs"/>
+              </a:defRPr>
+            </a:lvl8pPr>
+            <a:lvl9pPr marL="3657600" algn="l" defTabSz="914400" rtl="0" eaLnBrk="1" latinLnBrk="0" hangingPunct="1">
+              <a:defRPr sz="1800" kern="1200">
+                <a:solidFill>
+                  <a:schemeClr val="lt1"/>
+                </a:solidFill>
+                <a:latin typeface="+mn-lt"/>
+                <a:ea typeface="+mn-ea"/>
+                <a:cs typeface="+mn-cs"/>
+              </a:defRPr>
+            </a:lvl9pPr>
+          </a:lstStyle>
+          <a:p>
+            <a:pPr algn="ctr"/>
+            <a:endParaRPr lang="en-US"/>
           </a:p>
         </p:txBody>
       </p:sp>

</xml_diff>

<commit_message>
updated all slides for recording.
</commit_message>
<xml_diff>
--- a/slides/06_CSP.pptx
+++ b/slides/06_CSP.pptx
@@ -2450,7 +2450,7 @@
           <a:p>
             <a:fld id="{FDB68C03-DCF9-4B87-BBF6-8F2088376604}" type="datetimeFigureOut">
               <a:rPr lang="en-US" smtClean="0"/>
-              <a:t>5/1/2025</a:t>
+              <a:t>6/4/2025</a:t>
             </a:fld>
             <a:endParaRPr lang="en-US"/>
           </a:p>
@@ -3060,7 +3060,7 @@
           <a:p>
             <a:fld id="{FDB68C03-DCF9-4B87-BBF6-8F2088376604}" type="datetimeFigureOut">
               <a:rPr lang="en-US" smtClean="0"/>
-              <a:t>5/1/2025</a:t>
+              <a:t>6/4/2025</a:t>
             </a:fld>
             <a:endParaRPr lang="en-US"/>
           </a:p>
@@ -3335,7 +3335,7 @@
           <a:p>
             <a:fld id="{FDB68C03-DCF9-4B87-BBF6-8F2088376604}" type="datetimeFigureOut">
               <a:rPr lang="en-US" smtClean="0"/>
-              <a:t>5/1/2025</a:t>
+              <a:t>6/4/2025</a:t>
             </a:fld>
             <a:endParaRPr lang="en-US"/>
           </a:p>
@@ -5124,7 +5124,7 @@
           <a:p>
             <a:fld id="{FDB68C03-DCF9-4B87-BBF6-8F2088376604}" type="datetimeFigureOut">
               <a:rPr lang="en-US" smtClean="0"/>
-              <a:t>5/1/2025</a:t>
+              <a:t>6/4/2025</a:t>
             </a:fld>
             <a:endParaRPr lang="en-US"/>
           </a:p>
@@ -6468,12 +6468,12 @@
         <p:spPr/>
         <p:txBody>
           <a:bodyPr>
-            <a:normAutofit fontScale="92500" lnSpcReduction="10000"/>
+            <a:normAutofit fontScale="77500" lnSpcReduction="20000"/>
           </a:bodyPr>
           <a:lstStyle/>
           <a:p>
             <a:r>
-              <a:rPr lang="en-US" sz="2800" dirty="0"/>
+              <a:rPr lang="en-US" sz="2800" b="1" dirty="0"/>
               <a:t>Assignment problems</a:t>
             </a:r>
           </a:p>
@@ -6483,12 +6483,15 @@
             </a:pPr>
             <a:r>
               <a:rPr lang="en-US" sz="2400" dirty="0"/>
-              <a:t>e.g., who teaches what class for a fixed schedule. Teacher cannot be in two classes at the same time!</a:t>
-            </a:r>
-          </a:p>
-          <a:p>
-            <a:r>
-              <a:rPr lang="en-US" sz="2800" dirty="0"/>
+              <a:t>e.g., who teaches what class for a fixed schedule. A teacher cannot be in two classes at the same time!</a:t>
+            </a:r>
+          </a:p>
+          <a:p>
+            <a:endParaRPr lang="en-US" sz="2800" dirty="0"/>
+          </a:p>
+          <a:p>
+            <a:r>
+              <a:rPr lang="en-US" sz="2800" b="1" dirty="0"/>
               <a:t>Timetable problems</a:t>
             </a:r>
           </a:p>
@@ -6498,14 +6501,24 @@
             </a:pPr>
             <a:r>
               <a:rPr lang="en-US" sz="2400" dirty="0"/>
-              <a:t>e.g., which class is offered when and where? No two classes in the same room at the same problem.</a:t>
-            </a:r>
-          </a:p>
-          <a:p>
+              <a:t>e.g., which class is offered when and where? No two classes in the same room at the same time.</a:t>
+            </a:r>
+          </a:p>
+          <a:p>
+            <a:endParaRPr lang="en-US" sz="2800" dirty="0"/>
+          </a:p>
+          <a:p>
+            <a:r>
+              <a:rPr lang="en-US" sz="2800" b="1" dirty="0"/>
+              <a:t>Scheduling</a:t>
+            </a:r>
             <a:r>
               <a:rPr lang="en-US" sz="2800" dirty="0"/>
-              <a:t>Scheduling in transportation and production (e.g., order of production steps).</a:t>
-            </a:r>
+              <a:t> in transportation and production (e.g., order of production steps).</a:t>
+            </a:r>
+          </a:p>
+          <a:p>
+            <a:endParaRPr lang="en-US" sz="2800" dirty="0"/>
           </a:p>
           <a:p>
             <a:r>
@@ -6848,7 +6861,7 @@
         </p:spPr>
         <p:txBody>
           <a:bodyPr>
-            <a:normAutofit/>
+            <a:normAutofit fontScale="92500" lnSpcReduction="10000"/>
           </a:bodyPr>
           <a:lstStyle/>
           <a:p>
@@ -6900,7 +6913,7 @@
             </a:pPr>
             <a:r>
               <a:rPr lang="en-US" sz="2400" b="1" dirty="0"/>
-              <a:t>Successor function:</a:t>
+              <a:t>Transition function (Successor function):</a:t>
             </a:r>
           </a:p>
           <a:p>
@@ -6935,6 +6948,25 @@
             <a:r>
               <a:rPr lang="en-US" sz="2400" dirty="0"/>
               <a:t>Any complete and consistent assignment.</a:t>
+            </a:r>
+          </a:p>
+          <a:p>
+            <a:pPr marL="57150" indent="0">
+              <a:buNone/>
+            </a:pPr>
+            <a:endParaRPr lang="en-US" sz="2700" dirty="0"/>
+          </a:p>
+          <a:p>
+            <a:pPr marL="57150" indent="0">
+              <a:buNone/>
+            </a:pPr>
+            <a:r>
+              <a:rPr lang="en-US" sz="2700" b="1" dirty="0"/>
+              <a:t>Note</a:t>
+            </a:r>
+            <a:r>
+              <a:rPr lang="en-US" sz="2700" dirty="0"/>
+              <a:t>: Path cost is not important.</a:t>
             </a:r>
           </a:p>
         </p:txBody>
@@ -7129,188 +7161,208 @@
           </a:p>
         </p:txBody>
       </p:sp>
-      <p:sp>
-        <p:nvSpPr>
-          <p:cNvPr id="14339" name="Rectangle 3"/>
-          <p:cNvSpPr>
-            <a:spLocks noGrp="1" noChangeArrowheads="1"/>
-          </p:cNvSpPr>
-          <p:nvPr>
-            <p:ph idx="1"/>
-          </p:nvPr>
-        </p:nvSpPr>
-        <p:spPr/>
-        <p:txBody>
-          <a:bodyPr>
-            <a:noAutofit/>
-          </a:bodyPr>
-          <a:lstStyle/>
-          <a:p>
-            <a:r>
-              <a:rPr lang="en-US" sz="2400" dirty="0"/>
-              <a:t>In CSP’s, variable assignments are </a:t>
-            </a:r>
-            <a:r>
-              <a:rPr lang="en-US" sz="2400" b="1" dirty="0"/>
-              <a:t>commutative</a:t>
-            </a:r>
-            <a:br>
-              <a:rPr lang="en-US" sz="2400" b="1" dirty="0"/>
-            </a:br>
-            <a:r>
-              <a:rPr lang="en-US" sz="2400" dirty="0"/>
-              <a:t>For example, </a:t>
-            </a:r>
-            <a:br>
-              <a:rPr lang="en-US" sz="2400" dirty="0"/>
-            </a:br>
-            <a:r>
-              <a:rPr lang="en-US" sz="2400" i="1" dirty="0"/>
-              <a:t>[WA = </a:t>
-            </a:r>
-            <a:r>
-              <a:rPr lang="en-US" sz="2400" i="1" dirty="0">
-                <a:solidFill>
-                  <a:srgbClr val="FF0000"/>
-                </a:solidFill>
-              </a:rPr>
-              <a:t>red</a:t>
-            </a:r>
-            <a:r>
-              <a:rPr lang="en-US" sz="2400" i="1" dirty="0"/>
-              <a:t> then NT = </a:t>
-            </a:r>
-            <a:r>
-              <a:rPr lang="en-US" sz="2400" i="1" dirty="0">
-                <a:solidFill>
-                  <a:srgbClr val="008000"/>
-                </a:solidFill>
-              </a:rPr>
-              <a:t>green</a:t>
-            </a:r>
-            <a:r>
-              <a:rPr lang="en-US" sz="2400" i="1" dirty="0"/>
-              <a:t>] </a:t>
-            </a:r>
-            <a:r>
-              <a:rPr lang="en-US" sz="2400" dirty="0"/>
-              <a:t>is the same as </a:t>
-            </a:r>
-            <a:br>
-              <a:rPr lang="en-US" sz="2400" dirty="0"/>
-            </a:br>
-            <a:r>
-              <a:rPr lang="en-US" sz="2400" i="1" dirty="0"/>
-              <a:t>[NT = </a:t>
-            </a:r>
-            <a:r>
-              <a:rPr lang="en-US" sz="2400" i="1" dirty="0">
-                <a:solidFill>
-                  <a:srgbClr val="008000"/>
-                </a:solidFill>
-              </a:rPr>
-              <a:t>green</a:t>
-            </a:r>
-            <a:r>
-              <a:rPr lang="en-US" sz="2400" i="1" dirty="0"/>
-              <a:t> then WA = </a:t>
-            </a:r>
-            <a:r>
-              <a:rPr lang="en-US" sz="2400" i="1" dirty="0">
-                <a:solidFill>
-                  <a:srgbClr val="FF0000"/>
-                </a:solidFill>
-              </a:rPr>
-              <a:t>red</a:t>
-            </a:r>
-            <a:r>
-              <a:rPr lang="en-US" sz="2400" i="1" dirty="0"/>
-              <a:t>]. </a:t>
-            </a:r>
-            <a:r>
-              <a:rPr lang="en-US" sz="2400" dirty="0">
-                <a:sym typeface="Wingdings" panose="05000000000000000000" pitchFamily="2" charset="2"/>
-              </a:rPr>
-              <a:t> Order is not important</a:t>
-            </a:r>
-            <a:endParaRPr lang="en-US" sz="2400" dirty="0"/>
-          </a:p>
-          <a:p>
-            <a:endParaRPr lang="en-US" sz="2400" dirty="0"/>
-          </a:p>
-          <a:p>
-            <a:r>
-              <a:rPr lang="en-US" sz="2400" dirty="0"/>
-              <a:t>We can build  a search tree that assigns the value to one variable per level. </a:t>
-            </a:r>
-          </a:p>
-          <a:p>
-            <a:pPr lvl="1"/>
-            <a:r>
-              <a:rPr lang="en-US" sz="2100" dirty="0"/>
-              <a:t>Tree depth </a:t>
-            </a:r>
-            <a:r>
-              <a:rPr lang="en-US" sz="2000" b="1" i="1" dirty="0">
-                <a:solidFill>
-                  <a:srgbClr val="C00000"/>
-                </a:solidFill>
-              </a:rPr>
-              <a:t>n </a:t>
-            </a:r>
-            <a:r>
-              <a:rPr lang="en-US" sz="2000" dirty="0"/>
-              <a:t>(number of variables)</a:t>
-            </a:r>
-            <a:endParaRPr lang="en-US" sz="2100" dirty="0"/>
-          </a:p>
-          <a:p>
-            <a:pPr lvl="1"/>
-            <a:r>
-              <a:rPr lang="en-US" sz="2100" dirty="0"/>
-              <a:t>Number of leaves: </a:t>
-            </a:r>
-            <a:r>
-              <a:rPr lang="en-US" sz="2100" b="1" i="1" dirty="0" err="1">
-                <a:solidFill>
-                  <a:srgbClr val="C00000"/>
-                </a:solidFill>
-              </a:rPr>
-              <a:t>d</a:t>
-            </a:r>
-            <a:r>
-              <a:rPr lang="en-US" sz="2100" b="1" i="1" baseline="30000" dirty="0" err="1">
-                <a:solidFill>
-                  <a:srgbClr val="C00000"/>
-                </a:solidFill>
-              </a:rPr>
-              <a:t>n</a:t>
-            </a:r>
-            <a:r>
-              <a:rPr lang="en-US" sz="2100" i="1" baseline="30000" dirty="0"/>
-              <a:t>  </a:t>
-            </a:r>
-            <a:r>
-              <a:rPr lang="en-US" sz="2100" dirty="0"/>
-              <a:t> (d is the number of values per variable)</a:t>
-            </a:r>
-          </a:p>
-          <a:p>
-            <a:endParaRPr lang="en-US" sz="2400" dirty="0"/>
-          </a:p>
-          <a:p>
-            <a:r>
-              <a:rPr lang="en-US" sz="2400" dirty="0"/>
-              <a:t>Depth-first search for CSPs with single-variable assignments is called </a:t>
-            </a:r>
-            <a:r>
-              <a:rPr lang="en-US" sz="2400" b="1" dirty="0"/>
-              <a:t>backtracking search.</a:t>
-            </a:r>
-            <a:endParaRPr lang="en-US" sz="2400" dirty="0"/>
-          </a:p>
-        </p:txBody>
-      </p:sp>
+      <mc:AlternateContent xmlns:mc="http://schemas.openxmlformats.org/markup-compatibility/2006">
+        <mc:Choice xmlns:a14="http://schemas.microsoft.com/office/drawing/2010/main" Requires="a14">
+          <p:sp>
+            <p:nvSpPr>
+              <p:cNvPr id="14339" name="Rectangle 3"/>
+              <p:cNvSpPr>
+                <a:spLocks noGrp="1" noChangeArrowheads="1"/>
+              </p:cNvSpPr>
+              <p:nvPr>
+                <p:ph idx="1"/>
+              </p:nvPr>
+            </p:nvSpPr>
+            <p:spPr/>
+            <p:txBody>
+              <a:bodyPr>
+                <a:noAutofit/>
+              </a:bodyPr>
+              <a:lstStyle/>
+              <a:p>
+                <a:r>
+                  <a:rPr lang="en-US" sz="2400" dirty="0"/>
+                  <a:t>Start with all variables unassigned.</a:t>
+                </a:r>
+              </a:p>
+              <a:p>
+                <a:endParaRPr lang="en-US" sz="2400" dirty="0"/>
+              </a:p>
+              <a:p>
+                <a:r>
+                  <a:rPr lang="en-US" sz="2400" dirty="0"/>
+                  <a:t>Build a search tree that assigns a value to one variable per level. </a:t>
+                </a:r>
+              </a:p>
+              <a:p>
+                <a:pPr lvl="1"/>
+                <a:r>
+                  <a:rPr lang="en-US" sz="2100" dirty="0"/>
+                  <a:t>Tree depth: number of variables </a:t>
+                </a:r>
+                <a14:m>
+                  <m:oMath xmlns:m="http://schemas.openxmlformats.org/officeDocument/2006/math">
+                    <m:r>
+                      <a:rPr lang="en-US" sz="2000" b="0" i="1" dirty="0" smtClean="0">
+                        <a:solidFill>
+                          <a:srgbClr val="C00000"/>
+                        </a:solidFill>
+                        <a:latin typeface="Cambria Math" panose="02040503050406030204" pitchFamily="18" charset="0"/>
+                      </a:rPr>
+                      <m:t>𝑛</m:t>
+                    </m:r>
+                  </m:oMath>
+                </a14:m>
+                <a:endParaRPr lang="en-US" sz="2100" dirty="0"/>
+              </a:p>
+              <a:p>
+                <a:pPr lvl="1"/>
+                <a:r>
+                  <a:rPr lang="en-US" sz="2100" dirty="0"/>
+                  <a:t>Number of leaves: </a:t>
+                </a:r>
+                <a14:m>
+                  <m:oMath xmlns:m="http://schemas.openxmlformats.org/officeDocument/2006/math">
+                    <m:r>
+                      <m:rPr>
+                        <m:sty m:val="p"/>
+                      </m:rPr>
+                      <a:rPr lang="en-US" sz="2100" b="0" i="0" dirty="0" smtClean="0">
+                        <a:solidFill>
+                          <a:srgbClr val="C00000"/>
+                        </a:solidFill>
+                        <a:latin typeface="Cambria Math" panose="02040503050406030204" pitchFamily="18" charset="0"/>
+                      </a:rPr>
+                      <m:t>O</m:t>
+                    </m:r>
+                    <m:r>
+                      <a:rPr lang="en-US" sz="2100" b="0" i="0" dirty="0" smtClean="0">
+                        <a:solidFill>
+                          <a:srgbClr val="C00000"/>
+                        </a:solidFill>
+                        <a:latin typeface="Cambria Math" panose="02040503050406030204" pitchFamily="18" charset="0"/>
+                      </a:rPr>
+                      <m:t>(</m:t>
+                    </m:r>
+                    <m:sSup>
+                      <m:sSupPr>
+                        <m:ctrlPr>
+                          <a:rPr lang="en-US" sz="2100" i="1" dirty="0" smtClean="0">
+                            <a:solidFill>
+                              <a:srgbClr val="C00000"/>
+                            </a:solidFill>
+                            <a:latin typeface="Cambria Math" panose="02040503050406030204" pitchFamily="18" charset="0"/>
+                          </a:rPr>
+                        </m:ctrlPr>
+                      </m:sSupPr>
+                      <m:e>
+                        <m:r>
+                          <a:rPr lang="en-US" sz="2100" b="0" i="1" dirty="0" smtClean="0">
+                            <a:solidFill>
+                              <a:srgbClr val="C00000"/>
+                            </a:solidFill>
+                            <a:latin typeface="Cambria Math" panose="02040503050406030204" pitchFamily="18" charset="0"/>
+                          </a:rPr>
+                          <m:t>𝑑</m:t>
+                        </m:r>
+                      </m:e>
+                      <m:sup>
+                        <m:r>
+                          <a:rPr lang="en-US" sz="2100" b="0" i="1" dirty="0" smtClean="0">
+                            <a:solidFill>
+                              <a:srgbClr val="C00000"/>
+                            </a:solidFill>
+                            <a:latin typeface="Cambria Math" panose="02040503050406030204" pitchFamily="18" charset="0"/>
+                          </a:rPr>
+                          <m:t>𝑛</m:t>
+                        </m:r>
+                      </m:sup>
+                    </m:sSup>
+                    <m:r>
+                      <a:rPr lang="en-US" sz="2100" b="0" i="1" dirty="0" smtClean="0">
+                        <a:solidFill>
+                          <a:srgbClr val="C00000"/>
+                        </a:solidFill>
+                        <a:latin typeface="Cambria Math" panose="02040503050406030204" pitchFamily="18" charset="0"/>
+                      </a:rPr>
+                      <m:t>)</m:t>
+                    </m:r>
+                  </m:oMath>
+                </a14:m>
+                <a:r>
+                  <a:rPr lang="en-US" sz="2100" i="1" baseline="30000" dirty="0"/>
+                  <a:t>  </a:t>
+                </a:r>
+                <a:r>
+                  <a:rPr lang="en-US" sz="2100" dirty="0"/>
+                  <a:t> where </a:t>
+                </a:r>
+                <a14:m>
+                  <m:oMath xmlns:m="http://schemas.openxmlformats.org/officeDocument/2006/math">
+                    <m:r>
+                      <a:rPr lang="en-US" sz="2100" i="1" dirty="0" smtClean="0">
+                        <a:latin typeface="Cambria Math" panose="02040503050406030204" pitchFamily="18" charset="0"/>
+                      </a:rPr>
+                      <m:t>𝑑</m:t>
+                    </m:r>
+                  </m:oMath>
+                </a14:m>
+                <a:r>
+                  <a:rPr lang="en-US" sz="2100" dirty="0"/>
+                  <a:t> is the number of values per variable</a:t>
+                </a:r>
+              </a:p>
+              <a:p>
+                <a:endParaRPr lang="en-US" sz="2400" dirty="0"/>
+              </a:p>
+              <a:p>
+                <a:r>
+                  <a:rPr lang="en-US" sz="2400" dirty="0"/>
+                  <a:t>Depth-first search for CSPs with single-variable assignments is typically done with </a:t>
+                </a:r>
+                <a:r>
+                  <a:rPr lang="en-US" sz="2400" b="1" dirty="0"/>
+                  <a:t>backtracking search.</a:t>
+                </a:r>
+                <a:endParaRPr lang="en-US" sz="2400" dirty="0"/>
+              </a:p>
+            </p:txBody>
+          </p:sp>
+        </mc:Choice>
+        <mc:Fallback>
+          <p:sp>
+            <p:nvSpPr>
+              <p:cNvPr id="14339" name="Rectangle 3"/>
+              <p:cNvSpPr>
+                <a:spLocks noGrp="1" noRot="1" noChangeAspect="1" noMove="1" noResize="1" noEditPoints="1" noAdjustHandles="1" noChangeArrowheads="1" noChangeShapeType="1" noTextEdit="1"/>
+              </p:cNvSpPr>
+              <p:nvPr>
+                <p:ph idx="1"/>
+              </p:nvPr>
+            </p:nvSpPr>
+            <p:spPr>
+              <a:blipFill>
+                <a:blip r:embed="rId3"/>
+                <a:stretch>
+                  <a:fillRect l="-1005" t="-1961"/>
+                </a:stretch>
+              </a:blipFill>
+            </p:spPr>
+            <p:txBody>
+              <a:bodyPr/>
+              <a:lstStyle/>
+              <a:p>
+                <a:r>
+                  <a:rPr lang="en-US">
+                    <a:noFill/>
+                  </a:rPr>
+                  <a:t> </a:t>
+                </a:r>
+              </a:p>
+            </p:txBody>
+          </p:sp>
+        </mc:Fallback>
+      </mc:AlternateContent>
     </p:spTree>
   </p:cSld>
   <p:clrMapOvr>
@@ -7328,9 +7380,6 @@
                     <p:cTn id="3" fill="hold">
                       <p:stCondLst>
                         <p:cond delay="indefinite"/>
-                        <p:cond evt="onBegin" delay="0">
-                          <p:tn val="2"/>
-                        </p:cond>
                       </p:stCondLst>
                       <p:childTnLst>
                         <p:par>
@@ -7340,7 +7389,7 @@
                             </p:stCondLst>
                             <p:childTnLst>
                               <p:par>
-                                <p:cTn id="5" presetID="1" presetClass="entr" presetSubtype="0" fill="hold" grpId="0" nodeType="withEffect">
+                                <p:cTn id="5" presetID="1" presetClass="entr" presetSubtype="0" fill="hold" grpId="0" nodeType="clickEffect">
                                   <p:stCondLst>
                                     <p:cond delay="0"/>
                                   </p:stCondLst>
@@ -8499,240 +8548,11 @@
   <p:clrMapOvr>
     <a:masterClrMapping/>
   </p:clrMapOvr>
-  <p:timing>
-    <p:tnLst>
-      <p:par>
-        <p:cTn id="1" dur="indefinite" restart="never" nodeType="tmRoot">
-          <p:childTnLst>
-            <p:seq concurrent="1" nextAc="seek">
-              <p:cTn id="2" dur="indefinite" nodeType="mainSeq">
-                <p:childTnLst>
-                  <p:par>
-                    <p:cTn id="3" fill="hold">
-                      <p:stCondLst>
-                        <p:cond delay="indefinite"/>
-                      </p:stCondLst>
-                      <p:childTnLst>
-                        <p:par>
-                          <p:cTn id="4" fill="hold">
-                            <p:stCondLst>
-                              <p:cond delay="0"/>
-                            </p:stCondLst>
-                            <p:childTnLst>
-                              <p:par>
-                                <p:cTn id="5" presetID="1" presetClass="entr" presetSubtype="0" fill="hold" grpId="0" nodeType="clickEffect">
-                                  <p:stCondLst>
-                                    <p:cond delay="0"/>
-                                  </p:stCondLst>
-                                  <p:childTnLst>
-                                    <p:set>
-                                      <p:cBhvr>
-                                        <p:cTn id="6" dur="1" fill="hold">
-                                          <p:stCondLst>
-                                            <p:cond delay="0"/>
-                                          </p:stCondLst>
-                                        </p:cTn>
-                                        <p:tgtEl>
-                                          <p:spTgt spid="8">
-                                            <p:txEl>
-                                              <p:pRg st="0" end="0"/>
-                                            </p:txEl>
-                                          </p:spTgt>
-                                        </p:tgtEl>
-                                        <p:attrNameLst>
-                                          <p:attrName>style.visibility</p:attrName>
-                                        </p:attrNameLst>
-                                      </p:cBhvr>
-                                      <p:to>
-                                        <p:strVal val="visible"/>
-                                      </p:to>
-                                    </p:set>
-                                  </p:childTnLst>
-                                </p:cTn>
-                              </p:par>
-                            </p:childTnLst>
-                          </p:cTn>
-                        </p:par>
-                      </p:childTnLst>
-                    </p:cTn>
-                  </p:par>
-                  <p:par>
-                    <p:cTn id="7" fill="hold">
-                      <p:stCondLst>
-                        <p:cond delay="indefinite"/>
-                      </p:stCondLst>
-                      <p:childTnLst>
-                        <p:par>
-                          <p:cTn id="8" fill="hold">
-                            <p:stCondLst>
-                              <p:cond delay="0"/>
-                            </p:stCondLst>
-                            <p:childTnLst>
-                              <p:par>
-                                <p:cTn id="9" presetID="1" presetClass="entr" presetSubtype="0" fill="hold" grpId="0" nodeType="clickEffect">
-                                  <p:stCondLst>
-                                    <p:cond delay="0"/>
-                                  </p:stCondLst>
-                                  <p:childTnLst>
-                                    <p:set>
-                                      <p:cBhvr>
-                                        <p:cTn id="10" dur="1" fill="hold">
-                                          <p:stCondLst>
-                                            <p:cond delay="0"/>
-                                          </p:stCondLst>
-                                        </p:cTn>
-                                        <p:tgtEl>
-                                          <p:spTgt spid="8">
-                                            <p:txEl>
-                                              <p:pRg st="1" end="1"/>
-                                            </p:txEl>
-                                          </p:spTgt>
-                                        </p:tgtEl>
-                                        <p:attrNameLst>
-                                          <p:attrName>style.visibility</p:attrName>
-                                        </p:attrNameLst>
-                                      </p:cBhvr>
-                                      <p:to>
-                                        <p:strVal val="visible"/>
-                                      </p:to>
-                                    </p:set>
-                                  </p:childTnLst>
-                                </p:cTn>
-                              </p:par>
-                            </p:childTnLst>
-                          </p:cTn>
-                        </p:par>
-                      </p:childTnLst>
-                    </p:cTn>
-                  </p:par>
-                  <p:par>
-                    <p:cTn id="11" fill="hold">
-                      <p:stCondLst>
-                        <p:cond delay="indefinite"/>
-                      </p:stCondLst>
-                      <p:childTnLst>
-                        <p:par>
-                          <p:cTn id="12" fill="hold">
-                            <p:stCondLst>
-                              <p:cond delay="0"/>
-                            </p:stCondLst>
-                            <p:childTnLst>
-                              <p:par>
-                                <p:cTn id="13" presetID="1" presetClass="entr" presetSubtype="0" fill="hold" grpId="0" nodeType="clickEffect">
-                                  <p:stCondLst>
-                                    <p:cond delay="0"/>
-                                  </p:stCondLst>
-                                  <p:childTnLst>
-                                    <p:set>
-                                      <p:cBhvr>
-                                        <p:cTn id="14" dur="1" fill="hold">
-                                          <p:stCondLst>
-                                            <p:cond delay="0"/>
-                                          </p:stCondLst>
-                                        </p:cTn>
-                                        <p:tgtEl>
-                                          <p:spTgt spid="8">
-                                            <p:txEl>
-                                              <p:pRg st="2" end="2"/>
-                                            </p:txEl>
-                                          </p:spTgt>
-                                        </p:tgtEl>
-                                        <p:attrNameLst>
-                                          <p:attrName>style.visibility</p:attrName>
-                                        </p:attrNameLst>
-                                      </p:cBhvr>
-                                      <p:to>
-                                        <p:strVal val="visible"/>
-                                      </p:to>
-                                    </p:set>
-                                  </p:childTnLst>
-                                </p:cTn>
-                              </p:par>
-                            </p:childTnLst>
-                          </p:cTn>
-                        </p:par>
-                      </p:childTnLst>
-                    </p:cTn>
-                  </p:par>
-                  <p:par>
-                    <p:cTn id="15" fill="hold">
-                      <p:stCondLst>
-                        <p:cond delay="indefinite"/>
-                      </p:stCondLst>
-                      <p:childTnLst>
-                        <p:par>
-                          <p:cTn id="16" fill="hold">
-                            <p:stCondLst>
-                              <p:cond delay="0"/>
-                            </p:stCondLst>
-                            <p:childTnLst>
-                              <p:par>
-                                <p:cTn id="17" presetID="1" presetClass="entr" presetSubtype="0" fill="hold" grpId="0" nodeType="clickEffect">
-                                  <p:stCondLst>
-                                    <p:cond delay="0"/>
-                                  </p:stCondLst>
-                                  <p:childTnLst>
-                                    <p:set>
-                                      <p:cBhvr>
-                                        <p:cTn id="18" dur="1" fill="hold">
-                                          <p:stCondLst>
-                                            <p:cond delay="0"/>
-                                          </p:stCondLst>
-                                        </p:cTn>
-                                        <p:tgtEl>
-                                          <p:spTgt spid="8">
-                                            <p:txEl>
-                                              <p:pRg st="3" end="3"/>
-                                            </p:txEl>
-                                          </p:spTgt>
-                                        </p:tgtEl>
-                                        <p:attrNameLst>
-                                          <p:attrName>style.visibility</p:attrName>
-                                        </p:attrNameLst>
-                                      </p:cBhvr>
-                                      <p:to>
-                                        <p:strVal val="visible"/>
-                                      </p:to>
-                                    </p:set>
-                                  </p:childTnLst>
-                                </p:cTn>
-                              </p:par>
-                            </p:childTnLst>
-                          </p:cTn>
-                        </p:par>
-                      </p:childTnLst>
-                    </p:cTn>
-                  </p:par>
-                </p:childTnLst>
-              </p:cTn>
-              <p:prevCondLst>
-                <p:cond evt="onPrev" delay="0">
-                  <p:tgtEl>
-                    <p:sldTgt/>
-                  </p:tgtEl>
-                </p:cond>
-              </p:prevCondLst>
-              <p:nextCondLst>
-                <p:cond evt="onNext" delay="0">
-                  <p:tgtEl>
-                    <p:sldTgt/>
-                  </p:tgtEl>
-                </p:cond>
-              </p:nextCondLst>
-            </p:seq>
-          </p:childTnLst>
-        </p:cTn>
-      </p:par>
-    </p:tnLst>
-    <p:bldLst>
-      <p:bldP spid="8" grpId="0" uiExpand="1" build="p"/>
-    </p:bldLst>
-  </p:timing>
 </p:sld>
 </file>
 
 <file path=ppt/slides/slide16.xml><?xml version="1.0" encoding="utf-8"?>
-<p:sld xmlns:a="http://schemas.openxmlformats.org/drawingml/2006/main" xmlns:r="http://schemas.openxmlformats.org/officeDocument/2006/relationships" xmlns:p="http://schemas.openxmlformats.org/presentationml/2006/main">
+<p:sld xmlns:a="http://schemas.openxmlformats.org/drawingml/2006/main" xmlns:r="http://schemas.openxmlformats.org/officeDocument/2006/relationships" xmlns:p="http://schemas.openxmlformats.org/presentationml/2006/main" show="0">
   <p:cSld>
     <p:spTree>
       <p:nvGrpSpPr>
@@ -9228,7 +9048,7 @@
 </file>
 
 <file path=ppt/slides/slide17.xml><?xml version="1.0" encoding="utf-8"?>
-<p:sld xmlns:a="http://schemas.openxmlformats.org/drawingml/2006/main" xmlns:r="http://schemas.openxmlformats.org/officeDocument/2006/relationships" xmlns:p="http://schemas.openxmlformats.org/presentationml/2006/main">
+<p:sld xmlns:a="http://schemas.openxmlformats.org/drawingml/2006/main" xmlns:r="http://schemas.openxmlformats.org/officeDocument/2006/relationships" xmlns:p="http://schemas.openxmlformats.org/presentationml/2006/main" show="0">
   <p:cSld>
     <p:spTree>
       <p:nvGrpSpPr>
@@ -9570,7 +9390,7 @@
 </file>
 
 <file path=ppt/slides/slide18.xml><?xml version="1.0" encoding="utf-8"?>
-<p:sld xmlns:a="http://schemas.openxmlformats.org/drawingml/2006/main" xmlns:r="http://schemas.openxmlformats.org/officeDocument/2006/relationships" xmlns:p="http://schemas.openxmlformats.org/presentationml/2006/main">
+<p:sld xmlns:a="http://schemas.openxmlformats.org/drawingml/2006/main" xmlns:r="http://schemas.openxmlformats.org/officeDocument/2006/relationships" xmlns:p="http://schemas.openxmlformats.org/presentationml/2006/main" show="0">
   <p:cSld>
     <p:spTree>
       <p:nvGrpSpPr>
@@ -9973,7 +9793,7 @@
 </file>
 
 <file path=ppt/slides/slide19.xml><?xml version="1.0" encoding="utf-8"?>
-<p:sld xmlns:a="http://schemas.openxmlformats.org/drawingml/2006/main" xmlns:r="http://schemas.openxmlformats.org/officeDocument/2006/relationships" xmlns:p="http://schemas.openxmlformats.org/presentationml/2006/main">
+<p:sld xmlns:a="http://schemas.openxmlformats.org/drawingml/2006/main" xmlns:r="http://schemas.openxmlformats.org/officeDocument/2006/relationships" xmlns:p="http://schemas.openxmlformats.org/presentationml/2006/main" show="0">
   <p:cSld>
     <p:spTree>
       <p:nvGrpSpPr>
@@ -10503,8 +10323,8 @@
           </a:p>
         </p:txBody>
       </p:sp>
-      <mc:AlternateContent xmlns:mc="http://schemas.openxmlformats.org/markup-compatibility/2006" xmlns:a14="http://schemas.microsoft.com/office/drawing/2010/main">
-        <mc:Choice Requires="a14">
+      <mc:AlternateContent xmlns:mc="http://schemas.openxmlformats.org/markup-compatibility/2006">
+        <mc:Choice xmlns:a14="http://schemas.microsoft.com/office/drawing/2010/main" Requires="a14">
           <p:sp>
             <p:nvSpPr>
               <p:cNvPr id="5123" name="Rectangle 3"/>
@@ -10578,39 +10398,39 @@
                 </a:r>
               </a:p>
               <a:p>
-                <a:pPr lvl="2"/>
+                <a:pPr lvl="1"/>
                 <a:r>
-                  <a:rPr lang="en-US" sz="1700" dirty="0"/>
+                  <a:rPr lang="en-US" sz="2100" b="1" dirty="0">
+                    <a:solidFill>
+                      <a:srgbClr val="CC0000"/>
+                    </a:solidFill>
+                  </a:rPr>
+                  <a:t>Partial Solution: </a:t>
+                </a:r>
+                <a:r>
+                  <a:rPr lang="en-US" sz="2000" dirty="0"/>
                   <a:t>Each variable can have a value from domain </a:t>
                 </a:r>
                 <a:r>
-                  <a:rPr lang="en-US" sz="1700" i="1" dirty="0"/>
+                  <a:rPr lang="en-US" sz="2000" i="1" dirty="0"/>
                   <a:t>D</a:t>
                 </a:r>
                 <a:r>
-                  <a:rPr lang="en-US" sz="1700" i="1" baseline="-25000" dirty="0"/>
+                  <a:rPr lang="en-US" sz="2000" i="1" baseline="-25000" dirty="0"/>
                   <a:t>i  </a:t>
                 </a:r>
                 <a:r>
-                  <a:rPr lang="en-US" sz="1700" dirty="0"/>
+                  <a:rPr lang="en-US" sz="2000" dirty="0"/>
                   <a:t>or be </a:t>
                 </a:r>
                 <a:r>
-                  <a:rPr lang="en-US" sz="1800" b="1" dirty="0"/>
+                  <a:rPr lang="en-US" sz="2100" b="1" dirty="0"/>
                   <a:t>unassigned</a:t>
                 </a:r>
                 <a:r>
-                  <a:rPr lang="en-US" sz="1700" dirty="0"/>
-                  <a:t> (partial solution).</a:t>
+                  <a:rPr lang="en-US" sz="2000" dirty="0"/>
+                  <a:t>.</a:t>
                 </a:r>
-                <a:endParaRPr lang="en-US" sz="2000" b="1" dirty="0">
-                  <a:solidFill>
-                    <a:srgbClr val="CC0000"/>
-                  </a:solidFill>
-                </a:endParaRPr>
-              </a:p>
-              <a:p>
-                <a:pPr lvl="1"/>
                 <a:endParaRPr lang="en-US" sz="2000" b="1" dirty="0">
                   <a:solidFill>
                     <a:srgbClr val="CC0000"/>
@@ -10637,6 +10457,45 @@
                 <a:r>
                   <a:rPr lang="en-US" sz="2000" dirty="0"/>
                   <a:t>		E.g., </a:t>
+                </a:r>
+                <a14:m>
+                  <m:oMath xmlns:m="http://schemas.openxmlformats.org/officeDocument/2006/math">
+                    <m:sSub>
+                      <m:sSubPr>
+                        <m:ctrlPr>
+                          <a:rPr lang="en-US" sz="2000" b="0" i="1" smtClean="0">
+                            <a:latin typeface="Cambria Math" panose="02040503050406030204" pitchFamily="18" charset="0"/>
+                          </a:rPr>
+                        </m:ctrlPr>
+                      </m:sSubPr>
+                      <m:e>
+                        <m:r>
+                          <a:rPr lang="en-US" sz="2000" b="0" i="1" smtClean="0">
+                            <a:latin typeface="Cambria Math" panose="02040503050406030204" pitchFamily="18" charset="0"/>
+                          </a:rPr>
+                          <m:t>𝑋</m:t>
+                        </m:r>
+                      </m:e>
+                      <m:sub>
+                        <m:r>
+                          <a:rPr lang="en-US" sz="2000" b="0" i="1" smtClean="0">
+                            <a:latin typeface="Cambria Math" panose="02040503050406030204" pitchFamily="18" charset="0"/>
+                          </a:rPr>
+                          <m:t>1</m:t>
+                        </m:r>
+                      </m:sub>
+                    </m:sSub>
+                    <m:r>
+                      <a:rPr lang="en-US" sz="2000" b="0" i="1" smtClean="0">
+                        <a:latin typeface="Cambria Math" panose="02040503050406030204" pitchFamily="18" charset="0"/>
+                      </a:rPr>
+                      <m:t>=3</m:t>
+                    </m:r>
+                  </m:oMath>
+                </a14:m>
+                <a:r>
+                  <a:rPr lang="en-US" sz="2000" dirty="0"/>
+                  <a:t>, </a:t>
                 </a:r>
                 <a14:m>
                   <m:oMath xmlns:m="http://schemas.openxmlformats.org/officeDocument/2006/math">
@@ -10806,7 +10665,7 @@
             </p:txBody>
           </p:sp>
         </mc:Choice>
-        <mc:Fallback xmlns="">
+        <mc:Fallback>
           <p:sp>
             <p:nvSpPr>
               <p:cNvPr id="5123" name="Rectangle 3"/>
@@ -10989,10 +10848,10 @@
       </p:sp>
       <p:grpSp>
         <p:nvGrpSpPr>
-          <p:cNvPr id="6" name="Group 5" descr="A picture showing the difference between atomic and factores states. ">
+          <p:cNvPr id="7" name="Group 6">
             <a:extLst>
               <a:ext uri="{FF2B5EF4-FFF2-40B4-BE49-F238E27FC236}">
-                <a16:creationId xmlns:a16="http://schemas.microsoft.com/office/drawing/2014/main" id="{EA7A246C-DA4B-8AF8-AE62-2B4FC9ED6FB2}"/>
+                <a16:creationId xmlns:a16="http://schemas.microsoft.com/office/drawing/2014/main" id="{EADAB253-13A3-4D5E-2DD0-017E6F167F13}"/>
               </a:ext>
             </a:extLst>
           </p:cNvPr>
@@ -11001,10 +10860,10 @@
         </p:nvGrpSpPr>
         <p:grpSpPr>
           <a:xfrm>
-            <a:off x="3886200" y="1447800"/>
-            <a:ext cx="4635954" cy="1612641"/>
-            <a:chOff x="3886200" y="1447800"/>
-            <a:chExt cx="4635954" cy="1612641"/>
+            <a:off x="3865537" y="1434491"/>
+            <a:ext cx="2848480" cy="1612641"/>
+            <a:chOff x="3865537" y="1434491"/>
+            <a:chExt cx="2848480" cy="1612641"/>
           </a:xfrm>
         </p:grpSpPr>
         <p:pic>
@@ -11028,7 +10887,7 @@
           </p:blipFill>
           <p:spPr>
             <a:xfrm>
-              <a:off x="3886200" y="1447800"/>
+              <a:off x="3865537" y="1434491"/>
               <a:ext cx="2827817" cy="1612641"/>
             </a:xfrm>
             <a:prstGeom prst="rect">
@@ -11059,7 +10918,7 @@
             <a:noFill/>
             <a:ln w="38100" cap="flat" cmpd="sng" algn="ctr">
               <a:solidFill>
-                <a:srgbClr val="FF0000"/>
+                <a:srgbClr val="C00000"/>
               </a:solidFill>
               <a:prstDash val="solid"/>
               <a:round/>
@@ -11090,113 +10949,113 @@
             </a:p>
           </p:txBody>
         </p:sp>
-        <p:sp>
-          <p:nvSpPr>
-            <p:cNvPr id="4" name="Speech Bubble: Rectangle with Corners Rounded 3">
-              <a:extLst>
-                <a:ext uri="{FF2B5EF4-FFF2-40B4-BE49-F238E27FC236}">
-                  <a16:creationId xmlns:a16="http://schemas.microsoft.com/office/drawing/2014/main" id="{D10843E1-985B-4A9F-A87D-3ABA26727E55}"/>
-                </a:ext>
-              </a:extLst>
-            </p:cNvPr>
-            <p:cNvSpPr/>
-            <p:nvPr/>
-          </p:nvSpPr>
-          <p:spPr>
-            <a:xfrm>
-              <a:off x="6941004" y="2286513"/>
-              <a:ext cx="1581150" cy="279625"/>
-            </a:xfrm>
-            <a:prstGeom prst="wedgeRoundRectCallout">
-              <a:avLst>
-                <a:gd name="adj1" fmla="val -82617"/>
-                <a:gd name="adj2" fmla="val -71138"/>
-                <a:gd name="adj3" fmla="val 16667"/>
-              </a:avLst>
-            </a:prstGeom>
-          </p:spPr>
-          <p:style>
-            <a:lnRef idx="2">
-              <a:schemeClr val="accent6">
-                <a:shade val="15000"/>
-              </a:schemeClr>
-            </a:lnRef>
-            <a:fillRef idx="1">
-              <a:schemeClr val="accent6"/>
-            </a:fillRef>
-            <a:effectRef idx="0">
-              <a:schemeClr val="accent6"/>
-            </a:effectRef>
-            <a:fontRef idx="minor">
-              <a:schemeClr val="lt1"/>
-            </a:fontRef>
-          </p:style>
-          <p:txBody>
-            <a:bodyPr rtlCol="0" anchor="ctr"/>
-            <a:lstStyle/>
-            <a:p>
-              <a:pPr algn="ctr"/>
-              <a:r>
-                <a:rPr lang="en-US" sz="1400" b="1" dirty="0"/>
-                <a:t>Add constraints </a:t>
-              </a:r>
-            </a:p>
-          </p:txBody>
-        </p:sp>
-        <p:sp>
-          <p:nvSpPr>
-            <p:cNvPr id="8" name="Speech Bubble: Rectangle with Corners Rounded 7">
-              <a:extLst>
-                <a:ext uri="{FF2B5EF4-FFF2-40B4-BE49-F238E27FC236}">
-                  <a16:creationId xmlns:a16="http://schemas.microsoft.com/office/drawing/2014/main" id="{250CFE54-A276-B0DE-6173-CFCFE03D114A}"/>
-                </a:ext>
-              </a:extLst>
-            </p:cNvPr>
-            <p:cNvSpPr/>
-            <p:nvPr/>
-          </p:nvSpPr>
-          <p:spPr>
-            <a:xfrm>
-              <a:off x="6941004" y="1524001"/>
-              <a:ext cx="1581150" cy="560276"/>
-            </a:xfrm>
-            <a:prstGeom prst="wedgeRoundRectCallout">
-              <a:avLst>
-                <a:gd name="adj1" fmla="val -86747"/>
-                <a:gd name="adj2" fmla="val 14507"/>
-                <a:gd name="adj3" fmla="val 16667"/>
-              </a:avLst>
-            </a:prstGeom>
-          </p:spPr>
-          <p:style>
-            <a:lnRef idx="2">
-              <a:schemeClr val="accent6">
-                <a:shade val="15000"/>
-              </a:schemeClr>
-            </a:lnRef>
-            <a:fillRef idx="1">
-              <a:schemeClr val="accent6"/>
-            </a:fillRef>
-            <a:effectRef idx="0">
-              <a:schemeClr val="accent6"/>
-            </a:effectRef>
-            <a:fontRef idx="minor">
-              <a:schemeClr val="lt1"/>
-            </a:fontRef>
-          </p:style>
-          <p:txBody>
-            <a:bodyPr rtlCol="0" anchor="ctr"/>
-            <a:lstStyle/>
-            <a:p>
-              <a:pPr algn="ctr"/>
-              <a:r>
-                <a:rPr lang="en-US" sz="1400" b="1" dirty="0"/>
-                <a:t>Work with partial solutions</a:t>
-              </a:r>
-            </a:p>
-          </p:txBody>
-        </p:sp>
       </p:grpSp>
+      <p:sp>
+        <p:nvSpPr>
+          <p:cNvPr id="4" name="Speech Bubble: Rectangle with Corners Rounded 3">
+            <a:extLst>
+              <a:ext uri="{FF2B5EF4-FFF2-40B4-BE49-F238E27FC236}">
+                <a16:creationId xmlns:a16="http://schemas.microsoft.com/office/drawing/2014/main" id="{D10843E1-985B-4A9F-A87D-3ABA26727E55}"/>
+              </a:ext>
+            </a:extLst>
+          </p:cNvPr>
+          <p:cNvSpPr/>
+          <p:nvPr/>
+        </p:nvSpPr>
+        <p:spPr>
+          <a:xfrm>
+            <a:off x="6941004" y="2286513"/>
+            <a:ext cx="1581150" cy="279625"/>
+          </a:xfrm>
+          <a:prstGeom prst="wedgeRoundRectCallout">
+            <a:avLst>
+              <a:gd name="adj1" fmla="val -82617"/>
+              <a:gd name="adj2" fmla="val -71138"/>
+              <a:gd name="adj3" fmla="val 16667"/>
+            </a:avLst>
+          </a:prstGeom>
+        </p:spPr>
+        <p:style>
+          <a:lnRef idx="2">
+            <a:schemeClr val="accent6">
+              <a:shade val="15000"/>
+            </a:schemeClr>
+          </a:lnRef>
+          <a:fillRef idx="1">
+            <a:schemeClr val="accent6"/>
+          </a:fillRef>
+          <a:effectRef idx="0">
+            <a:schemeClr val="accent6"/>
+          </a:effectRef>
+          <a:fontRef idx="minor">
+            <a:schemeClr val="lt1"/>
+          </a:fontRef>
+        </p:style>
+        <p:txBody>
+          <a:bodyPr rtlCol="0" anchor="ctr"/>
+          <a:lstStyle/>
+          <a:p>
+            <a:pPr algn="ctr"/>
+            <a:r>
+              <a:rPr lang="en-US" sz="1400" b="1" dirty="0"/>
+              <a:t>Add constraints </a:t>
+            </a:r>
+          </a:p>
+        </p:txBody>
+      </p:sp>
+      <p:sp>
+        <p:nvSpPr>
+          <p:cNvPr id="8" name="Speech Bubble: Rectangle with Corners Rounded 7">
+            <a:extLst>
+              <a:ext uri="{FF2B5EF4-FFF2-40B4-BE49-F238E27FC236}">
+                <a16:creationId xmlns:a16="http://schemas.microsoft.com/office/drawing/2014/main" id="{250CFE54-A276-B0DE-6173-CFCFE03D114A}"/>
+              </a:ext>
+            </a:extLst>
+          </p:cNvPr>
+          <p:cNvSpPr/>
+          <p:nvPr/>
+        </p:nvSpPr>
+        <p:spPr>
+          <a:xfrm>
+            <a:off x="6941004" y="1524001"/>
+            <a:ext cx="1581150" cy="560276"/>
+          </a:xfrm>
+          <a:prstGeom prst="wedgeRoundRectCallout">
+            <a:avLst>
+              <a:gd name="adj1" fmla="val -86747"/>
+              <a:gd name="adj2" fmla="val 14507"/>
+              <a:gd name="adj3" fmla="val 16667"/>
+            </a:avLst>
+          </a:prstGeom>
+        </p:spPr>
+        <p:style>
+          <a:lnRef idx="2">
+            <a:schemeClr val="accent6">
+              <a:shade val="15000"/>
+            </a:schemeClr>
+          </a:lnRef>
+          <a:fillRef idx="1">
+            <a:schemeClr val="accent6"/>
+          </a:fillRef>
+          <a:effectRef idx="0">
+            <a:schemeClr val="accent6"/>
+          </a:effectRef>
+          <a:fontRef idx="minor">
+            <a:schemeClr val="lt1"/>
+          </a:fontRef>
+        </p:style>
+        <p:txBody>
+          <a:bodyPr rtlCol="0" anchor="ctr"/>
+          <a:lstStyle/>
+          <a:p>
+            <a:pPr algn="ctr"/>
+            <a:r>
+              <a:rPr lang="en-US" sz="1400" b="1" dirty="0"/>
+              <a:t>Work with partial solutions</a:t>
+            </a:r>
+          </a:p>
+        </p:txBody>
+      </p:sp>
     </p:spTree>
   </p:cSld>
   <p:clrMapOvr>
@@ -11318,15 +11177,33 @@
                                   </p:childTnLst>
                                 </p:cTn>
                               </p:par>
+                            </p:childTnLst>
+                          </p:cTn>
+                        </p:par>
+                      </p:childTnLst>
+                    </p:cTn>
+                  </p:par>
+                  <p:par>
+                    <p:cTn id="11" fill="hold">
+                      <p:stCondLst>
+                        <p:cond delay="indefinite"/>
+                      </p:stCondLst>
+                      <p:childTnLst>
+                        <p:par>
+                          <p:cTn id="12" fill="hold">
+                            <p:stCondLst>
+                              <p:cond delay="0"/>
+                            </p:stCondLst>
+                            <p:childTnLst>
                               <p:par>
-                                <p:cTn id="11" presetID="1" presetClass="entr" presetSubtype="0" fill="hold" grpId="0" nodeType="withEffect">
+                                <p:cTn id="13" presetID="1" presetClass="entr" presetSubtype="0" fill="hold" grpId="0" nodeType="clickEffect">
                                   <p:stCondLst>
                                     <p:cond delay="0"/>
                                   </p:stCondLst>
                                   <p:childTnLst>
                                     <p:set>
                                       <p:cBhvr>
-                                        <p:cTn id="12" dur="1" fill="hold">
+                                        <p:cTn id="14" dur="1" fill="hold">
                                           <p:stCondLst>
                                             <p:cond delay="0"/>
                                           </p:stCondLst>
@@ -11349,26 +11226,8 @@
                                   </p:childTnLst>
                                 </p:cTn>
                               </p:par>
-                            </p:childTnLst>
-                          </p:cTn>
-                        </p:par>
-                      </p:childTnLst>
-                    </p:cTn>
-                  </p:par>
-                  <p:par>
-                    <p:cTn id="13" fill="hold">
-                      <p:stCondLst>
-                        <p:cond delay="indefinite"/>
-                      </p:stCondLst>
-                      <p:childTnLst>
-                        <p:par>
-                          <p:cTn id="14" fill="hold">
-                            <p:stCondLst>
-                              <p:cond delay="0"/>
-                            </p:stCondLst>
-                            <p:childTnLst>
                               <p:par>
-                                <p:cTn id="15" presetID="1" presetClass="entr" presetSubtype="0" fill="hold" grpId="0" nodeType="clickEffect">
+                                <p:cTn id="15" presetID="1" presetClass="entr" presetSubtype="0" fill="hold" grpId="0" nodeType="withEffect">
                                   <p:stCondLst>
                                     <p:cond delay="0"/>
                                   </p:stCondLst>
@@ -11381,11 +11240,7 @@
                                           </p:stCondLst>
                                         </p:cTn>
                                         <p:tgtEl>
-                                          <p:spTgt spid="5123">
-                                            <p:txEl>
-                                              <p:pRg st="5" end="5"/>
-                                            </p:txEl>
-                                          </p:spTgt>
+                                          <p:spTgt spid="8"/>
                                         </p:tgtEl>
                                         <p:attrNameLst>
                                           <p:attrName>style.visibility</p:attrName>
@@ -11432,7 +11287,7 @@
                                         <p:tgtEl>
                                           <p:spTgt spid="5123">
                                             <p:txEl>
-                                              <p:pRg st="7" end="7"/>
+                                              <p:pRg st="4" end="4"/>
                                             </p:txEl>
                                           </p:spTgt>
                                         </p:tgtEl>
@@ -11461,9 +11316,54 @@
                                           </p:stCondLst>
                                         </p:cTn>
                                         <p:tgtEl>
+                                          <p:spTgt spid="4"/>
+                                        </p:tgtEl>
+                                        <p:attrNameLst>
+                                          <p:attrName>style.visibility</p:attrName>
+                                        </p:attrNameLst>
+                                      </p:cBhvr>
+                                      <p:to>
+                                        <p:strVal val="visible"/>
+                                      </p:to>
+                                    </p:set>
+                                  </p:childTnLst>
+                                </p:cTn>
+                              </p:par>
+                            </p:childTnLst>
+                          </p:cTn>
+                        </p:par>
+                      </p:childTnLst>
+                    </p:cTn>
+                  </p:par>
+                  <p:par>
+                    <p:cTn id="23" fill="hold">
+                      <p:stCondLst>
+                        <p:cond delay="indefinite"/>
+                      </p:stCondLst>
+                      <p:childTnLst>
+                        <p:par>
+                          <p:cTn id="24" fill="hold">
+                            <p:stCondLst>
+                              <p:cond delay="0"/>
+                            </p:stCondLst>
+                            <p:childTnLst>
+                              <p:par>
+                                <p:cTn id="25" presetID="1" presetClass="entr" presetSubtype="0" fill="hold" grpId="0" nodeType="clickEffect">
+                                  <p:stCondLst>
+                                    <p:cond delay="0"/>
+                                  </p:stCondLst>
+                                  <p:childTnLst>
+                                    <p:set>
+                                      <p:cBhvr>
+                                        <p:cTn id="26" dur="1" fill="hold">
+                                          <p:stCondLst>
+                                            <p:cond delay="0"/>
+                                          </p:stCondLst>
+                                        </p:cTn>
+                                        <p:tgtEl>
                                           <p:spTgt spid="5123">
                                             <p:txEl>
-                                              <p:pRg st="8" end="8"/>
+                                              <p:pRg st="6" end="6"/>
                                             </p:txEl>
                                           </p:spTgt>
                                         </p:tgtEl>
@@ -11479,14 +11379,14 @@
                                 </p:cTn>
                               </p:par>
                               <p:par>
-                                <p:cTn id="23" presetID="1" presetClass="entr" presetSubtype="0" fill="hold" grpId="0" nodeType="withEffect">
+                                <p:cTn id="27" presetID="1" presetClass="entr" presetSubtype="0" fill="hold" grpId="0" nodeType="withEffect">
                                   <p:stCondLst>
                                     <p:cond delay="0"/>
                                   </p:stCondLst>
                                   <p:childTnLst>
                                     <p:set>
                                       <p:cBhvr>
-                                        <p:cTn id="24" dur="1" fill="hold">
+                                        <p:cTn id="28" dur="1" fill="hold">
                                           <p:stCondLst>
                                             <p:cond delay="0"/>
                                           </p:stCondLst>
@@ -11494,7 +11394,38 @@
                                         <p:tgtEl>
                                           <p:spTgt spid="5123">
                                             <p:txEl>
-                                              <p:pRg st="9" end="9"/>
+                                              <p:pRg st="7" end="7"/>
+                                            </p:txEl>
+                                          </p:spTgt>
+                                        </p:tgtEl>
+                                        <p:attrNameLst>
+                                          <p:attrName>style.visibility</p:attrName>
+                                        </p:attrNameLst>
+                                      </p:cBhvr>
+                                      <p:to>
+                                        <p:strVal val="visible"/>
+                                      </p:to>
+                                    </p:set>
+                                  </p:childTnLst>
+                                </p:cTn>
+                              </p:par>
+                              <p:par>
+                                <p:cTn id="29" presetID="1" presetClass="entr" presetSubtype="0" fill="hold" grpId="0" nodeType="withEffect">
+                                  <p:stCondLst>
+                                    <p:cond delay="0"/>
+                                  </p:stCondLst>
+                                  <p:childTnLst>
+                                    <p:set>
+                                      <p:cBhvr>
+                                        <p:cTn id="30" dur="1" fill="hold">
+                                          <p:stCondLst>
+                                            <p:cond delay="0"/>
+                                          </p:stCondLst>
+                                        </p:cTn>
+                                        <p:tgtEl>
+                                          <p:spTgt spid="5123">
+                                            <p:txEl>
+                                              <p:pRg st="8" end="8"/>
                                             </p:txEl>
                                           </p:spTgt>
                                         </p:tgtEl>
@@ -11538,6 +11469,8 @@
     </p:tnLst>
     <p:bldLst>
       <p:bldP spid="5123" grpId="0" uiExpand="1" build="p"/>
+      <p:bldP spid="4" grpId="0" animBg="1"/>
+      <p:bldP spid="8" grpId="0" animBg="1"/>
     </p:bldLst>
   </p:timing>
 </p:sld>
@@ -11843,14 +11776,27 @@
         </p:nvSpPr>
         <p:spPr>
           <a:xfrm>
-            <a:off x="504611" y="1290264"/>
-            <a:ext cx="3782908" cy="830997"/>
+            <a:off x="457200" y="1273223"/>
+            <a:ext cx="3248082" cy="830997"/>
           </a:xfrm>
           <a:prstGeom prst="rect">
             <a:avLst/>
           </a:prstGeom>
-          <a:noFill/>
         </p:spPr>
+        <p:style>
+          <a:lnRef idx="3">
+            <a:schemeClr val="lt1"/>
+          </a:lnRef>
+          <a:fillRef idx="1">
+            <a:schemeClr val="accent2"/>
+          </a:fillRef>
+          <a:effectRef idx="1">
+            <a:schemeClr val="accent2"/>
+          </a:effectRef>
+          <a:fontRef idx="minor">
+            <a:schemeClr val="lt1"/>
+          </a:fontRef>
+        </p:style>
         <p:txBody>
           <a:bodyPr wrap="square">
             <a:spAutoFit/>
@@ -11861,7 +11807,7 @@
               <a:buNone/>
             </a:pPr>
             <a:r>
-              <a:rPr lang="en-US" sz="1600" dirty="0"/>
+              <a:rPr lang="en-US" sz="1600" b="1" dirty="0"/>
               <a:t>CSP algorithms </a:t>
             </a:r>
           </a:p>
@@ -11871,10 +11817,9 @@
               <a:buChar char="•"/>
             </a:pPr>
             <a:r>
-              <a:rPr lang="en-US" sz="1600" b="1" dirty="0"/>
+              <a:rPr lang="en-US" sz="1600" dirty="0"/>
               <a:t>Allow incomplete states.</a:t>
             </a:r>
-            <a:endParaRPr lang="en-US" sz="1600" dirty="0"/>
           </a:p>
           <a:p>
             <a:pPr marL="285750" indent="-285750">
@@ -11882,12 +11827,8 @@
               <a:buChar char="•"/>
             </a:pPr>
             <a:r>
-              <a:rPr lang="en-US" sz="1600" b="1" dirty="0"/>
-              <a:t>States must satisfy all constraints</a:t>
-            </a:r>
-            <a:r>
               <a:rPr lang="en-US" sz="1600" dirty="0"/>
-              <a:t>.</a:t>
+              <a:t>States must satisfy all constraints.</a:t>
             </a:r>
           </a:p>
         </p:txBody>
@@ -11906,7 +11847,7 @@
         </p:nvSpPr>
         <p:spPr>
           <a:xfrm>
-            <a:off x="3743259" y="1519534"/>
+            <a:off x="3847387" y="1457888"/>
             <a:ext cx="534826" cy="461665"/>
           </a:xfrm>
           <a:prstGeom prst="rect">
@@ -11945,14 +11886,27 @@
         </p:nvSpPr>
         <p:spPr>
           <a:xfrm>
-            <a:off x="4267200" y="1290265"/>
-            <a:ext cx="4648200" cy="830997"/>
+            <a:off x="4482524" y="1276849"/>
+            <a:ext cx="4018349" cy="830997"/>
           </a:xfrm>
           <a:prstGeom prst="rect">
             <a:avLst/>
           </a:prstGeom>
-          <a:noFill/>
         </p:spPr>
+        <p:style>
+          <a:lnRef idx="3">
+            <a:schemeClr val="lt1"/>
+          </a:lnRef>
+          <a:fillRef idx="1">
+            <a:schemeClr val="accent3"/>
+          </a:fillRef>
+          <a:effectRef idx="1">
+            <a:schemeClr val="accent3"/>
+          </a:effectRef>
+          <a:fontRef idx="minor">
+            <a:schemeClr val="lt1"/>
+          </a:fontRef>
+        </p:style>
         <p:txBody>
           <a:bodyPr wrap="square">
             <a:spAutoFit/>
@@ -11963,8 +11917,8 @@
               <a:buNone/>
             </a:pPr>
             <a:r>
-              <a:rPr lang="en-US" sz="1600" dirty="0"/>
-              <a:t>Local Search works only with </a:t>
+              <a:rPr lang="en-US" sz="1600" b="1" dirty="0"/>
+              <a:t>Local Search</a:t>
             </a:r>
           </a:p>
           <a:p>
@@ -11973,12 +11927,8 @@
               <a:buChar char="•"/>
             </a:pPr>
             <a:r>
-              <a:rPr lang="en-US" sz="1600" b="1" dirty="0"/>
-              <a:t>Only “complete” states </a:t>
-            </a:r>
-            <a:r>
               <a:rPr lang="en-US" sz="1600" dirty="0"/>
-              <a:t>(all variables are assigned)</a:t>
+              <a:t>Only complete states</a:t>
             </a:r>
           </a:p>
           <a:p>
@@ -11987,12 +11937,8 @@
               <a:buChar char="•"/>
             </a:pPr>
             <a:r>
-              <a:rPr lang="en-US" sz="1600" b="1" dirty="0"/>
-              <a:t>Allows states with unsatisfied constraints</a:t>
-            </a:r>
-            <a:r>
               <a:rPr lang="en-US" sz="1600" dirty="0"/>
-              <a:t>.</a:t>
+              <a:t>Allows states with unsatisfied constraints.</a:t>
             </a:r>
           </a:p>
         </p:txBody>
@@ -12010,12 +11956,12 @@
         <p:spPr>
           <a:xfrm>
             <a:off x="461211" y="2667000"/>
-            <a:ext cx="8229600" cy="3747436"/>
+            <a:ext cx="8229600" cy="1491263"/>
           </a:xfrm>
         </p:spPr>
         <p:txBody>
           <a:bodyPr>
-            <a:normAutofit fontScale="92500" lnSpcReduction="20000"/>
+            <a:normAutofit lnSpcReduction="10000"/>
           </a:bodyPr>
           <a:lstStyle/>
           <a:p>
@@ -12024,7 +11970,7 @@
             </a:pPr>
             <a:r>
               <a:rPr lang="en-US" sz="1900" dirty="0"/>
-              <a:t>Local search can attempt to reduce unsatisfied constraints by the </a:t>
+              <a:t>Local search can attempt to reduce unsatisfied constraints using the </a:t>
             </a:r>
             <a:r>
               <a:rPr lang="en-US" sz="1900" b="1" dirty="0">
@@ -12075,75 +12021,10 @@
             </a:r>
           </a:p>
           <a:p>
-            <a:pPr marL="1028700" lvl="2" indent="-342900">
-              <a:buFont typeface="+mj-lt"/>
-              <a:buAutoNum type="arabicPeriod"/>
-            </a:pPr>
-            <a:endParaRPr lang="en-US" sz="1900" dirty="0"/>
-          </a:p>
-          <a:p>
-            <a:pPr marL="1028700" lvl="2" indent="-342900">
-              <a:buFont typeface="+mj-lt"/>
-              <a:buAutoNum type="arabicPeriod"/>
-            </a:pPr>
-            <a:endParaRPr lang="en-US" sz="1900" dirty="0"/>
-          </a:p>
-          <a:p>
-            <a:pPr marL="1028700" lvl="2" indent="-342900">
-              <a:buFont typeface="+mj-lt"/>
-              <a:buAutoNum type="arabicPeriod"/>
-            </a:pPr>
-            <a:endParaRPr lang="en-US" sz="1900" dirty="0"/>
-          </a:p>
-          <a:p>
-            <a:pPr marL="1028700" lvl="2" indent="-342900">
-              <a:buFont typeface="+mj-lt"/>
-              <a:buAutoNum type="arabicPeriod"/>
-            </a:pPr>
-            <a:endParaRPr lang="en-US" sz="1900" dirty="0"/>
-          </a:p>
-          <a:p>
-            <a:pPr marL="1028700" lvl="2" indent="-342900">
-              <a:buFont typeface="+mj-lt"/>
-              <a:buAutoNum type="arabicPeriod"/>
-            </a:pPr>
-            <a:endParaRPr lang="en-US" sz="1900" dirty="0"/>
-          </a:p>
-          <a:p>
-            <a:pPr marL="1028700" lvl="2" indent="-342900">
-              <a:buFont typeface="+mj-lt"/>
-              <a:buAutoNum type="arabicPeriod"/>
-            </a:pPr>
-            <a:endParaRPr lang="en-US" sz="1900" dirty="0"/>
-          </a:p>
-          <a:p>
-            <a:pPr marL="1028700" lvl="2" indent="-342900">
-              <a:buFont typeface="+mj-lt"/>
-              <a:buAutoNum type="arabicPeriod"/>
-            </a:pPr>
-            <a:endParaRPr lang="en-US" sz="1900" dirty="0"/>
-          </a:p>
-          <a:p>
-            <a:pPr marL="1028700" lvl="2" indent="-342900">
-              <a:buFont typeface="+mj-lt"/>
-              <a:buAutoNum type="arabicPeriod"/>
-            </a:pPr>
-            <a:endParaRPr lang="en-US" sz="1900" dirty="0"/>
-          </a:p>
-          <a:p>
             <a:pPr marL="342900" lvl="1" indent="0">
               <a:buNone/>
             </a:pPr>
             <a:endParaRPr lang="en-US" sz="1900" dirty="0"/>
-          </a:p>
-          <a:p>
-            <a:pPr marL="342900" lvl="1" indent="0">
-              <a:buNone/>
-            </a:pPr>
-            <a:r>
-              <a:rPr lang="en-US" sz="1900" dirty="0"/>
-              <a:t>Local search is often very effective heuristic for CSPs. </a:t>
-            </a:r>
           </a:p>
         </p:txBody>
       </p:sp>
@@ -12477,6 +12358,44 @@
           </p:txBody>
         </p:sp>
       </p:grpSp>
+      <p:sp>
+        <p:nvSpPr>
+          <p:cNvPr id="10" name="TextBox 9">
+            <a:extLst>
+              <a:ext uri="{FF2B5EF4-FFF2-40B4-BE49-F238E27FC236}">
+                <a16:creationId xmlns:a16="http://schemas.microsoft.com/office/drawing/2014/main" id="{7B4D5AFE-BB2E-624F-4437-2654FFC32394}"/>
+              </a:ext>
+            </a:extLst>
+          </p:cNvPr>
+          <p:cNvSpPr txBox="1"/>
+          <p:nvPr/>
+        </p:nvSpPr>
+        <p:spPr>
+          <a:xfrm>
+            <a:off x="207976" y="5867400"/>
+            <a:ext cx="8348473" cy="646331"/>
+          </a:xfrm>
+          <a:prstGeom prst="rect">
+            <a:avLst/>
+          </a:prstGeom>
+          <a:noFill/>
+        </p:spPr>
+        <p:txBody>
+          <a:bodyPr wrap="square">
+            <a:spAutoFit/>
+          </a:bodyPr>
+          <a:lstStyle/>
+          <a:p>
+            <a:pPr marL="342900" lvl="1" indent="0">
+              <a:buNone/>
+            </a:pPr>
+            <a:r>
+              <a:rPr lang="en-US" sz="1800" dirty="0"/>
+              <a:t>Simulated Annealing is often very effective for CSPs. Especially for very large problems where an imperfect solution is acceptable.  </a:t>
+            </a:r>
+          </a:p>
+        </p:txBody>
+      </p:sp>
     </p:spTree>
   </p:cSld>
   <p:clrMapOvr>
@@ -13156,7 +13075,7 @@
           <a:p>
             <a:pPr algn="r"/>
             <a:r>
-              <a:rPr lang="en-US" sz="3500">
+              <a:rPr lang="en-US" sz="3500" dirty="0">
                 <a:solidFill>
                   <a:srgbClr val="FFFFFF"/>
                 </a:solidFill>
@@ -13205,21 +13124,29 @@
             </a:r>
             <a:r>
               <a:rPr lang="en-US" sz="1500" dirty="0"/>
-              <a:t> and defined by a set of variables and values assignments</a:t>
+              <a:t> and defined by a set of variables and value assignments</a:t>
             </a:r>
           </a:p>
           <a:p>
             <a:pPr lvl="1"/>
             <a:r>
               <a:rPr lang="en-US" sz="1500" dirty="0"/>
-              <a:t>The goal is defined by a set of constraints on the variables.</a:t>
+              <a:t>The goal is defined by a set of </a:t>
+            </a:r>
+            <a:r>
+              <a:rPr lang="en-US" sz="1500" b="1" dirty="0"/>
+              <a:t>constraints</a:t>
+            </a:r>
+            <a:r>
+              <a:rPr lang="en-US" sz="1500" dirty="0"/>
+              <a:t> on the variables.</a:t>
             </a:r>
           </a:p>
           <a:p>
             <a:pPr lvl="1"/>
             <a:r>
               <a:rPr lang="en-US" sz="1500" dirty="0"/>
-              <a:t>Incomplete assignments are used to create a complete assignments piece-by-piece.</a:t>
+              <a:t>Incomplete assignments are used to create a complete assignment piece by piece.</a:t>
             </a:r>
           </a:p>
           <a:p>
@@ -13259,8 +13186,12 @@
           </a:p>
           <a:p>
             <a:r>
+              <a:rPr lang="en-US" sz="1500" b="1" dirty="0"/>
+              <a:t>Many problems can be formulated as a CSP</a:t>
+            </a:r>
+            <a:r>
               <a:rPr lang="en-US" sz="1500" dirty="0"/>
-              <a:t>Many problems can be formulated as a CSP and problems where the constraints are very restrictive on the solution space may be easier to solve as CSPs (e.g., scheduling problems and puzzles).</a:t>
+              <a:t>, and problems where the constraints are very restrictive on the solution space may be easier to solve as CSPs (e.g., scheduling problems and puzzles).</a:t>
             </a:r>
             <a:endParaRPr lang="en-US" sz="1500" b="1" dirty="0"/>
           </a:p>
@@ -13295,7 +13226,7 @@
             </a:r>
             <a:r>
               <a:rPr lang="en-US" sz="1500" dirty="0"/>
-              <a:t> can be used as an effective heuristic. It search the space of all complete assignments for consistent assignments = </a:t>
+              <a:t> can be used as an effective heuristic. It searches the space of all complete assignments for consistent assignments = </a:t>
             </a:r>
             <a:r>
               <a:rPr lang="en-US" sz="1500" b="1" dirty="0"/>
@@ -13702,7 +13633,7 @@
           <p:nvPr>
             <p:extLst>
               <p:ext uri="{D42A27DB-BD31-4B8C-83A1-F6EECF244321}">
-                <p14:modId xmlns:p14="http://schemas.microsoft.com/office/powerpoint/2010/main" val="442497797"/>
+                <p14:modId xmlns:p14="http://schemas.microsoft.com/office/powerpoint/2010/main" val="2564876403"/>
               </p:ext>
             </p:extLst>
           </p:nvPr>
@@ -14157,7 +14088,7 @@
                       </a:pPr>
                       <a:r>
                         <a:rPr lang="en-US" sz="1600" dirty="0"/>
-                        <a:t>Enforcement of </a:t>
+                        <a:t>Enforces </a:t>
                       </a:r>
                       <a:r>
                         <a:rPr lang="en-US" sz="1600" b="1" dirty="0"/>
@@ -15970,9 +15901,9 @@
         <p:grpSpPr>
           <a:xfrm>
             <a:off x="5593743" y="762000"/>
-            <a:ext cx="3321657" cy="3341132"/>
+            <a:ext cx="3321657" cy="3323669"/>
             <a:chOff x="5593743" y="762000"/>
-            <a:chExt cx="3321657" cy="3341132"/>
+            <a:chExt cx="3321657" cy="3323669"/>
           </a:xfrm>
         </p:grpSpPr>
         <p:pic>
@@ -16031,7 +15962,7 @@
               <a:r>
                 <a:rPr lang="en-US" sz="3200" i="1" dirty="0">
                   <a:solidFill>
-                    <a:srgbClr val="0000FF"/>
+                    <a:srgbClr val="C00000"/>
                   </a:solidFill>
                   <a:latin typeface="+mn-lt"/>
                 </a:rPr>
@@ -16040,7 +15971,7 @@
               <a:r>
                 <a:rPr lang="en-US" sz="3200" i="1" baseline="-25000" dirty="0">
                   <a:solidFill>
-                    <a:srgbClr val="0000FF"/>
+                    <a:srgbClr val="C00000"/>
                   </a:solidFill>
                   <a:latin typeface="+mn-lt"/>
                 </a:rPr>
@@ -16048,7 +15979,7 @@
               </a:r>
               <a:endParaRPr lang="en-US" sz="3200" dirty="0">
                 <a:solidFill>
-                  <a:srgbClr val="0000FF"/>
+                  <a:srgbClr val="C00000"/>
                 </a:solidFill>
                 <a:latin typeface="+mn-lt"/>
               </a:endParaRPr>
@@ -16135,265 +16066,405 @@
             </a:fontRef>
           </p:style>
         </p:cxnSp>
+        <mc:AlternateContent xmlns:mc="http://schemas.openxmlformats.org/markup-compatibility/2006">
+          <mc:Choice xmlns:a14="http://schemas.microsoft.com/office/drawing/2010/main" Requires="a14">
+            <p:sp>
+              <p:nvSpPr>
+                <p:cNvPr id="11" name="TextBox 10">
+                  <a:extLst>
+                    <a:ext uri="{FF2B5EF4-FFF2-40B4-BE49-F238E27FC236}">
+                      <a16:creationId xmlns:a16="http://schemas.microsoft.com/office/drawing/2014/main" id="{2477BCFB-A7E0-4618-AD47-B26FD79290F3}"/>
+                    </a:ext>
+                  </a:extLst>
+                </p:cNvPr>
+                <p:cNvSpPr txBox="1"/>
+                <p:nvPr/>
+              </p:nvSpPr>
+              <p:spPr>
+                <a:xfrm>
+                  <a:off x="7153275" y="3716337"/>
+                  <a:ext cx="381000" cy="369332"/>
+                </a:xfrm>
+                <a:prstGeom prst="rect">
+                  <a:avLst/>
+                </a:prstGeom>
+                <a:noFill/>
+              </p:spPr>
+              <p:txBody>
+                <a:bodyPr wrap="square" rtlCol="0">
+                  <a:spAutoFit/>
+                </a:bodyPr>
+                <a:lstStyle/>
+                <a:p>
+                  <a14:m>
+                    <m:oMathPara xmlns:m="http://schemas.openxmlformats.org/officeDocument/2006/math">
+                      <m:oMathParaPr>
+                        <m:jc m:val="centerGroup"/>
+                      </m:oMathParaPr>
+                      <m:oMath xmlns:m="http://schemas.openxmlformats.org/officeDocument/2006/math">
+                        <m:r>
+                          <a:rPr lang="en-US" i="1" dirty="0" smtClean="0">
+                            <a:latin typeface="Cambria Math" panose="02040503050406030204" pitchFamily="18" charset="0"/>
+                          </a:rPr>
+                          <m:t>𝑖</m:t>
+                        </m:r>
+                      </m:oMath>
+                    </m:oMathPara>
+                  </a14:m>
+                  <a:endParaRPr lang="en-US" dirty="0"/>
+                </a:p>
+              </p:txBody>
+            </p:sp>
+          </mc:Choice>
+          <mc:Fallback>
+            <p:sp>
+              <p:nvSpPr>
+                <p:cNvPr id="11" name="TextBox 10">
+                  <a:extLst>
+                    <a:ext uri="{FF2B5EF4-FFF2-40B4-BE49-F238E27FC236}">
+                      <a16:creationId xmlns:a16="http://schemas.microsoft.com/office/drawing/2014/main" id="{2477BCFB-A7E0-4618-AD47-B26FD79290F3}"/>
+                    </a:ext>
+                  </a:extLst>
+                </p:cNvPr>
+                <p:cNvSpPr txBox="1">
+                  <a:spLocks noRot="1" noChangeAspect="1" noMove="1" noResize="1" noEditPoints="1" noAdjustHandles="1" noChangeArrowheads="1" noChangeShapeType="1" noTextEdit="1"/>
+                </p:cNvSpPr>
+                <p:nvPr/>
+              </p:nvSpPr>
+              <p:spPr>
+                <a:xfrm>
+                  <a:off x="7153275" y="3716337"/>
+                  <a:ext cx="381000" cy="369332"/>
+                </a:xfrm>
+                <a:prstGeom prst="rect">
+                  <a:avLst/>
+                </a:prstGeom>
+                <a:blipFill>
+                  <a:blip r:embed="rId5"/>
+                  <a:stretch>
+                    <a:fillRect/>
+                  </a:stretch>
+                </a:blipFill>
+              </p:spPr>
+              <p:txBody>
+                <a:bodyPr/>
+                <a:lstStyle/>
+                <a:p>
+                  <a:r>
+                    <a:rPr lang="en-US">
+                      <a:noFill/>
+                    </a:rPr>
+                    <a:t> </a:t>
+                  </a:r>
+                </a:p>
+              </p:txBody>
+            </p:sp>
+          </mc:Fallback>
+        </mc:AlternateContent>
+        <mc:AlternateContent xmlns:mc="http://schemas.openxmlformats.org/markup-compatibility/2006">
+          <mc:Choice xmlns:a14="http://schemas.microsoft.com/office/drawing/2010/main" Requires="a14">
+            <p:sp>
+              <p:nvSpPr>
+                <p:cNvPr id="13" name="TextBox 12">
+                  <a:extLst>
+                    <a:ext uri="{FF2B5EF4-FFF2-40B4-BE49-F238E27FC236}">
+                      <a16:creationId xmlns:a16="http://schemas.microsoft.com/office/drawing/2014/main" id="{5857EF9A-AF6D-4F3F-824B-67378224851C}"/>
+                    </a:ext>
+                  </a:extLst>
+                </p:cNvPr>
+                <p:cNvSpPr txBox="1"/>
+                <p:nvPr/>
+              </p:nvSpPr>
+              <p:spPr>
+                <a:xfrm>
+                  <a:off x="5593743" y="1979890"/>
+                  <a:ext cx="381000" cy="369332"/>
+                </a:xfrm>
+                <a:prstGeom prst="rect">
+                  <a:avLst/>
+                </a:prstGeom>
+                <a:noFill/>
+              </p:spPr>
+              <p:txBody>
+                <a:bodyPr wrap="square" rtlCol="0">
+                  <a:spAutoFit/>
+                </a:bodyPr>
+                <a:lstStyle/>
+                <a:p>
+                  <a14:m>
+                    <m:oMathPara xmlns:m="http://schemas.openxmlformats.org/officeDocument/2006/math">
+                      <m:oMathParaPr>
+                        <m:jc m:val="centerGroup"/>
+                      </m:oMathParaPr>
+                      <m:oMath xmlns:m="http://schemas.openxmlformats.org/officeDocument/2006/math">
+                        <m:r>
+                          <a:rPr lang="en-US" i="1" dirty="0" smtClean="0">
+                            <a:latin typeface="Cambria Math" panose="02040503050406030204" pitchFamily="18" charset="0"/>
+                          </a:rPr>
+                          <m:t>𝑗</m:t>
+                        </m:r>
+                      </m:oMath>
+                    </m:oMathPara>
+                  </a14:m>
+                  <a:endParaRPr lang="en-US" dirty="0"/>
+                </a:p>
+              </p:txBody>
+            </p:sp>
+          </mc:Choice>
+          <mc:Fallback>
+            <p:sp>
+              <p:nvSpPr>
+                <p:cNvPr id="13" name="TextBox 12">
+                  <a:extLst>
+                    <a:ext uri="{FF2B5EF4-FFF2-40B4-BE49-F238E27FC236}">
+                      <a16:creationId xmlns:a16="http://schemas.microsoft.com/office/drawing/2014/main" id="{5857EF9A-AF6D-4F3F-824B-67378224851C}"/>
+                    </a:ext>
+                  </a:extLst>
+                </p:cNvPr>
+                <p:cNvSpPr txBox="1">
+                  <a:spLocks noRot="1" noChangeAspect="1" noMove="1" noResize="1" noEditPoints="1" noAdjustHandles="1" noChangeArrowheads="1" noChangeShapeType="1" noTextEdit="1"/>
+                </p:cNvSpPr>
+                <p:nvPr/>
+              </p:nvSpPr>
+              <p:spPr>
+                <a:xfrm>
+                  <a:off x="5593743" y="1979890"/>
+                  <a:ext cx="381000" cy="369332"/>
+                </a:xfrm>
+                <a:prstGeom prst="rect">
+                  <a:avLst/>
+                </a:prstGeom>
+                <a:blipFill>
+                  <a:blip r:embed="rId6"/>
+                  <a:stretch>
+                    <a:fillRect b="-13333"/>
+                  </a:stretch>
+                </a:blipFill>
+              </p:spPr>
+              <p:txBody>
+                <a:bodyPr/>
+                <a:lstStyle/>
+                <a:p>
+                  <a:r>
+                    <a:rPr lang="en-US">
+                      <a:noFill/>
+                    </a:rPr>
+                    <a:t> </a:t>
+                  </a:r>
+                </a:p>
+              </p:txBody>
+            </p:sp>
+          </mc:Fallback>
+        </mc:AlternateContent>
+      </p:grpSp>
+      <p:grpSp>
+        <p:nvGrpSpPr>
+          <p:cNvPr id="12" name="Group 11">
+            <a:extLst>
+              <a:ext uri="{FF2B5EF4-FFF2-40B4-BE49-F238E27FC236}">
+                <a16:creationId xmlns:a16="http://schemas.microsoft.com/office/drawing/2014/main" id="{AD7F4891-C78C-D553-C83D-B612938061E8}"/>
+              </a:ext>
+            </a:extLst>
+          </p:cNvPr>
+          <p:cNvGrpSpPr/>
+          <p:nvPr/>
+        </p:nvGrpSpPr>
+        <p:grpSpPr>
+          <a:xfrm>
+            <a:off x="6172200" y="3962400"/>
+            <a:ext cx="2626473" cy="2057390"/>
+            <a:chOff x="6172200" y="3962400"/>
+            <a:chExt cx="2626473" cy="2057390"/>
+          </a:xfrm>
+        </p:grpSpPr>
         <p:sp>
           <p:nvSpPr>
-            <p:cNvPr id="11" name="TextBox 10">
+            <p:cNvPr id="4" name="Right Brace 3">
               <a:extLst>
                 <a:ext uri="{FF2B5EF4-FFF2-40B4-BE49-F238E27FC236}">
-                  <a16:creationId xmlns:a16="http://schemas.microsoft.com/office/drawing/2014/main" id="{2477BCFB-A7E0-4618-AD47-B26FD79290F3}"/>
+                  <a16:creationId xmlns:a16="http://schemas.microsoft.com/office/drawing/2014/main" id="{F31DDE1D-B800-422E-BE8D-836463FE5447}"/>
+                </a:ext>
+                <a:ext uri="{C183D7F6-B498-43B3-948B-1728B52AA6E4}">
+                  <adec:decorative xmlns:adec="http://schemas.microsoft.com/office/drawing/2017/decorative" val="1"/>
                 </a:ext>
               </a:extLst>
             </p:cNvPr>
-            <p:cNvSpPr txBox="1"/>
+            <p:cNvSpPr/>
             <p:nvPr/>
           </p:nvSpPr>
           <p:spPr>
             <a:xfrm>
-              <a:off x="7239000" y="3733800"/>
-              <a:ext cx="381000" cy="369332"/>
+              <a:off x="6172200" y="3962400"/>
+              <a:ext cx="381000" cy="2057390"/>
             </a:xfrm>
-            <a:prstGeom prst="rect">
+            <a:prstGeom prst="rightBrace">
               <a:avLst/>
             </a:prstGeom>
-            <a:noFill/>
           </p:spPr>
+          <p:style>
+            <a:lnRef idx="1">
+              <a:schemeClr val="accent1"/>
+            </a:lnRef>
+            <a:fillRef idx="0">
+              <a:schemeClr val="accent1"/>
+            </a:fillRef>
+            <a:effectRef idx="0">
+              <a:schemeClr val="accent1"/>
+            </a:effectRef>
+            <a:fontRef idx="minor">
+              <a:schemeClr val="tx1"/>
+            </a:fontRef>
+          </p:style>
           <p:txBody>
-            <a:bodyPr wrap="square" rtlCol="0">
-              <a:spAutoFit/>
-            </a:bodyPr>
+            <a:bodyPr rtlCol="0" anchor="ctr"/>
             <a:lstStyle/>
             <a:p>
-              <a:r>
-                <a:rPr lang="en-US" dirty="0" err="1"/>
-                <a:t>i</a:t>
-              </a:r>
-              <a:endParaRPr lang="en-US" dirty="0"/>
+              <a:pPr algn="ctr"/>
+              <a:endParaRPr lang="en-US"/>
             </a:p>
           </p:txBody>
         </p:sp>
-        <p:sp>
-          <p:nvSpPr>
-            <p:cNvPr id="13" name="TextBox 12">
-              <a:extLst>
-                <a:ext uri="{FF2B5EF4-FFF2-40B4-BE49-F238E27FC236}">
-                  <a16:creationId xmlns:a16="http://schemas.microsoft.com/office/drawing/2014/main" id="{5857EF9A-AF6D-4F3F-824B-67378224851C}"/>
-                </a:ext>
-              </a:extLst>
-            </p:cNvPr>
-            <p:cNvSpPr txBox="1"/>
-            <p:nvPr/>
-          </p:nvSpPr>
-          <p:spPr>
-            <a:xfrm>
-              <a:off x="5593743" y="1979890"/>
-              <a:ext cx="381000" cy="369332"/>
-            </a:xfrm>
-            <a:prstGeom prst="rect">
-              <a:avLst/>
-            </a:prstGeom>
-            <a:noFill/>
-          </p:spPr>
-          <p:txBody>
-            <a:bodyPr wrap="square" rtlCol="0">
-              <a:spAutoFit/>
-            </a:bodyPr>
-            <a:lstStyle/>
-            <a:p>
-              <a:r>
-                <a:rPr lang="en-US" dirty="0"/>
-                <a:t>j</a:t>
-              </a:r>
-            </a:p>
-          </p:txBody>
-        </p:sp>
+        <mc:AlternateContent xmlns:mc="http://schemas.openxmlformats.org/markup-compatibility/2006">
+          <mc:Choice xmlns:a14="http://schemas.microsoft.com/office/drawing/2010/main" Requires="a14">
+            <p:sp>
+              <p:nvSpPr>
+                <p:cNvPr id="7" name="Rectangle 6">
+                  <a:extLst>
+                    <a:ext uri="{FF2B5EF4-FFF2-40B4-BE49-F238E27FC236}">
+                      <a16:creationId xmlns:a16="http://schemas.microsoft.com/office/drawing/2014/main" id="{0D037137-9DE6-4B8C-993A-729EBD7BA105}"/>
+                    </a:ext>
+                  </a:extLst>
+                </p:cNvPr>
+                <p:cNvSpPr/>
+                <p:nvPr/>
+              </p:nvSpPr>
+              <p:spPr>
+                <a:xfrm>
+                  <a:off x="6705600" y="4777259"/>
+                  <a:ext cx="2093073" cy="404341"/>
+                </a:xfrm>
+                <a:prstGeom prst="rect">
+                  <a:avLst/>
+                </a:prstGeom>
+              </p:spPr>
+              <p:txBody>
+                <a:bodyPr wrap="none">
+                  <a:spAutoFit/>
+                </a:bodyPr>
+                <a:lstStyle/>
+                <a:p>
+                  <a:pPr>
+                    <a:lnSpc>
+                      <a:spcPct val="140000"/>
+                    </a:lnSpc>
+                  </a:pPr>
+                  <a:r>
+                    <a:rPr lang="en-US" sz="1600" dirty="0"/>
+                    <a:t>for </a:t>
+                  </a:r>
+                  <a14:m>
+                    <m:oMath xmlns:m="http://schemas.openxmlformats.org/officeDocument/2006/math">
+                      <m:r>
+                        <a:rPr lang="en-US" sz="1600" i="1">
+                          <a:latin typeface="Cambria Math" panose="02040503050406030204" pitchFamily="18" charset="0"/>
+                        </a:rPr>
+                        <m:t>𝑖</m:t>
+                      </m:r>
+                      <m:r>
+                        <a:rPr lang="en-US" sz="1600" i="1">
+                          <a:latin typeface="Cambria Math" panose="02040503050406030204" pitchFamily="18" charset="0"/>
+                        </a:rPr>
+                        <m:t>,</m:t>
+                      </m:r>
+                      <m:r>
+                        <a:rPr lang="en-US" sz="1600" i="1">
+                          <a:latin typeface="Cambria Math" panose="02040503050406030204" pitchFamily="18" charset="0"/>
+                        </a:rPr>
+                        <m:t>𝑗</m:t>
+                      </m:r>
+                      <m:r>
+                        <a:rPr lang="en-US" sz="1600" b="0" i="1" smtClean="0">
+                          <a:latin typeface="Cambria Math" panose="02040503050406030204" pitchFamily="18" charset="0"/>
+                        </a:rPr>
+                        <m:t>,</m:t>
+                      </m:r>
+                      <m:r>
+                        <a:rPr lang="en-US" sz="1600" b="0" i="1" smtClean="0">
+                          <a:latin typeface="Cambria Math" panose="02040503050406030204" pitchFamily="18" charset="0"/>
+                        </a:rPr>
+                        <m:t>𝑘</m:t>
+                      </m:r>
+                      <m:r>
+                        <a:rPr lang="en-US" sz="1600" i="1">
+                          <a:latin typeface="Cambria Math" panose="02040503050406030204" pitchFamily="18" charset="0"/>
+                        </a:rPr>
+                        <m:t>∈{1, 2, …, </m:t>
+                      </m:r>
+                      <m:r>
+                        <a:rPr lang="en-US" sz="1600" i="1">
+                          <a:latin typeface="Cambria Math" panose="02040503050406030204" pitchFamily="18" charset="0"/>
+                        </a:rPr>
+                        <m:t>𝑁</m:t>
+                      </m:r>
+                      <m:r>
+                        <a:rPr lang="en-US" sz="1600" i="1">
+                          <a:latin typeface="Cambria Math" panose="02040503050406030204" pitchFamily="18" charset="0"/>
+                        </a:rPr>
+                        <m:t>}</m:t>
+                      </m:r>
+                    </m:oMath>
+                  </a14:m>
+                  <a:endParaRPr lang="en-US" sz="1600" dirty="0"/>
+                </a:p>
+              </p:txBody>
+            </p:sp>
+          </mc:Choice>
+          <mc:Fallback>
+            <p:sp>
+              <p:nvSpPr>
+                <p:cNvPr id="7" name="Rectangle 6">
+                  <a:extLst>
+                    <a:ext uri="{FF2B5EF4-FFF2-40B4-BE49-F238E27FC236}">
+                      <a16:creationId xmlns:a16="http://schemas.microsoft.com/office/drawing/2014/main" id="{0D037137-9DE6-4B8C-993A-729EBD7BA105}"/>
+                    </a:ext>
+                  </a:extLst>
+                </p:cNvPr>
+                <p:cNvSpPr>
+                  <a:spLocks noRot="1" noChangeAspect="1" noMove="1" noResize="1" noEditPoints="1" noAdjustHandles="1" noChangeArrowheads="1" noChangeShapeType="1" noTextEdit="1"/>
+                </p:cNvSpPr>
+                <p:nvPr/>
+              </p:nvSpPr>
+              <p:spPr>
+                <a:xfrm>
+                  <a:off x="6705600" y="4777259"/>
+                  <a:ext cx="2093073" cy="404341"/>
+                </a:xfrm>
+                <a:prstGeom prst="rect">
+                  <a:avLst/>
+                </a:prstGeom>
+                <a:blipFill>
+                  <a:blip r:embed="rId7"/>
+                  <a:stretch>
+                    <a:fillRect l="-1458" b="-19697"/>
+                  </a:stretch>
+                </a:blipFill>
+              </p:spPr>
+              <p:txBody>
+                <a:bodyPr/>
+                <a:lstStyle/>
+                <a:p>
+                  <a:r>
+                    <a:rPr lang="en-US">
+                      <a:noFill/>
+                    </a:rPr>
+                    <a:t> </a:t>
+                  </a:r>
+                </a:p>
+              </p:txBody>
+            </p:sp>
+          </mc:Fallback>
+        </mc:AlternateContent>
       </p:grpSp>
-      <p:sp>
-        <p:nvSpPr>
-          <p:cNvPr id="4" name="Right Brace 3">
-            <a:extLst>
-              <a:ext uri="{FF2B5EF4-FFF2-40B4-BE49-F238E27FC236}">
-                <a16:creationId xmlns:a16="http://schemas.microsoft.com/office/drawing/2014/main" id="{F31DDE1D-B800-422E-BE8D-836463FE5447}"/>
-              </a:ext>
-              <a:ext uri="{C183D7F6-B498-43B3-948B-1728B52AA6E4}">
-                <adec:decorative xmlns:adec="http://schemas.microsoft.com/office/drawing/2017/decorative" val="1"/>
-              </a:ext>
-            </a:extLst>
-          </p:cNvPr>
-          <p:cNvSpPr/>
-          <p:nvPr/>
-        </p:nvSpPr>
-        <p:spPr>
-          <a:xfrm>
-            <a:off x="6172200" y="3962400"/>
-            <a:ext cx="381000" cy="2057390"/>
-          </a:xfrm>
-          <a:prstGeom prst="rightBrace">
-            <a:avLst/>
-          </a:prstGeom>
-        </p:spPr>
-        <p:style>
-          <a:lnRef idx="1">
-            <a:schemeClr val="accent1"/>
-          </a:lnRef>
-          <a:fillRef idx="0">
-            <a:schemeClr val="accent1"/>
-          </a:fillRef>
-          <a:effectRef idx="0">
-            <a:schemeClr val="accent1"/>
-          </a:effectRef>
-          <a:fontRef idx="minor">
-            <a:schemeClr val="tx1"/>
-          </a:fontRef>
-        </p:style>
-        <p:txBody>
-          <a:bodyPr rtlCol="0" anchor="ctr"/>
-          <a:lstStyle/>
-          <a:p>
-            <a:pPr algn="ctr"/>
-            <a:endParaRPr lang="en-US"/>
-          </a:p>
-        </p:txBody>
-      </p:sp>
-      <mc:AlternateContent xmlns:mc="http://schemas.openxmlformats.org/markup-compatibility/2006" xmlns:a14="http://schemas.microsoft.com/office/drawing/2010/main">
-        <mc:Choice Requires="a14">
-          <p:sp>
-            <p:nvSpPr>
-              <p:cNvPr id="7" name="Rectangle 6">
-                <a:extLst>
-                  <a:ext uri="{FF2B5EF4-FFF2-40B4-BE49-F238E27FC236}">
-                    <a16:creationId xmlns:a16="http://schemas.microsoft.com/office/drawing/2014/main" id="{0D037137-9DE6-4B8C-993A-729EBD7BA105}"/>
-                  </a:ext>
-                </a:extLst>
-              </p:cNvPr>
-              <p:cNvSpPr/>
-              <p:nvPr/>
-            </p:nvSpPr>
-            <p:spPr>
-              <a:xfrm>
-                <a:off x="6705600" y="4777259"/>
-                <a:ext cx="2093073" cy="404341"/>
-              </a:xfrm>
-              <a:prstGeom prst="rect">
-                <a:avLst/>
-              </a:prstGeom>
-            </p:spPr>
-            <p:txBody>
-              <a:bodyPr wrap="none">
-                <a:spAutoFit/>
-              </a:bodyPr>
-              <a:lstStyle/>
-              <a:p>
-                <a:pPr>
-                  <a:lnSpc>
-                    <a:spcPct val="140000"/>
-                  </a:lnSpc>
-                </a:pPr>
-                <a:r>
-                  <a:rPr lang="en-US" sz="1600" dirty="0"/>
-                  <a:t>for </a:t>
-                </a:r>
-                <a14:m>
-                  <m:oMath xmlns:m="http://schemas.openxmlformats.org/officeDocument/2006/math">
-                    <m:r>
-                      <a:rPr lang="en-US" sz="1600" i="1">
-                        <a:latin typeface="Cambria Math" panose="02040503050406030204" pitchFamily="18" charset="0"/>
-                      </a:rPr>
-                      <m:t>𝑖</m:t>
-                    </m:r>
-                    <m:r>
-                      <a:rPr lang="en-US" sz="1600" i="1">
-                        <a:latin typeface="Cambria Math" panose="02040503050406030204" pitchFamily="18" charset="0"/>
-                      </a:rPr>
-                      <m:t>,</m:t>
-                    </m:r>
-                    <m:r>
-                      <a:rPr lang="en-US" sz="1600" i="1">
-                        <a:latin typeface="Cambria Math" panose="02040503050406030204" pitchFamily="18" charset="0"/>
-                      </a:rPr>
-                      <m:t>𝑗</m:t>
-                    </m:r>
-                    <m:r>
-                      <a:rPr lang="en-US" sz="1600" b="0" i="1" smtClean="0">
-                        <a:latin typeface="Cambria Math" panose="02040503050406030204" pitchFamily="18" charset="0"/>
-                      </a:rPr>
-                      <m:t>,</m:t>
-                    </m:r>
-                    <m:r>
-                      <a:rPr lang="en-US" sz="1600" b="0" i="1" smtClean="0">
-                        <a:latin typeface="Cambria Math" panose="02040503050406030204" pitchFamily="18" charset="0"/>
-                      </a:rPr>
-                      <m:t>𝑘</m:t>
-                    </m:r>
-                    <m:r>
-                      <a:rPr lang="en-US" sz="1600" i="1">
-                        <a:latin typeface="Cambria Math" panose="02040503050406030204" pitchFamily="18" charset="0"/>
-                      </a:rPr>
-                      <m:t>∈{1, 2, …, </m:t>
-                    </m:r>
-                    <m:r>
-                      <a:rPr lang="en-US" sz="1600" i="1">
-                        <a:latin typeface="Cambria Math" panose="02040503050406030204" pitchFamily="18" charset="0"/>
-                      </a:rPr>
-                      <m:t>𝑁</m:t>
-                    </m:r>
-                    <m:r>
-                      <a:rPr lang="en-US" sz="1600" i="1">
-                        <a:latin typeface="Cambria Math" panose="02040503050406030204" pitchFamily="18" charset="0"/>
-                      </a:rPr>
-                      <m:t>}</m:t>
-                    </m:r>
-                  </m:oMath>
-                </a14:m>
-                <a:endParaRPr lang="en-US" sz="1600" dirty="0"/>
-              </a:p>
-            </p:txBody>
-          </p:sp>
-        </mc:Choice>
-        <mc:Fallback xmlns="">
-          <p:sp>
-            <p:nvSpPr>
-              <p:cNvPr id="7" name="Rectangle 6">
-                <a:extLst>
-                  <a:ext uri="{FF2B5EF4-FFF2-40B4-BE49-F238E27FC236}">
-                    <a16:creationId xmlns:a16="http://schemas.microsoft.com/office/drawing/2014/main" id="{0D037137-9DE6-4B8C-993A-729EBD7BA105}"/>
-                  </a:ext>
-                </a:extLst>
-              </p:cNvPr>
-              <p:cNvSpPr>
-                <a:spLocks noRot="1" noChangeAspect="1" noMove="1" noResize="1" noEditPoints="1" noAdjustHandles="1" noChangeArrowheads="1" noChangeShapeType="1" noTextEdit="1"/>
-              </p:cNvSpPr>
-              <p:nvPr/>
-            </p:nvSpPr>
-            <p:spPr>
-              <a:xfrm>
-                <a:off x="6705600" y="4777259"/>
-                <a:ext cx="2093073" cy="404341"/>
-              </a:xfrm>
-              <a:prstGeom prst="rect">
-                <a:avLst/>
-              </a:prstGeom>
-              <a:blipFill>
-                <a:blip r:embed="rId5"/>
-                <a:stretch>
-                  <a:fillRect l="-1458" b="-19697"/>
-                </a:stretch>
-              </a:blipFill>
-            </p:spPr>
-            <p:txBody>
-              <a:bodyPr/>
-              <a:lstStyle/>
-              <a:p>
-                <a:r>
-                  <a:rPr lang="en-US">
-                    <a:noFill/>
-                  </a:rPr>
-                  <a:t> </a:t>
-                </a:r>
-              </a:p>
-            </p:txBody>
-          </p:sp>
-        </mc:Fallback>
-      </mc:AlternateContent>
       <p:sp>
         <p:nvSpPr>
           <p:cNvPr id="9" name="Star: 5 Points 8">
@@ -16834,6 +16905,33 @@
                                               <p:pRg st="8" end="8"/>
                                             </p:txEl>
                                           </p:spTgt>
+                                        </p:tgtEl>
+                                        <p:attrNameLst>
+                                          <p:attrName>style.visibility</p:attrName>
+                                        </p:attrNameLst>
+                                      </p:cBhvr>
+                                      <p:to>
+                                        <p:strVal val="visible"/>
+                                      </p:to>
+                                    </p:set>
+                                  </p:childTnLst>
+                                </p:cTn>
+                              </p:par>
+                              <p:par>
+                                <p:cTn id="25" presetID="1" presetClass="entr" presetSubtype="0" fill="hold" nodeType="withEffect">
+                                  <p:stCondLst>
+                                    <p:cond delay="0"/>
+                                  </p:stCondLst>
+                                  <p:childTnLst>
+                                    <p:set>
+                                      <p:cBhvr>
+                                        <p:cTn id="26" dur="1" fill="hold">
+                                          <p:stCondLst>
+                                            <p:cond delay="0"/>
+                                          </p:stCondLst>
+                                        </p:cTn>
+                                        <p:tgtEl>
+                                          <p:spTgt spid="12"/>
                                         </p:tgtEl>
                                         <p:attrNameLst>
                                           <p:attrName>style.visibility</p:attrName>
@@ -17375,17 +17473,26 @@
             <a:p>
               <a:r>
                 <a:rPr lang="en-US" sz="3200" i="1" dirty="0">
+                  <a:solidFill>
+                    <a:srgbClr val="C00000"/>
+                  </a:solidFill>
                   <a:latin typeface="+mn-lt"/>
                 </a:rPr>
                 <a:t>Q</a:t>
               </a:r>
               <a:r>
                 <a:rPr lang="en-US" sz="3200" baseline="-25000" dirty="0">
+                  <a:solidFill>
+                    <a:srgbClr val="C00000"/>
+                  </a:solidFill>
                   <a:latin typeface="+mn-lt"/>
                 </a:rPr>
                 <a:t>2</a:t>
               </a:r>
               <a:endParaRPr lang="en-US" sz="3200" dirty="0">
+                <a:solidFill>
+                  <a:srgbClr val="C00000"/>
+                </a:solidFill>
                 <a:latin typeface="+mn-lt"/>
               </a:endParaRPr>
             </a:p>
@@ -17414,17 +17521,26 @@
             <a:p>
               <a:r>
                 <a:rPr lang="en-US" sz="3200" i="1" dirty="0">
+                  <a:solidFill>
+                    <a:srgbClr val="C00000"/>
+                  </a:solidFill>
                   <a:latin typeface="+mn-lt"/>
                 </a:rPr>
                 <a:t>Q</a:t>
               </a:r>
               <a:r>
                 <a:rPr lang="en-US" sz="3200" baseline="-25000" dirty="0">
+                  <a:solidFill>
+                    <a:srgbClr val="C00000"/>
+                  </a:solidFill>
                   <a:latin typeface="+mn-lt"/>
                 </a:rPr>
                 <a:t>1</a:t>
               </a:r>
               <a:endParaRPr lang="en-US" sz="3200" dirty="0">
+                <a:solidFill>
+                  <a:srgbClr val="C00000"/>
+                </a:solidFill>
                 <a:latin typeface="+mn-lt"/>
               </a:endParaRPr>
             </a:p>
@@ -17453,17 +17569,26 @@
             <a:p>
               <a:r>
                 <a:rPr lang="en-US" sz="3200" i="1" dirty="0">
+                  <a:solidFill>
+                    <a:srgbClr val="C00000"/>
+                  </a:solidFill>
                   <a:latin typeface="+mn-lt"/>
                 </a:rPr>
                 <a:t>Q</a:t>
               </a:r>
               <a:r>
                 <a:rPr lang="en-US" sz="3200" baseline="-25000" dirty="0">
+                  <a:solidFill>
+                    <a:srgbClr val="C00000"/>
+                  </a:solidFill>
                   <a:latin typeface="+mn-lt"/>
                 </a:rPr>
                 <a:t>3</a:t>
               </a:r>
               <a:endParaRPr lang="en-US" sz="3200" dirty="0">
+                <a:solidFill>
+                  <a:srgbClr val="C00000"/>
+                </a:solidFill>
                 <a:latin typeface="+mn-lt"/>
               </a:endParaRPr>
             </a:p>
@@ -17492,17 +17617,26 @@
             <a:p>
               <a:r>
                 <a:rPr lang="en-US" sz="3200" i="1" dirty="0">
+                  <a:solidFill>
+                    <a:srgbClr val="C00000"/>
+                  </a:solidFill>
                   <a:latin typeface="+mn-lt"/>
                 </a:rPr>
                 <a:t>Q</a:t>
               </a:r>
               <a:r>
                 <a:rPr lang="en-US" sz="3200" baseline="-25000" dirty="0">
+                  <a:solidFill>
+                    <a:srgbClr val="C00000"/>
+                  </a:solidFill>
                   <a:latin typeface="+mn-lt"/>
                 </a:rPr>
                 <a:t>4</a:t>
               </a:r>
               <a:endParaRPr lang="en-US" sz="3200" dirty="0">
+                <a:solidFill>
+                  <a:srgbClr val="C00000"/>
+                </a:solidFill>
                 <a:latin typeface="+mn-lt"/>
               </a:endParaRPr>
             </a:p>
@@ -17833,6 +17967,33 @@
                                   </p:childTnLst>
                                 </p:cTn>
                               </p:par>
+                              <p:par>
+                                <p:cTn id="11" presetID="1" presetClass="entr" presetSubtype="0" fill="hold" grpId="0" nodeType="withEffect">
+                                  <p:stCondLst>
+                                    <p:cond delay="0"/>
+                                  </p:stCondLst>
+                                  <p:childTnLst>
+                                    <p:set>
+                                      <p:cBhvr>
+                                        <p:cTn id="12" dur="1" fill="hold">
+                                          <p:stCondLst>
+                                            <p:cond delay="0"/>
+                                          </p:stCondLst>
+                                        </p:cTn>
+                                        <p:tgtEl>
+                                          <p:spTgt spid="4"/>
+                                        </p:tgtEl>
+                                        <p:attrNameLst>
+                                          <p:attrName>style.visibility</p:attrName>
+                                        </p:attrNameLst>
+                                      </p:cBhvr>
+                                      <p:to>
+                                        <p:strVal val="visible"/>
+                                      </p:to>
+                                    </p:set>
+                                  </p:childTnLst>
+                                </p:cTn>
+                              </p:par>
                             </p:childTnLst>
                           </p:cTn>
                         </p:par>
@@ -17840,26 +18001,26 @@
                     </p:cTn>
                   </p:par>
                   <p:par>
-                    <p:cTn id="11" fill="hold">
+                    <p:cTn id="13" fill="hold">
                       <p:stCondLst>
                         <p:cond delay="indefinite"/>
                       </p:stCondLst>
                       <p:childTnLst>
                         <p:par>
-                          <p:cTn id="12" fill="hold">
+                          <p:cTn id="14" fill="hold">
                             <p:stCondLst>
                               <p:cond delay="0"/>
                             </p:stCondLst>
                             <p:childTnLst>
                               <p:par>
-                                <p:cTn id="13" presetID="1" presetClass="entr" presetSubtype="0" fill="hold" grpId="0" nodeType="clickEffect">
+                                <p:cTn id="15" presetID="1" presetClass="entr" presetSubtype="0" fill="hold" grpId="0" nodeType="clickEffect">
                                   <p:stCondLst>
                                     <p:cond delay="0"/>
                                   </p:stCondLst>
                                   <p:childTnLst>
                                     <p:set>
                                       <p:cBhvr>
-                                        <p:cTn id="14" dur="1" fill="hold">
+                                        <p:cTn id="16" dur="1" fill="hold">
                                           <p:stCondLst>
                                             <p:cond delay="0"/>
                                           </p:stCondLst>
@@ -17883,14 +18044,14 @@
                                 </p:cTn>
                               </p:par>
                               <p:par>
-                                <p:cTn id="15" presetID="1" presetClass="entr" presetSubtype="0" fill="hold" grpId="0" nodeType="withEffect">
+                                <p:cTn id="17" presetID="1" presetClass="entr" presetSubtype="0" fill="hold" grpId="0" nodeType="withEffect">
                                   <p:stCondLst>
                                     <p:cond delay="0"/>
                                   </p:stCondLst>
                                   <p:childTnLst>
                                     <p:set>
                                       <p:cBhvr>
-                                        <p:cTn id="16" dur="1" fill="hold">
+                                        <p:cTn id="18" dur="1" fill="hold">
                                           <p:stCondLst>
                                             <p:cond delay="0"/>
                                           </p:stCondLst>
@@ -17942,6 +18103,7 @@
     </p:tnLst>
     <p:bldLst>
       <p:bldP spid="3" grpId="0" uiExpand="1" build="p"/>
+      <p:bldP spid="4" grpId="0"/>
     </p:bldLst>
   </p:timing>
 </p:sld>
@@ -18211,8 +18373,8 @@
         </p:nvGrpSpPr>
         <p:grpSpPr>
           <a:xfrm>
-            <a:off x="5638800" y="2209800"/>
-            <a:ext cx="3038475" cy="3057525"/>
+            <a:off x="4267200" y="1690689"/>
+            <a:ext cx="4410075" cy="4124325"/>
             <a:chOff x="5638800" y="2209800"/>
             <a:chExt cx="3038475" cy="3057525"/>
           </a:xfrm>
@@ -18257,8 +18419,8 @@
           </p:nvSpPr>
           <p:spPr>
             <a:xfrm>
-              <a:off x="6993534" y="3505200"/>
-              <a:ext cx="397866" cy="400110"/>
+              <a:off x="6991708" y="3516618"/>
+              <a:ext cx="332658" cy="387884"/>
             </a:xfrm>
             <a:prstGeom prst="rect">
               <a:avLst/>
@@ -18271,26 +18433,26 @@
             <a:lstStyle/>
             <a:p>
               <a:r>
-                <a:rPr lang="en-US" sz="2000" i="1" dirty="0">
+                <a:rPr lang="en-US" sz="2800" i="1" dirty="0">
                   <a:solidFill>
-                    <a:srgbClr val="0000FF"/>
+                    <a:srgbClr val="C00000"/>
                   </a:solidFill>
                   <a:latin typeface="+mn-lt"/>
                 </a:rPr>
                 <a:t>X</a:t>
               </a:r>
               <a:r>
-                <a:rPr lang="en-US" sz="2000" i="1" baseline="-25000" dirty="0">
+                <a:rPr lang="en-US" sz="2800" i="1" baseline="-25000" dirty="0">
                   <a:solidFill>
-                    <a:srgbClr val="0000FF"/>
+                    <a:srgbClr val="C00000"/>
                   </a:solidFill>
                   <a:latin typeface="+mn-lt"/>
                 </a:rPr>
                 <a:t>ij</a:t>
               </a:r>
-              <a:endParaRPr lang="en-US" sz="2000" dirty="0">
+              <a:endParaRPr lang="en-US" sz="2800" dirty="0">
                 <a:solidFill>
-                  <a:srgbClr val="0000FF"/>
+                  <a:srgbClr val="C00000"/>
                 </a:solidFill>
                 <a:latin typeface="+mn-lt"/>
               </a:endParaRPr>
@@ -18452,33 +18614,15 @@
                                   </p:childTnLst>
                                 </p:cTn>
                               </p:par>
-                            </p:childTnLst>
-                          </p:cTn>
-                        </p:par>
-                      </p:childTnLst>
-                    </p:cTn>
-                  </p:par>
-                  <p:par>
-                    <p:cTn id="15" fill="hold">
-                      <p:stCondLst>
-                        <p:cond delay="indefinite"/>
-                      </p:stCondLst>
-                      <p:childTnLst>
-                        <p:par>
-                          <p:cTn id="16" fill="hold">
-                            <p:stCondLst>
-                              <p:cond delay="0"/>
-                            </p:stCondLst>
-                            <p:childTnLst>
                               <p:par>
-                                <p:cTn id="17" presetID="1" presetClass="entr" presetSubtype="0" fill="hold" grpId="0" nodeType="clickEffect">
+                                <p:cTn id="15" presetID="1" presetClass="entr" presetSubtype="0" fill="hold" grpId="0" nodeType="withEffect">
                                   <p:stCondLst>
                                     <p:cond delay="0"/>
                                   </p:stCondLst>
                                   <p:childTnLst>
                                     <p:set>
                                       <p:cBhvr>
-                                        <p:cTn id="18" dur="1" fill="hold">
+                                        <p:cTn id="16" dur="1" fill="hold">
                                           <p:stCondLst>
                                             <p:cond delay="0"/>
                                           </p:stCondLst>
@@ -18502,14 +18646,14 @@
                                 </p:cTn>
                               </p:par>
                               <p:par>
-                                <p:cTn id="19" presetID="1" presetClass="entr" presetSubtype="0" fill="hold" grpId="0" nodeType="withEffect">
+                                <p:cTn id="17" presetID="1" presetClass="entr" presetSubtype="0" fill="hold" grpId="0" nodeType="withEffect">
                                   <p:stCondLst>
                                     <p:cond delay="0"/>
                                   </p:stCondLst>
                                   <p:childTnLst>
                                     <p:set>
                                       <p:cBhvr>
-                                        <p:cTn id="20" dur="1" fill="hold">
+                                        <p:cTn id="18" dur="1" fill="hold">
                                           <p:stCondLst>
                                             <p:cond delay="0"/>
                                           </p:stCondLst>
@@ -18533,14 +18677,14 @@
                                 </p:cTn>
                               </p:par>
                               <p:par>
-                                <p:cTn id="21" presetID="1" presetClass="entr" presetSubtype="0" fill="hold" grpId="0" nodeType="withEffect">
+                                <p:cTn id="19" presetID="1" presetClass="entr" presetSubtype="0" fill="hold" grpId="0" nodeType="withEffect">
                                   <p:stCondLst>
                                     <p:cond delay="0"/>
                                   </p:stCondLst>
                                   <p:childTnLst>
                                     <p:set>
                                       <p:cBhvr>
-                                        <p:cTn id="22" dur="1" fill="hold">
+                                        <p:cTn id="20" dur="1" fill="hold">
                                           <p:stCondLst>
                                             <p:cond delay="0"/>
                                           </p:stCondLst>
@@ -18642,315 +18786,352 @@
           </a:p>
         </p:txBody>
       </p:sp>
-      <p:sp>
-        <p:nvSpPr>
-          <p:cNvPr id="3" name="Content Placeholder 2">
-            <a:extLst>
-              <a:ext uri="{FF2B5EF4-FFF2-40B4-BE49-F238E27FC236}">
-                <a16:creationId xmlns:a16="http://schemas.microsoft.com/office/drawing/2014/main" id="{EDA22658-0CBA-468F-B6EF-76D87E7C9DBD}"/>
-              </a:ext>
-            </a:extLst>
-          </p:cNvPr>
-          <p:cNvSpPr>
-            <a:spLocks noGrp="1"/>
-          </p:cNvSpPr>
-          <p:nvPr>
-            <p:ph idx="1"/>
-          </p:nvPr>
-        </p:nvSpPr>
-        <p:spPr>
-          <a:xfrm>
-            <a:off x="628650" y="1825625"/>
-            <a:ext cx="6762750" cy="4351338"/>
-          </a:xfrm>
-        </p:spPr>
-        <p:txBody>
-          <a:bodyPr>
-            <a:normAutofit fontScale="92500" lnSpcReduction="10000"/>
-          </a:bodyPr>
-          <a:lstStyle/>
-          <a:p>
-            <a:r>
-              <a:rPr lang="en-US" b="1" dirty="0"/>
-              <a:t>Boolean Satisfiability Problem (SAT)</a:t>
-            </a:r>
-            <a:br>
-              <a:rPr lang="en-US" dirty="0"/>
-            </a:br>
-            <a:r>
-              <a:rPr lang="en-US" dirty="0"/>
-              <a:t>Find variable assignments that makes a Boolean expression (often expressed in conjunctive normal form) evaluate as true.</a:t>
-            </a:r>
-          </a:p>
-          <a:p>
-            <a:endParaRPr lang="en-US" dirty="0"/>
-          </a:p>
-          <a:p>
-            <a:endParaRPr lang="en-US" dirty="0"/>
-          </a:p>
-          <a:p>
-            <a:r>
-              <a:rPr lang="en-US" b="1" dirty="0"/>
-              <a:t>Integer Programming</a:t>
-            </a:r>
-            <a:br>
-              <a:rPr lang="en-US" dirty="0"/>
-            </a:br>
-            <a:r>
-              <a:rPr lang="en-US" dirty="0"/>
-              <a:t>Variables are restricted to integers. Find a feasible solution that satisfies all constraints. The traveling salesman problem can be expressed as an integer program. </a:t>
-            </a:r>
-          </a:p>
-          <a:p>
-            <a:pPr marL="0" indent="0">
-              <a:buNone/>
-            </a:pPr>
-            <a:endParaRPr lang="en-US" dirty="0"/>
-          </a:p>
-          <a:p>
-            <a:r>
-              <a:rPr lang="en-US" b="1" dirty="0"/>
-              <a:t>Linear Programming</a:t>
-            </a:r>
-            <a:br>
-              <a:rPr lang="en-US" dirty="0"/>
-            </a:br>
-            <a:r>
-              <a:rPr lang="en-US" dirty="0"/>
-              <a:t>Variables are continuous and constraints </a:t>
-            </a:r>
-            <a:br>
-              <a:rPr lang="en-US" dirty="0"/>
-            </a:br>
-            <a:r>
-              <a:rPr lang="en-US" dirty="0"/>
-              <a:t>are linear (in)equalities. </a:t>
-            </a:r>
-            <a:br>
-              <a:rPr lang="en-US" dirty="0"/>
-            </a:br>
-            <a:r>
-              <a:rPr lang="en-US" dirty="0"/>
-              <a:t>Find a feasible solution using, e.g., </a:t>
-            </a:r>
-            <a:br>
-              <a:rPr lang="en-US" dirty="0"/>
-            </a:br>
-            <a:r>
-              <a:rPr lang="en-US" dirty="0"/>
-              <a:t>the simplex algorithm.</a:t>
-            </a:r>
-          </a:p>
-          <a:p>
-            <a:endParaRPr lang="en-US" dirty="0"/>
-          </a:p>
-          <a:p>
-            <a:endParaRPr lang="en-US" dirty="0"/>
-          </a:p>
-          <a:p>
-            <a:endParaRPr lang="en-US" dirty="0"/>
-          </a:p>
-          <a:p>
-            <a:endParaRPr lang="en-US" dirty="0"/>
-          </a:p>
-        </p:txBody>
-      </p:sp>
-      <p:sp>
-        <p:nvSpPr>
-          <p:cNvPr id="7" name="Rectangle 6">
-            <a:extLst>
-              <a:ext uri="{FF2B5EF4-FFF2-40B4-BE49-F238E27FC236}">
-                <a16:creationId xmlns:a16="http://schemas.microsoft.com/office/drawing/2014/main" id="{3F3560BE-A16D-4141-949D-AE1AB20774B8}"/>
-              </a:ext>
-            </a:extLst>
-          </p:cNvPr>
-          <p:cNvSpPr/>
-          <p:nvPr/>
-        </p:nvSpPr>
-        <p:spPr>
-          <a:xfrm>
-            <a:off x="2590800" y="2831068"/>
-            <a:ext cx="3709798" cy="369332"/>
-          </a:xfrm>
-          <a:prstGeom prst="rect">
-            <a:avLst/>
-          </a:prstGeom>
-        </p:spPr>
-        <p:txBody>
-          <a:bodyPr wrap="none">
-            <a:spAutoFit/>
-          </a:bodyPr>
-          <a:lstStyle/>
-          <a:p>
-            <a:r>
-              <a:rPr lang="en-US" dirty="0">
-                <a:solidFill>
-                  <a:srgbClr val="202122"/>
-                </a:solidFill>
-                <a:latin typeface="Calibri" panose="020F0502020204030204" pitchFamily="34" charset="0"/>
-              </a:rPr>
-              <a:t>(</a:t>
-            </a:r>
-            <a:r>
-              <a:rPr lang="en-US" i="1" dirty="0">
-                <a:solidFill>
-                  <a:srgbClr val="202122"/>
-                </a:solidFill>
-                <a:latin typeface="Calibri" panose="020F0502020204030204" pitchFamily="34" charset="0"/>
-              </a:rPr>
-              <a:t>x</a:t>
-            </a:r>
-            <a:r>
-              <a:rPr lang="en-US" baseline="-25000" dirty="0">
-                <a:solidFill>
-                  <a:srgbClr val="202122"/>
-                </a:solidFill>
-                <a:latin typeface="Calibri" panose="020F0502020204030204" pitchFamily="34" charset="0"/>
-              </a:rPr>
-              <a:t>1</a:t>
-            </a:r>
-            <a:r>
-              <a:rPr lang="en-US" dirty="0">
-                <a:solidFill>
-                  <a:srgbClr val="202122"/>
-                </a:solidFill>
-                <a:latin typeface="Calibri" panose="020F0502020204030204" pitchFamily="34" charset="0"/>
-              </a:rPr>
-              <a:t> ∨ ¬</a:t>
-            </a:r>
-            <a:r>
-              <a:rPr lang="en-US" i="1" dirty="0">
-                <a:solidFill>
-                  <a:srgbClr val="202122"/>
-                </a:solidFill>
-                <a:latin typeface="Calibri" panose="020F0502020204030204" pitchFamily="34" charset="0"/>
-              </a:rPr>
-              <a:t>x</a:t>
-            </a:r>
-            <a:r>
-              <a:rPr lang="en-US" baseline="-25000" dirty="0">
-                <a:solidFill>
-                  <a:srgbClr val="202122"/>
-                </a:solidFill>
-                <a:latin typeface="Calibri" panose="020F0502020204030204" pitchFamily="34" charset="0"/>
-              </a:rPr>
-              <a:t>2</a:t>
-            </a:r>
-            <a:r>
-              <a:rPr lang="en-US" dirty="0">
-                <a:solidFill>
-                  <a:srgbClr val="202122"/>
-                </a:solidFill>
-                <a:latin typeface="Calibri" panose="020F0502020204030204" pitchFamily="34" charset="0"/>
-              </a:rPr>
-              <a:t>) ∧ (¬</a:t>
-            </a:r>
-            <a:r>
-              <a:rPr lang="en-US" i="1" dirty="0">
-                <a:solidFill>
-                  <a:srgbClr val="202122"/>
-                </a:solidFill>
-                <a:latin typeface="Calibri" panose="020F0502020204030204" pitchFamily="34" charset="0"/>
-              </a:rPr>
-              <a:t>x</a:t>
-            </a:r>
-            <a:r>
-              <a:rPr lang="en-US" baseline="-25000" dirty="0">
-                <a:solidFill>
-                  <a:srgbClr val="202122"/>
-                </a:solidFill>
-                <a:latin typeface="Calibri" panose="020F0502020204030204" pitchFamily="34" charset="0"/>
-              </a:rPr>
-              <a:t>1</a:t>
-            </a:r>
-            <a:r>
-              <a:rPr lang="en-US" dirty="0">
-                <a:solidFill>
-                  <a:srgbClr val="202122"/>
-                </a:solidFill>
-                <a:latin typeface="Calibri" panose="020F0502020204030204" pitchFamily="34" charset="0"/>
-              </a:rPr>
-              <a:t> ∨ </a:t>
-            </a:r>
-            <a:r>
-              <a:rPr lang="en-US" i="1" dirty="0">
-                <a:solidFill>
-                  <a:srgbClr val="202122"/>
-                </a:solidFill>
-                <a:latin typeface="Calibri" panose="020F0502020204030204" pitchFamily="34" charset="0"/>
-              </a:rPr>
-              <a:t>x</a:t>
-            </a:r>
-            <a:r>
-              <a:rPr lang="en-US" baseline="-25000" dirty="0">
-                <a:solidFill>
-                  <a:srgbClr val="202122"/>
-                </a:solidFill>
-                <a:latin typeface="Calibri" panose="020F0502020204030204" pitchFamily="34" charset="0"/>
-              </a:rPr>
-              <a:t>2</a:t>
-            </a:r>
-            <a:r>
-              <a:rPr lang="en-US" dirty="0">
-                <a:solidFill>
-                  <a:srgbClr val="202122"/>
-                </a:solidFill>
-                <a:latin typeface="Calibri" panose="020F0502020204030204" pitchFamily="34" charset="0"/>
-              </a:rPr>
-              <a:t> ∨ </a:t>
-            </a:r>
-            <a:r>
-              <a:rPr lang="en-US" i="1" dirty="0">
-                <a:solidFill>
-                  <a:srgbClr val="202122"/>
-                </a:solidFill>
-                <a:latin typeface="Calibri" panose="020F0502020204030204" pitchFamily="34" charset="0"/>
-              </a:rPr>
-              <a:t>x</a:t>
-            </a:r>
-            <a:r>
-              <a:rPr lang="en-US" baseline="-25000" dirty="0">
-                <a:solidFill>
-                  <a:srgbClr val="202122"/>
-                </a:solidFill>
-                <a:latin typeface="Calibri" panose="020F0502020204030204" pitchFamily="34" charset="0"/>
-              </a:rPr>
-              <a:t>3</a:t>
-            </a:r>
-            <a:r>
-              <a:rPr lang="en-US" dirty="0">
-                <a:solidFill>
-                  <a:srgbClr val="202122"/>
-                </a:solidFill>
-                <a:latin typeface="Calibri" panose="020F0502020204030204" pitchFamily="34" charset="0"/>
-              </a:rPr>
-              <a:t>) ∧ ¬</a:t>
-            </a:r>
-            <a:r>
-              <a:rPr lang="en-US" i="1" dirty="0">
-                <a:solidFill>
-                  <a:srgbClr val="202122"/>
-                </a:solidFill>
-                <a:latin typeface="Calibri" panose="020F0502020204030204" pitchFamily="34" charset="0"/>
-              </a:rPr>
-              <a:t>x</a:t>
-            </a:r>
-            <a:r>
-              <a:rPr lang="en-US" baseline="-25000" dirty="0">
-                <a:solidFill>
-                  <a:srgbClr val="202122"/>
-                </a:solidFill>
-                <a:latin typeface="Calibri" panose="020F0502020204030204" pitchFamily="34" charset="0"/>
-              </a:rPr>
-              <a:t>1 </a:t>
-            </a:r>
-            <a:r>
-              <a:rPr lang="en-US" dirty="0"/>
-              <a:t>= True</a:t>
-            </a:r>
-          </a:p>
-        </p:txBody>
-      </p:sp>
+      <mc:AlternateContent xmlns:mc="http://schemas.openxmlformats.org/markup-compatibility/2006">
+        <mc:Choice xmlns:a14="http://schemas.microsoft.com/office/drawing/2010/main" Requires="a14">
+          <p:sp>
+            <p:nvSpPr>
+              <p:cNvPr id="3" name="Content Placeholder 2">
+                <a:extLst>
+                  <a:ext uri="{FF2B5EF4-FFF2-40B4-BE49-F238E27FC236}">
+                    <a16:creationId xmlns:a16="http://schemas.microsoft.com/office/drawing/2014/main" id="{EDA22658-0CBA-468F-B6EF-76D87E7C9DBD}"/>
+                  </a:ext>
+                </a:extLst>
+              </p:cNvPr>
+              <p:cNvSpPr>
+                <a:spLocks noGrp="1"/>
+              </p:cNvSpPr>
+              <p:nvPr>
+                <p:ph idx="1"/>
+              </p:nvPr>
+            </p:nvSpPr>
+            <p:spPr>
+              <a:xfrm>
+                <a:off x="628650" y="1825625"/>
+                <a:ext cx="6762750" cy="4351338"/>
+              </a:xfrm>
+            </p:spPr>
+            <p:txBody>
+              <a:bodyPr>
+                <a:normAutofit fontScale="92500" lnSpcReduction="10000"/>
+              </a:bodyPr>
+              <a:lstStyle/>
+              <a:p>
+                <a:r>
+                  <a:rPr lang="en-US" b="1" dirty="0"/>
+                  <a:t>Boolean Satisfiability Problem (SAT)</a:t>
+                </a:r>
+                <a:br>
+                  <a:rPr lang="en-US" dirty="0"/>
+                </a:br>
+                <a:r>
+                  <a:rPr lang="en-US" dirty="0"/>
+                  <a:t>Find variable assignments that make a Boolean expression (often expressed in conjunctive normal form) evaluate as true.	</a:t>
+                </a:r>
+              </a:p>
+              <a:p>
+                <a:pPr marL="0" indent="0">
+                  <a:buNone/>
+                </a:pPr>
+                <a14:m>
+                  <m:oMathPara xmlns:m="http://schemas.openxmlformats.org/officeDocument/2006/math">
+                    <m:oMathParaPr>
+                      <m:jc m:val="centerGroup"/>
+                    </m:oMathParaPr>
+                    <m:oMath xmlns:m="http://schemas.openxmlformats.org/officeDocument/2006/math">
+                      <m:r>
+                        <a:rPr lang="en-US" i="1" dirty="0" smtClean="0">
+                          <a:solidFill>
+                            <a:srgbClr val="202122"/>
+                          </a:solidFill>
+                          <a:latin typeface="Cambria Math" panose="02040503050406030204" pitchFamily="18" charset="0"/>
+                        </a:rPr>
+                        <m:t>(</m:t>
+                      </m:r>
+                      <m:r>
+                        <a:rPr lang="en-US" i="1" dirty="0" smtClean="0">
+                          <a:solidFill>
+                            <a:srgbClr val="202122"/>
+                          </a:solidFill>
+                          <a:latin typeface="Cambria Math" panose="02040503050406030204" pitchFamily="18" charset="0"/>
+                        </a:rPr>
+                        <m:t>𝑥</m:t>
+                      </m:r>
+                      <m:r>
+                        <a:rPr lang="en-US" i="1" baseline="-25000" dirty="0">
+                          <a:solidFill>
+                            <a:srgbClr val="202122"/>
+                          </a:solidFill>
+                          <a:latin typeface="Cambria Math" panose="02040503050406030204" pitchFamily="18" charset="0"/>
+                        </a:rPr>
+                        <m:t>1</m:t>
+                      </m:r>
+                      <m:r>
+                        <a:rPr lang="en-US" i="1" dirty="0">
+                          <a:solidFill>
+                            <a:srgbClr val="202122"/>
+                          </a:solidFill>
+                          <a:latin typeface="Cambria Math" panose="02040503050406030204" pitchFamily="18" charset="0"/>
+                        </a:rPr>
+                        <m:t> ∨ ¬</m:t>
+                      </m:r>
+                      <m:r>
+                        <a:rPr lang="en-US" i="1" dirty="0">
+                          <a:solidFill>
+                            <a:srgbClr val="202122"/>
+                          </a:solidFill>
+                          <a:latin typeface="Cambria Math" panose="02040503050406030204" pitchFamily="18" charset="0"/>
+                        </a:rPr>
+                        <m:t>𝑥</m:t>
+                      </m:r>
+                      <m:r>
+                        <a:rPr lang="en-US" i="1" baseline="-25000" dirty="0">
+                          <a:solidFill>
+                            <a:srgbClr val="202122"/>
+                          </a:solidFill>
+                          <a:latin typeface="Cambria Math" panose="02040503050406030204" pitchFamily="18" charset="0"/>
+                        </a:rPr>
+                        <m:t>2</m:t>
+                      </m:r>
+                      <m:r>
+                        <a:rPr lang="en-US" i="1" dirty="0">
+                          <a:solidFill>
+                            <a:srgbClr val="202122"/>
+                          </a:solidFill>
+                          <a:latin typeface="Cambria Math" panose="02040503050406030204" pitchFamily="18" charset="0"/>
+                        </a:rPr>
+                        <m:t>) ∧ (¬</m:t>
+                      </m:r>
+                      <m:r>
+                        <a:rPr lang="en-US" i="1" dirty="0">
+                          <a:solidFill>
+                            <a:srgbClr val="202122"/>
+                          </a:solidFill>
+                          <a:latin typeface="Cambria Math" panose="02040503050406030204" pitchFamily="18" charset="0"/>
+                        </a:rPr>
+                        <m:t>𝑥</m:t>
+                      </m:r>
+                      <m:r>
+                        <a:rPr lang="en-US" i="1" baseline="-25000" dirty="0">
+                          <a:solidFill>
+                            <a:srgbClr val="202122"/>
+                          </a:solidFill>
+                          <a:latin typeface="Cambria Math" panose="02040503050406030204" pitchFamily="18" charset="0"/>
+                        </a:rPr>
+                        <m:t>1</m:t>
+                      </m:r>
+                      <m:r>
+                        <a:rPr lang="en-US" i="1" dirty="0">
+                          <a:solidFill>
+                            <a:srgbClr val="202122"/>
+                          </a:solidFill>
+                          <a:latin typeface="Cambria Math" panose="02040503050406030204" pitchFamily="18" charset="0"/>
+                        </a:rPr>
+                        <m:t> ∨ </m:t>
+                      </m:r>
+                      <m:r>
+                        <a:rPr lang="en-US" i="1" dirty="0">
+                          <a:solidFill>
+                            <a:srgbClr val="202122"/>
+                          </a:solidFill>
+                          <a:latin typeface="Cambria Math" panose="02040503050406030204" pitchFamily="18" charset="0"/>
+                        </a:rPr>
+                        <m:t>𝑥</m:t>
+                      </m:r>
+                      <m:r>
+                        <a:rPr lang="en-US" i="1" baseline="-25000" dirty="0">
+                          <a:solidFill>
+                            <a:srgbClr val="202122"/>
+                          </a:solidFill>
+                          <a:latin typeface="Cambria Math" panose="02040503050406030204" pitchFamily="18" charset="0"/>
+                        </a:rPr>
+                        <m:t>2</m:t>
+                      </m:r>
+                      <m:r>
+                        <a:rPr lang="en-US" i="1" dirty="0">
+                          <a:solidFill>
+                            <a:srgbClr val="202122"/>
+                          </a:solidFill>
+                          <a:latin typeface="Cambria Math" panose="02040503050406030204" pitchFamily="18" charset="0"/>
+                        </a:rPr>
+                        <m:t> ∨ </m:t>
+                      </m:r>
+                      <m:r>
+                        <a:rPr lang="en-US" i="1" dirty="0">
+                          <a:solidFill>
+                            <a:srgbClr val="202122"/>
+                          </a:solidFill>
+                          <a:latin typeface="Cambria Math" panose="02040503050406030204" pitchFamily="18" charset="0"/>
+                        </a:rPr>
+                        <m:t>𝑥</m:t>
+                      </m:r>
+                      <m:r>
+                        <a:rPr lang="en-US" i="1" baseline="-25000" dirty="0">
+                          <a:solidFill>
+                            <a:srgbClr val="202122"/>
+                          </a:solidFill>
+                          <a:latin typeface="Cambria Math" panose="02040503050406030204" pitchFamily="18" charset="0"/>
+                        </a:rPr>
+                        <m:t>3</m:t>
+                      </m:r>
+                      <m:r>
+                        <a:rPr lang="en-US" i="1" dirty="0">
+                          <a:solidFill>
+                            <a:srgbClr val="202122"/>
+                          </a:solidFill>
+                          <a:latin typeface="Cambria Math" panose="02040503050406030204" pitchFamily="18" charset="0"/>
+                        </a:rPr>
+                        <m:t>) ∧ ¬</m:t>
+                      </m:r>
+                      <m:r>
+                        <a:rPr lang="en-US" i="1" dirty="0">
+                          <a:solidFill>
+                            <a:srgbClr val="202122"/>
+                          </a:solidFill>
+                          <a:latin typeface="Cambria Math" panose="02040503050406030204" pitchFamily="18" charset="0"/>
+                        </a:rPr>
+                        <m:t>𝑥</m:t>
+                      </m:r>
+                      <m:r>
+                        <a:rPr lang="en-US" i="1" baseline="-25000" dirty="0">
+                          <a:solidFill>
+                            <a:srgbClr val="202122"/>
+                          </a:solidFill>
+                          <a:latin typeface="Cambria Math" panose="02040503050406030204" pitchFamily="18" charset="0"/>
+                        </a:rPr>
+                        <m:t>1 </m:t>
+                      </m:r>
+                      <m:r>
+                        <a:rPr lang="en-US" i="1" dirty="0">
+                          <a:latin typeface="Cambria Math" panose="02040503050406030204" pitchFamily="18" charset="0"/>
+                        </a:rPr>
+                        <m:t>= </m:t>
+                      </m:r>
+                      <m:r>
+                        <a:rPr lang="en-US" i="1" dirty="0">
+                          <a:latin typeface="Cambria Math" panose="02040503050406030204" pitchFamily="18" charset="0"/>
+                        </a:rPr>
+                        <m:t>𝑇𝑟𝑢𝑒</m:t>
+                      </m:r>
+                    </m:oMath>
+                  </m:oMathPara>
+                </a14:m>
+                <a:endParaRPr lang="en-US" b="1" dirty="0"/>
+              </a:p>
+              <a:p>
+                <a:endParaRPr lang="en-US" b="1" dirty="0"/>
+              </a:p>
+              <a:p>
+                <a:r>
+                  <a:rPr lang="en-US" b="1" dirty="0"/>
+                  <a:t>Integer Programming</a:t>
+                </a:r>
+                <a:br>
+                  <a:rPr lang="en-US" dirty="0"/>
+                </a:br>
+                <a:r>
+                  <a:rPr lang="en-US" dirty="0"/>
+                  <a:t>Variables are restricted to integers. Find a feasible solution that satisfies all constraints. The traveling salesman problem can be expressed as an integer program. </a:t>
+                </a:r>
+              </a:p>
+              <a:p>
+                <a:pPr marL="0" indent="0">
+                  <a:buNone/>
+                </a:pPr>
+                <a:endParaRPr lang="en-US" dirty="0"/>
+              </a:p>
+              <a:p>
+                <a:r>
+                  <a:rPr lang="en-US" b="1" dirty="0"/>
+                  <a:t>Linear Programming</a:t>
+                </a:r>
+                <a:br>
+                  <a:rPr lang="en-US" dirty="0"/>
+                </a:br>
+                <a:r>
+                  <a:rPr lang="en-US" dirty="0"/>
+                  <a:t>Variables are continuous and constraints </a:t>
+                </a:r>
+                <a:br>
+                  <a:rPr lang="en-US" dirty="0"/>
+                </a:br>
+                <a:r>
+                  <a:rPr lang="en-US" dirty="0"/>
+                  <a:t>are linear (in)equalities. </a:t>
+                </a:r>
+                <a:br>
+                  <a:rPr lang="en-US" dirty="0"/>
+                </a:br>
+                <a:r>
+                  <a:rPr lang="en-US" dirty="0"/>
+                  <a:t>Find a feasible solution using, e.g., </a:t>
+                </a:r>
+                <a:br>
+                  <a:rPr lang="en-US" dirty="0"/>
+                </a:br>
+                <a:r>
+                  <a:rPr lang="en-US" dirty="0"/>
+                  <a:t>the simplex algorithm.</a:t>
+                </a:r>
+              </a:p>
+              <a:p>
+                <a:endParaRPr lang="en-US" dirty="0"/>
+              </a:p>
+              <a:p>
+                <a:endParaRPr lang="en-US" dirty="0"/>
+              </a:p>
+              <a:p>
+                <a:endParaRPr lang="en-US" dirty="0"/>
+              </a:p>
+              <a:p>
+                <a:endParaRPr lang="en-US" dirty="0"/>
+              </a:p>
+            </p:txBody>
+          </p:sp>
+        </mc:Choice>
+        <mc:Fallback>
+          <p:sp>
+            <p:nvSpPr>
+              <p:cNvPr id="3" name="Content Placeholder 2">
+                <a:extLst>
+                  <a:ext uri="{FF2B5EF4-FFF2-40B4-BE49-F238E27FC236}">
+                    <a16:creationId xmlns:a16="http://schemas.microsoft.com/office/drawing/2014/main" id="{EDA22658-0CBA-468F-B6EF-76D87E7C9DBD}"/>
+                  </a:ext>
+                </a:extLst>
+              </p:cNvPr>
+              <p:cNvSpPr>
+                <a:spLocks noGrp="1" noRot="1" noChangeAspect="1" noMove="1" noResize="1" noEditPoints="1" noAdjustHandles="1" noChangeArrowheads="1" noChangeShapeType="1" noTextEdit="1"/>
+              </p:cNvSpPr>
+              <p:nvPr>
+                <p:ph idx="1"/>
+              </p:nvPr>
+            </p:nvSpPr>
+            <p:spPr>
+              <a:xfrm>
+                <a:off x="628650" y="1825625"/>
+                <a:ext cx="6762750" cy="4351338"/>
+              </a:xfrm>
+              <a:blipFill>
+                <a:blip r:embed="rId2"/>
+                <a:stretch>
+                  <a:fillRect l="-631" t="-1821" r="-721"/>
+                </a:stretch>
+              </a:blipFill>
+            </p:spPr>
+            <p:txBody>
+              <a:bodyPr/>
+              <a:lstStyle/>
+              <a:p>
+                <a:r>
+                  <a:rPr lang="en-US">
+                    <a:noFill/>
+                  </a:rPr>
+                  <a:t> </a:t>
+                </a:r>
+              </a:p>
+            </p:txBody>
+          </p:sp>
+        </mc:Fallback>
+      </mc:AlternateContent>
       <p:pic>
         <p:nvPicPr>
           <p:cNvPr id="1026" name="Picture 2" descr="Linear programming - Simple English Wikipedia, the free encyclopedia">
@@ -18966,7 +19147,7 @@
           <p:nvPr/>
         </p:nvPicPr>
         <p:blipFill>
-          <a:blip r:embed="rId2" cstate="print">
+          <a:blip r:embed="rId3" cstate="print">
             <a:extLst>
               <a:ext uri="{28A0092B-C50C-407E-A947-70E740481C1C}">
                 <a14:useLocalDpi xmlns:a14="http://schemas.microsoft.com/office/drawing/2010/main" val="0"/>

</xml_diff>